<commit_message>
Updated template to new schedule, theme has a "code" layout
</commit_message>
<xml_diff>
--- a/2018/07/07_Debugging_errors_and_strategies.pptx
+++ b/2018/07/07_Debugging_errors_and_strategies.pptx
@@ -5,7 +5,7 @@
     <p:sldMasterId id="2147483684" r:id="rId1"/>
   </p:sldMasterIdLst>
   <p:notesMasterIdLst>
-    <p:notesMasterId r:id="rId82"/>
+    <p:notesMasterId r:id="rId87"/>
   </p:notesMasterIdLst>
   <p:sldIdLst>
     <p:sldId id="256" r:id="rId2"/>
@@ -86,8 +86,13 @@
     <p:sldId id="340" r:id="rId77"/>
     <p:sldId id="341" r:id="rId78"/>
     <p:sldId id="342" r:id="rId79"/>
-    <p:sldId id="259" r:id="rId80"/>
-    <p:sldId id="260" r:id="rId81"/>
+    <p:sldId id="343" r:id="rId80"/>
+    <p:sldId id="345" r:id="rId81"/>
+    <p:sldId id="347" r:id="rId82"/>
+    <p:sldId id="259" r:id="rId83"/>
+    <p:sldId id="344" r:id="rId84"/>
+    <p:sldId id="346" r:id="rId85"/>
+    <p:sldId id="260" r:id="rId86"/>
   </p:sldIdLst>
   <p:sldSz cx="12192000" cy="6858000"/>
   <p:notesSz cx="6858000" cy="9144000"/>
@@ -277,7 +282,12 @@
             <p14:sldId id="340"/>
             <p14:sldId id="341"/>
             <p14:sldId id="342"/>
+            <p14:sldId id="343"/>
+            <p14:sldId id="345"/>
+            <p14:sldId id="347"/>
             <p14:sldId id="259"/>
+            <p14:sldId id="344"/>
+            <p14:sldId id="346"/>
             <p14:sldId id="260"/>
           </p14:sldIdLst>
         </p14:section>
@@ -295,14 +305,14 @@
 
 <file path=ppt/commentAuthors.xml><?xml version="1.0" encoding="utf-8"?>
 <p:cmAuthorLst xmlns:a="http://schemas.openxmlformats.org/drawingml/2006/main" xmlns:r="http://schemas.openxmlformats.org/officeDocument/2006/relationships" xmlns:p="http://schemas.openxmlformats.org/presentationml/2006/main">
-  <p:cmAuthor id="1" name="Antonia H." initials="AH" lastIdx="6" clrIdx="0">
+  <p:cmAuthor id="1" name="Antonia H." initials="AH" lastIdx="18" clrIdx="0">
     <p:extLst>
       <p:ext uri="{19B8F6BF-5375-455C-9EA6-DF929625EA0E}">
         <p15:presenceInfo xmlns:p15="http://schemas.microsoft.com/office/powerpoint/2012/main" userId="da08060cd893cdf4" providerId="Windows Live"/>
       </p:ext>
     </p:extLst>
   </p:cmAuthor>
-  <p:cmAuthor id="2" name="Moritz Nipshagen" initials="MN" lastIdx="4" clrIdx="1">
+  <p:cmAuthor id="2" name="Moritz Nipshagen" initials="MN" lastIdx="6" clrIdx="1">
     <p:extLst>
       <p:ext uri="{19B8F6BF-5375-455C-9EA6-DF929625EA0E}">
         <p15:presenceInfo xmlns:p15="http://schemas.microsoft.com/office/powerpoint/2012/main" userId="ee3b3bbc25b4cb6d" providerId="Windows Live"/>
@@ -315,7 +325,7 @@
 <file path=ppt/revisionInfo.xml><?xml version="1.0" encoding="utf-8"?>
 <p1510:revInfo xmlns:a="http://schemas.openxmlformats.org/drawingml/2006/main" xmlns:r="http://schemas.openxmlformats.org/officeDocument/2006/relationships" xmlns:p1510="http://schemas.microsoft.com/office/powerpoint/2015/10/main">
   <p1510:revLst>
-    <p1510:client id="{C9F52752-DD38-48E5-9BD3-CA35DA8FF1DD}" v="3971" dt="2018-05-15T15:31:38.630"/>
+    <p1510:client id="{C9F52752-DD38-48E5-9BD3-CA35DA8FF1DD}" v="6272" dt="2018-05-16T14:22:33.619"/>
   </p1510:revLst>
 </p1510:revInfo>
 </file>
@@ -600,6 +610,168 @@
     </pc:docChg>
   </pc:docChgLst>
   <pc:docChgLst>
+    <pc:chgData name="Antonia H." userId="da08060cd893cdf4" providerId="Windows Live" clId="Web-{56B96C13-3FA9-4E9D-9501-3FD5967D3524}"/>
+    <pc:docChg chg="modSld">
+      <pc:chgData name="Antonia H." userId="da08060cd893cdf4" providerId="Windows Live" clId="Web-{56B96C13-3FA9-4E9D-9501-3FD5967D3524}" dt="2018-05-16T10:10:43.109" v="33"/>
+      <pc:docMkLst>
+        <pc:docMk/>
+      </pc:docMkLst>
+      <pc:sldChg chg="addCm modCm">
+        <pc:chgData name="Antonia H." userId="da08060cd893cdf4" providerId="Windows Live" clId="Web-{56B96C13-3FA9-4E9D-9501-3FD5967D3524}" dt="2018-05-16T09:51:52.176" v="9" actId="20577"/>
+        <pc:sldMkLst>
+          <pc:docMk/>
+          <pc:sldMk cId="1012611459" sldId="267"/>
+        </pc:sldMkLst>
+      </pc:sldChg>
+      <pc:sldChg chg="addCm">
+        <pc:chgData name="Antonia H." userId="da08060cd893cdf4" providerId="Windows Live" clId="Web-{56B96C13-3FA9-4E9D-9501-3FD5967D3524}" dt="2018-05-16T09:55:14.325" v="17" actId="20577"/>
+        <pc:sldMkLst>
+          <pc:docMk/>
+          <pc:sldMk cId="3362629395" sldId="270"/>
+        </pc:sldMkLst>
+      </pc:sldChg>
+      <pc:sldChg chg="addCm modCm">
+        <pc:chgData name="Antonia H." userId="da08060cd893cdf4" providerId="Windows Live" clId="Web-{56B96C13-3FA9-4E9D-9501-3FD5967D3524}" dt="2018-05-16T10:10:43.109" v="33"/>
+        <pc:sldMkLst>
+          <pc:docMk/>
+          <pc:sldMk cId="1309035882" sldId="276"/>
+        </pc:sldMkLst>
+      </pc:sldChg>
+      <pc:sldChg chg="addCm">
+        <pc:chgData name="Antonia H." userId="da08060cd893cdf4" providerId="Windows Live" clId="Web-{56B96C13-3FA9-4E9D-9501-3FD5967D3524}" dt="2018-05-16T10:09:01.500" v="30"/>
+        <pc:sldMkLst>
+          <pc:docMk/>
+          <pc:sldMk cId="3775839603" sldId="281"/>
+        </pc:sldMkLst>
+      </pc:sldChg>
+      <pc:sldChg chg="addCm">
+        <pc:chgData name="Antonia H." userId="da08060cd893cdf4" providerId="Windows Live" clId="Web-{56B96C13-3FA9-4E9D-9501-3FD5967D3524}" dt="2018-05-16T10:03:01.609" v="25"/>
+        <pc:sldMkLst>
+          <pc:docMk/>
+          <pc:sldMk cId="1035182427" sldId="283"/>
+        </pc:sldMkLst>
+      </pc:sldChg>
+      <pc:sldChg chg="addCm">
+        <pc:chgData name="Antonia H." userId="da08060cd893cdf4" providerId="Windows Live" clId="Web-{56B96C13-3FA9-4E9D-9501-3FD5967D3524}" dt="2018-05-16T09:44:37.718" v="0" actId="20577"/>
+        <pc:sldMkLst>
+          <pc:docMk/>
+          <pc:sldMk cId="2020896456" sldId="287"/>
+        </pc:sldMkLst>
+      </pc:sldChg>
+      <pc:sldChg chg="modSp">
+        <pc:chgData name="Antonia H." userId="da08060cd893cdf4" providerId="Windows Live" clId="Web-{56B96C13-3FA9-4E9D-9501-3FD5967D3524}" dt="2018-05-16T09:48:41.707" v="3" actId="20577"/>
+        <pc:sldMkLst>
+          <pc:docMk/>
+          <pc:sldMk cId="523179743" sldId="288"/>
+        </pc:sldMkLst>
+        <pc:spChg chg="mod">
+          <ac:chgData name="Antonia H." userId="da08060cd893cdf4" providerId="Windows Live" clId="Web-{56B96C13-3FA9-4E9D-9501-3FD5967D3524}" dt="2018-05-16T09:48:41.707" v="3" actId="20577"/>
+          <ac:spMkLst>
+            <pc:docMk/>
+            <pc:sldMk cId="523179743" sldId="288"/>
+            <ac:spMk id="5" creationId="{965DE040-EA6C-4443-A223-E50AD372AF03}"/>
+          </ac:spMkLst>
+        </pc:spChg>
+      </pc:sldChg>
+      <pc:sldChg chg="addCm">
+        <pc:chgData name="Antonia H." userId="da08060cd893cdf4" providerId="Windows Live" clId="Web-{56B96C13-3FA9-4E9D-9501-3FD5967D3524}" dt="2018-05-16T09:59:46.985" v="21"/>
+        <pc:sldMkLst>
+          <pc:docMk/>
+          <pc:sldMk cId="426592258" sldId="295"/>
+        </pc:sldMkLst>
+      </pc:sldChg>
+      <pc:sldChg chg="addCm delCm">
+        <pc:chgData name="Antonia H." userId="da08060cd893cdf4" providerId="Windows Live" clId="Web-{56B96C13-3FA9-4E9D-9501-3FD5967D3524}" dt="2018-05-16T10:02:52.078" v="24"/>
+        <pc:sldMkLst>
+          <pc:docMk/>
+          <pc:sldMk cId="3775153881" sldId="296"/>
+        </pc:sldMkLst>
+      </pc:sldChg>
+      <pc:sldChg chg="addCm delCm modCm">
+        <pc:chgData name="Antonia H." userId="da08060cd893cdf4" providerId="Windows Live" clId="Web-{56B96C13-3FA9-4E9D-9501-3FD5967D3524}" dt="2018-05-16T10:07:56.203" v="29"/>
+        <pc:sldMkLst>
+          <pc:docMk/>
+          <pc:sldMk cId="3639630272" sldId="297"/>
+        </pc:sldMkLst>
+      </pc:sldChg>
+      <pc:sldChg chg="modSp">
+        <pc:chgData name="Antonia H." userId="da08060cd893cdf4" providerId="Windows Live" clId="Web-{56B96C13-3FA9-4E9D-9501-3FD5967D3524}" dt="2018-05-16T09:49:37.190" v="5" actId="20577"/>
+        <pc:sldMkLst>
+          <pc:docMk/>
+          <pc:sldMk cId="4007384498" sldId="305"/>
+        </pc:sldMkLst>
+        <pc:spChg chg="mod">
+          <ac:chgData name="Antonia H." userId="da08060cd893cdf4" providerId="Windows Live" clId="Web-{56B96C13-3FA9-4E9D-9501-3FD5967D3524}" dt="2018-05-16T09:49:37.190" v="5" actId="20577"/>
+          <ac:spMkLst>
+            <pc:docMk/>
+            <pc:sldMk cId="4007384498" sldId="305"/>
+            <ac:spMk id="3" creationId="{B79F1E0E-1BC8-4CAC-AA0D-919940E8AF36}"/>
+          </ac:spMkLst>
+        </pc:spChg>
+      </pc:sldChg>
+      <pc:sldChg chg="modSp">
+        <pc:chgData name="Antonia H." userId="da08060cd893cdf4" providerId="Windows Live" clId="Web-{56B96C13-3FA9-4E9D-9501-3FD5967D3524}" dt="2018-05-16T09:53:36.260" v="13" actId="14100"/>
+        <pc:sldMkLst>
+          <pc:docMk/>
+          <pc:sldMk cId="4268902719" sldId="321"/>
+        </pc:sldMkLst>
+        <pc:spChg chg="mod">
+          <ac:chgData name="Antonia H." userId="da08060cd893cdf4" providerId="Windows Live" clId="Web-{56B96C13-3FA9-4E9D-9501-3FD5967D3524}" dt="2018-05-16T09:53:36.260" v="13" actId="14100"/>
+          <ac:spMkLst>
+            <pc:docMk/>
+            <pc:sldMk cId="4268902719" sldId="321"/>
+            <ac:spMk id="4" creationId="{9DF671C2-179D-46EE-A7C0-A4E82F5BCE26}"/>
+          </ac:spMkLst>
+        </pc:spChg>
+        <pc:spChg chg="mod">
+          <ac:chgData name="Antonia H." userId="da08060cd893cdf4" providerId="Windows Live" clId="Web-{56B96C13-3FA9-4E9D-9501-3FD5967D3524}" dt="2018-05-16T09:53:31.323" v="11" actId="20577"/>
+          <ac:spMkLst>
+            <pc:docMk/>
+            <pc:sldMk cId="4268902719" sldId="321"/>
+            <ac:spMk id="6" creationId="{EFC57CFF-5736-4013-B592-8131AB0E640B}"/>
+          </ac:spMkLst>
+        </pc:spChg>
+      </pc:sldChg>
+      <pc:sldChg chg="modSp">
+        <pc:chgData name="Antonia H." userId="da08060cd893cdf4" providerId="Windows Live" clId="Web-{56B96C13-3FA9-4E9D-9501-3FD5967D3524}" dt="2018-05-16T09:54:01.105" v="14" actId="20577"/>
+        <pc:sldMkLst>
+          <pc:docMk/>
+          <pc:sldMk cId="1665994086" sldId="324"/>
+        </pc:sldMkLst>
+        <pc:spChg chg="mod">
+          <ac:chgData name="Antonia H." userId="da08060cd893cdf4" providerId="Windows Live" clId="Web-{56B96C13-3FA9-4E9D-9501-3FD5967D3524}" dt="2018-05-16T09:54:01.105" v="14" actId="20577"/>
+          <ac:spMkLst>
+            <pc:docMk/>
+            <pc:sldMk cId="1665994086" sldId="324"/>
+            <ac:spMk id="4" creationId="{9DF671C2-179D-46EE-A7C0-A4E82F5BCE26}"/>
+          </ac:spMkLst>
+        </pc:spChg>
+      </pc:sldChg>
+      <pc:sldChg chg="modSp">
+        <pc:chgData name="Antonia H." userId="da08060cd893cdf4" providerId="Windows Live" clId="Web-{56B96C13-3FA9-4E9D-9501-3FD5967D3524}" dt="2018-05-16T09:56:59.609" v="18" actId="20577"/>
+        <pc:sldMkLst>
+          <pc:docMk/>
+          <pc:sldMk cId="492399707" sldId="331"/>
+        </pc:sldMkLst>
+        <pc:spChg chg="mod">
+          <ac:chgData name="Antonia H." userId="da08060cd893cdf4" providerId="Windows Live" clId="Web-{56B96C13-3FA9-4E9D-9501-3FD5967D3524}" dt="2018-05-16T09:56:59.609" v="18" actId="20577"/>
+          <ac:spMkLst>
+            <pc:docMk/>
+            <pc:sldMk cId="492399707" sldId="331"/>
+            <ac:spMk id="2" creationId="{D7C99BA0-4B49-43C2-9912-150E5D1118BD}"/>
+          </ac:spMkLst>
+        </pc:spChg>
+      </pc:sldChg>
+      <pc:sldChg chg="addCm">
+        <pc:chgData name="Antonia H." userId="da08060cd893cdf4" providerId="Windows Live" clId="Web-{56B96C13-3FA9-4E9D-9501-3FD5967D3524}" dt="2018-05-16T10:09:58.703" v="31"/>
+        <pc:sldMkLst>
+          <pc:docMk/>
+          <pc:sldMk cId="1675721559" sldId="333"/>
+        </pc:sldMkLst>
+      </pc:sldChg>
+    </pc:docChg>
+  </pc:docChgLst>
+  <pc:docChgLst>
     <pc:chgData name="Antonia H." userId="da08060cd893cdf4" providerId="Windows Live" clId="Web-{EAFC7D0F-930D-46FD-A230-29BF8E6E2AF4}"/>
     <pc:docChg chg="modSld">
       <pc:chgData name="Antonia H." userId="da08060cd893cdf4" providerId="Windows Live" clId="Web-{EAFC7D0F-930D-46FD-A230-29BF8E6E2AF4}" dt="2018-05-15T10:33:48.632" v="4" actId="20577"/>
@@ -625,8 +797,8 @@
   </pc:docChgLst>
   <pc:docChgLst>
     <pc:chgData name="Moritz Nipshagen" userId="ee3b3bbc25b4cb6d" providerId="LiveId" clId="{C9F52752-DD38-48E5-9BD3-CA35DA8FF1DD}"/>
-    <pc:docChg chg="undo custSel addSld modSld sldOrd">
-      <pc:chgData name="Moritz Nipshagen" userId="ee3b3bbc25b4cb6d" providerId="LiveId" clId="{C9F52752-DD38-48E5-9BD3-CA35DA8FF1DD}" dt="2018-05-15T15:31:38.630" v="3970" actId="20577"/>
+    <pc:docChg chg="undo redo custSel addSld modSld sldOrd">
+      <pc:chgData name="Moritz Nipshagen" userId="ee3b3bbc25b4cb6d" providerId="LiveId" clId="{C9F52752-DD38-48E5-9BD3-CA35DA8FF1DD}" dt="2018-05-16T14:22:33.619" v="6266" actId="20577"/>
       <pc:docMkLst>
         <pc:docMk/>
       </pc:docMkLst>
@@ -684,8 +856,8 @@
           </ac:spMkLst>
         </pc:spChg>
       </pc:sldChg>
-      <pc:sldChg chg="modSp">
-        <pc:chgData name="Moritz Nipshagen" userId="ee3b3bbc25b4cb6d" providerId="LiveId" clId="{C9F52752-DD38-48E5-9BD3-CA35DA8FF1DD}" dt="2018-05-15T14:25:08.151" v="2042" actId="20577"/>
+      <pc:sldChg chg="modSp addCm">
+        <pc:chgData name="Moritz Nipshagen" userId="ee3b3bbc25b4cb6d" providerId="LiveId" clId="{C9F52752-DD38-48E5-9BD3-CA35DA8FF1DD}" dt="2018-05-16T09:59:43.848" v="4255" actId="14"/>
         <pc:sldMkLst>
           <pc:docMk/>
           <pc:sldMk cId="3362629395" sldId="270"/>
@@ -722,18 +894,85 @@
           </ac:spMkLst>
         </pc:spChg>
       </pc:sldChg>
+      <pc:sldChg chg="addCm">
+        <pc:chgData name="Moritz Nipshagen" userId="ee3b3bbc25b4cb6d" providerId="LiveId" clId="{C9F52752-DD38-48E5-9BD3-CA35DA8FF1DD}" dt="2018-05-16T10:12:26.074" v="4755"/>
+        <pc:sldMkLst>
+          <pc:docMk/>
+          <pc:sldMk cId="1309035882" sldId="276"/>
+        </pc:sldMkLst>
+      </pc:sldChg>
       <pc:sldChg chg="modSp">
-        <pc:chgData name="Moritz Nipshagen" userId="ee3b3bbc25b4cb6d" providerId="LiveId" clId="{C9F52752-DD38-48E5-9BD3-CA35DA8FF1DD}" dt="2018-05-15T15:26:47.061" v="3559" actId="20577"/>
+        <pc:chgData name="Moritz Nipshagen" userId="ee3b3bbc25b4cb6d" providerId="LiveId" clId="{C9F52752-DD38-48E5-9BD3-CA35DA8FF1DD}" dt="2018-05-16T09:56:54.978" v="3976" actId="20577"/>
         <pc:sldMkLst>
           <pc:docMk/>
           <pc:sldMk cId="2020896456" sldId="287"/>
         </pc:sldMkLst>
         <pc:spChg chg="mod">
-          <ac:chgData name="Moritz Nipshagen" userId="ee3b3bbc25b4cb6d" providerId="LiveId" clId="{C9F52752-DD38-48E5-9BD3-CA35DA8FF1DD}" dt="2018-05-15T15:26:47.061" v="3559" actId="20577"/>
+          <ac:chgData name="Moritz Nipshagen" userId="ee3b3bbc25b4cb6d" providerId="LiveId" clId="{C9F52752-DD38-48E5-9BD3-CA35DA8FF1DD}" dt="2018-05-16T09:56:54.978" v="3976" actId="20577"/>
           <ac:spMkLst>
             <pc:docMk/>
             <pc:sldMk cId="2020896456" sldId="287"/>
             <ac:spMk id="5" creationId="{8BD4FFBE-7558-42C0-95A4-9DDA500FDC55}"/>
+          </ac:spMkLst>
+        </pc:spChg>
+      </pc:sldChg>
+      <pc:sldChg chg="modSp">
+        <pc:chgData name="Moritz Nipshagen" userId="ee3b3bbc25b4cb6d" providerId="LiveId" clId="{C9F52752-DD38-48E5-9BD3-CA35DA8FF1DD}" dt="2018-05-16T11:57:24.348" v="6257" actId="20577"/>
+        <pc:sldMkLst>
+          <pc:docMk/>
+          <pc:sldMk cId="3639630272" sldId="297"/>
+        </pc:sldMkLst>
+        <pc:spChg chg="mod">
+          <ac:chgData name="Moritz Nipshagen" userId="ee3b3bbc25b4cb6d" providerId="LiveId" clId="{C9F52752-DD38-48E5-9BD3-CA35DA8FF1DD}" dt="2018-05-16T11:57:24.348" v="6257" actId="20577"/>
+          <ac:spMkLst>
+            <pc:docMk/>
+            <pc:sldMk cId="3639630272" sldId="297"/>
+            <ac:spMk id="6" creationId="{2C918D23-F8F8-4812-A393-2C52F7FC3929}"/>
+          </ac:spMkLst>
+        </pc:spChg>
+      </pc:sldChg>
+      <pc:sldChg chg="delCm">
+        <pc:chgData name="Moritz Nipshagen" userId="ee3b3bbc25b4cb6d" providerId="LiveId" clId="{C9F52752-DD38-48E5-9BD3-CA35DA8FF1DD}" dt="2018-05-16T10:01:06.217" v="4256" actId="14"/>
+        <pc:sldMkLst>
+          <pc:docMk/>
+          <pc:sldMk cId="1925419995" sldId="302"/>
+        </pc:sldMkLst>
+      </pc:sldChg>
+      <pc:sldChg chg="modSp">
+        <pc:chgData name="Moritz Nipshagen" userId="ee3b3bbc25b4cb6d" providerId="LiveId" clId="{C9F52752-DD38-48E5-9BD3-CA35DA8FF1DD}" dt="2018-05-16T11:55:06.073" v="6196" actId="404"/>
+        <pc:sldMkLst>
+          <pc:docMk/>
+          <pc:sldMk cId="177238173" sldId="303"/>
+        </pc:sldMkLst>
+        <pc:spChg chg="mod">
+          <ac:chgData name="Moritz Nipshagen" userId="ee3b3bbc25b4cb6d" providerId="LiveId" clId="{C9F52752-DD38-48E5-9BD3-CA35DA8FF1DD}" dt="2018-05-16T11:13:58.339" v="5888" actId="20577"/>
+          <ac:spMkLst>
+            <pc:docMk/>
+            <pc:sldMk cId="177238173" sldId="303"/>
+            <ac:spMk id="4" creationId="{8768F7B3-3130-401C-B207-42E05C9E10D1}"/>
+          </ac:spMkLst>
+        </pc:spChg>
+        <pc:spChg chg="mod">
+          <ac:chgData name="Moritz Nipshagen" userId="ee3b3bbc25b4cb6d" providerId="LiveId" clId="{C9F52752-DD38-48E5-9BD3-CA35DA8FF1DD}" dt="2018-05-16T11:55:06.073" v="6196" actId="404"/>
+          <ac:spMkLst>
+            <pc:docMk/>
+            <pc:sldMk cId="177238173" sldId="303"/>
+            <ac:spMk id="5" creationId="{D534E828-4774-405E-94AE-1B8B7868B99A}"/>
+          </ac:spMkLst>
+        </pc:spChg>
+      </pc:sldChg>
+      <pc:sldChg chg="modSp">
+        <pc:chgData name="Moritz Nipshagen" userId="ee3b3bbc25b4cb6d" providerId="LiveId" clId="{C9F52752-DD38-48E5-9BD3-CA35DA8FF1DD}" dt="2018-05-16T14:22:33.619" v="6266" actId="20577"/>
+        <pc:sldMkLst>
+          <pc:docMk/>
+          <pc:sldMk cId="1315099815" sldId="312"/>
+        </pc:sldMkLst>
+        <pc:spChg chg="mod">
+          <ac:chgData name="Moritz Nipshagen" userId="ee3b3bbc25b4cb6d" providerId="LiveId" clId="{C9F52752-DD38-48E5-9BD3-CA35DA8FF1DD}" dt="2018-05-16T14:22:33.619" v="6266" actId="20577"/>
+          <ac:spMkLst>
+            <pc:docMk/>
+            <pc:sldMk cId="1315099815" sldId="312"/>
+            <ac:spMk id="4" creationId="{9DF671C2-179D-46EE-A7C0-A4E82F5BCE26}"/>
           </ac:spMkLst>
         </pc:spChg>
       </pc:sldChg>
@@ -826,6 +1065,253 @@
             <pc:docMk/>
             <pc:sldMk cId="1781609093" sldId="327"/>
             <ac:spMk id="3" creationId="{2454BFA6-896F-41CF-843E-61F9EC3639FA}"/>
+          </ac:spMkLst>
+        </pc:spChg>
+      </pc:sldChg>
+      <pc:sldChg chg="modSp">
+        <pc:chgData name="Moritz Nipshagen" userId="ee3b3bbc25b4cb6d" providerId="LiveId" clId="{C9F52752-DD38-48E5-9BD3-CA35DA8FF1DD}" dt="2018-05-16T09:58:58.604" v="4254" actId="20577"/>
+        <pc:sldMkLst>
+          <pc:docMk/>
+          <pc:sldMk cId="3187005333" sldId="328"/>
+        </pc:sldMkLst>
+        <pc:spChg chg="mod">
+          <ac:chgData name="Moritz Nipshagen" userId="ee3b3bbc25b4cb6d" providerId="LiveId" clId="{C9F52752-DD38-48E5-9BD3-CA35DA8FF1DD}" dt="2018-05-16T09:58:58.604" v="4254" actId="20577"/>
+          <ac:spMkLst>
+            <pc:docMk/>
+            <pc:sldMk cId="3187005333" sldId="328"/>
+            <ac:spMk id="3" creationId="{1DF197D1-FEB9-4CCE-AA54-08E597365357}"/>
+          </ac:spMkLst>
+        </pc:spChg>
+      </pc:sldChg>
+      <pc:sldChg chg="modSp">
+        <pc:chgData name="Moritz Nipshagen" userId="ee3b3bbc25b4cb6d" providerId="LiveId" clId="{C9F52752-DD38-48E5-9BD3-CA35DA8FF1DD}" dt="2018-05-16T11:56:55.955" v="6224" actId="20577"/>
+        <pc:sldMkLst>
+          <pc:docMk/>
+          <pc:sldMk cId="2969409613" sldId="334"/>
+        </pc:sldMkLst>
+        <pc:spChg chg="mod">
+          <ac:chgData name="Moritz Nipshagen" userId="ee3b3bbc25b4cb6d" providerId="LiveId" clId="{C9F52752-DD38-48E5-9BD3-CA35DA8FF1DD}" dt="2018-05-16T11:56:55.955" v="6224" actId="20577"/>
+          <ac:spMkLst>
+            <pc:docMk/>
+            <pc:sldMk cId="2969409613" sldId="334"/>
+            <ac:spMk id="14" creationId="{0621E688-42EF-45DE-B597-E6EBE599229B}"/>
+          </ac:spMkLst>
+        </pc:spChg>
+      </pc:sldChg>
+      <pc:sldChg chg="modSp">
+        <pc:chgData name="Moritz Nipshagen" userId="ee3b3bbc25b4cb6d" providerId="LiveId" clId="{C9F52752-DD38-48E5-9BD3-CA35DA8FF1DD}" dt="2018-05-16T10:13:59.195" v="4847" actId="20577"/>
+        <pc:sldMkLst>
+          <pc:docMk/>
+          <pc:sldMk cId="1533185735" sldId="340"/>
+        </pc:sldMkLst>
+        <pc:spChg chg="mod">
+          <ac:chgData name="Moritz Nipshagen" userId="ee3b3bbc25b4cb6d" providerId="LiveId" clId="{C9F52752-DD38-48E5-9BD3-CA35DA8FF1DD}" dt="2018-05-16T10:13:59.195" v="4847" actId="20577"/>
+          <ac:spMkLst>
+            <pc:docMk/>
+            <pc:sldMk cId="1533185735" sldId="340"/>
+            <ac:spMk id="3" creationId="{D43E097C-4750-4FCA-B5B3-D827A14DF740}"/>
+          </ac:spMkLst>
+        </pc:spChg>
+      </pc:sldChg>
+      <pc:sldChg chg="delSp modSp">
+        <pc:chgData name="Moritz Nipshagen" userId="ee3b3bbc25b4cb6d" providerId="LiveId" clId="{C9F52752-DD38-48E5-9BD3-CA35DA8FF1DD}" dt="2018-05-16T10:40:14.549" v="5881" actId="20577"/>
+        <pc:sldMkLst>
+          <pc:docMk/>
+          <pc:sldMk cId="3260635447" sldId="342"/>
+        </pc:sldMkLst>
+        <pc:spChg chg="mod">
+          <ac:chgData name="Moritz Nipshagen" userId="ee3b3bbc25b4cb6d" providerId="LiveId" clId="{C9F52752-DD38-48E5-9BD3-CA35DA8FF1DD}" dt="2018-05-16T10:40:14.549" v="5881" actId="20577"/>
+          <ac:spMkLst>
+            <pc:docMk/>
+            <pc:sldMk cId="3260635447" sldId="342"/>
+            <ac:spMk id="3" creationId="{820260AE-23CF-4AE3-8428-636F42D33EE3}"/>
+          </ac:spMkLst>
+        </pc:spChg>
+        <pc:spChg chg="del">
+          <ac:chgData name="Moritz Nipshagen" userId="ee3b3bbc25b4cb6d" providerId="LiveId" clId="{C9F52752-DD38-48E5-9BD3-CA35DA8FF1DD}" dt="2018-05-16T10:14:35.902" v="4914"/>
+          <ac:spMkLst>
+            <pc:docMk/>
+            <pc:sldMk cId="3260635447" sldId="342"/>
+            <ac:spMk id="4" creationId="{CEFD9743-BCB4-46E2-9377-7DE0B93074E8}"/>
+          </ac:spMkLst>
+        </pc:spChg>
+      </pc:sldChg>
+      <pc:sldChg chg="modSp add">
+        <pc:chgData name="Moritz Nipshagen" userId="ee3b3bbc25b4cb6d" providerId="LiveId" clId="{C9F52752-DD38-48E5-9BD3-CA35DA8FF1DD}" dt="2018-05-16T10:27:14.761" v="5186" actId="20577"/>
+        <pc:sldMkLst>
+          <pc:docMk/>
+          <pc:sldMk cId="716298242" sldId="343"/>
+        </pc:sldMkLst>
+        <pc:spChg chg="mod">
+          <ac:chgData name="Moritz Nipshagen" userId="ee3b3bbc25b4cb6d" providerId="LiveId" clId="{C9F52752-DD38-48E5-9BD3-CA35DA8FF1DD}" dt="2018-05-16T10:19:36.188" v="5018" actId="20577"/>
+          <ac:spMkLst>
+            <pc:docMk/>
+            <pc:sldMk cId="716298242" sldId="343"/>
+            <ac:spMk id="2" creationId="{6E408E9C-7F59-4A0F-B2D2-99A48307E717}"/>
+          </ac:spMkLst>
+        </pc:spChg>
+        <pc:spChg chg="mod">
+          <ac:chgData name="Moritz Nipshagen" userId="ee3b3bbc25b4cb6d" providerId="LiveId" clId="{C9F52752-DD38-48E5-9BD3-CA35DA8FF1DD}" dt="2018-05-16T10:27:14.761" v="5186" actId="20577"/>
+          <ac:spMkLst>
+            <pc:docMk/>
+            <pc:sldMk cId="716298242" sldId="343"/>
+            <ac:spMk id="3" creationId="{5BB3198D-8C3C-4B28-9754-5F84BB52727D}"/>
+          </ac:spMkLst>
+        </pc:spChg>
+      </pc:sldChg>
+      <pc:sldChg chg="addSp delSp modSp add">
+        <pc:chgData name="Moritz Nipshagen" userId="ee3b3bbc25b4cb6d" providerId="LiveId" clId="{C9F52752-DD38-48E5-9BD3-CA35DA8FF1DD}" dt="2018-05-16T10:37:55.811" v="5641" actId="20577"/>
+        <pc:sldMkLst>
+          <pc:docMk/>
+          <pc:sldMk cId="3452338753" sldId="344"/>
+        </pc:sldMkLst>
+        <pc:spChg chg="del">
+          <ac:chgData name="Moritz Nipshagen" userId="ee3b3bbc25b4cb6d" providerId="LiveId" clId="{C9F52752-DD38-48E5-9BD3-CA35DA8FF1DD}" dt="2018-05-16T10:19:49.646" v="5020"/>
+          <ac:spMkLst>
+            <pc:docMk/>
+            <pc:sldMk cId="3452338753" sldId="344"/>
+            <ac:spMk id="2" creationId="{E42B51CA-4AD8-43C5-A9B4-463E982B6546}"/>
+          </ac:spMkLst>
+        </pc:spChg>
+        <pc:spChg chg="add del mod">
+          <ac:chgData name="Moritz Nipshagen" userId="ee3b3bbc25b4cb6d" providerId="LiveId" clId="{C9F52752-DD38-48E5-9BD3-CA35DA8FF1DD}" dt="2018-05-16T10:19:54.027" v="5021"/>
+          <ac:spMkLst>
+            <pc:docMk/>
+            <pc:sldMk cId="3452338753" sldId="344"/>
+            <ac:spMk id="4" creationId="{881CF5C0-98DE-4A2D-A9EA-3907B30B4655}"/>
+          </ac:spMkLst>
+        </pc:spChg>
+        <pc:spChg chg="add del mod">
+          <ac:chgData name="Moritz Nipshagen" userId="ee3b3bbc25b4cb6d" providerId="LiveId" clId="{C9F52752-DD38-48E5-9BD3-CA35DA8FF1DD}" dt="2018-05-16T10:19:54.027" v="5021"/>
+          <ac:spMkLst>
+            <pc:docMk/>
+            <pc:sldMk cId="3452338753" sldId="344"/>
+            <ac:spMk id="5" creationId="{129C6C35-AA67-47C5-97E2-485A2C24C4A4}"/>
+          </ac:spMkLst>
+        </pc:spChg>
+        <pc:spChg chg="add mod">
+          <ac:chgData name="Moritz Nipshagen" userId="ee3b3bbc25b4cb6d" providerId="LiveId" clId="{C9F52752-DD38-48E5-9BD3-CA35DA8FF1DD}" dt="2018-05-16T10:37:24.503" v="5434" actId="20577"/>
+          <ac:spMkLst>
+            <pc:docMk/>
+            <pc:sldMk cId="3452338753" sldId="344"/>
+            <ac:spMk id="6" creationId="{6FE256A7-4E0B-44FF-A309-D7377DBF34A4}"/>
+          </ac:spMkLst>
+        </pc:spChg>
+        <pc:spChg chg="add mod">
+          <ac:chgData name="Moritz Nipshagen" userId="ee3b3bbc25b4cb6d" providerId="LiveId" clId="{C9F52752-DD38-48E5-9BD3-CA35DA8FF1DD}" dt="2018-05-16T10:37:55.811" v="5641" actId="20577"/>
+          <ac:spMkLst>
+            <pc:docMk/>
+            <pc:sldMk cId="3452338753" sldId="344"/>
+            <ac:spMk id="7" creationId="{89576429-F6FE-48F5-AF35-A06A404B4703}"/>
+          </ac:spMkLst>
+        </pc:spChg>
+      </pc:sldChg>
+      <pc:sldChg chg="addSp delSp modSp add">
+        <pc:chgData name="Moritz Nipshagen" userId="ee3b3bbc25b4cb6d" providerId="LiveId" clId="{C9F52752-DD38-48E5-9BD3-CA35DA8FF1DD}" dt="2018-05-16T10:32:03.649" v="5289" actId="20577"/>
+        <pc:sldMkLst>
+          <pc:docMk/>
+          <pc:sldMk cId="100636900" sldId="345"/>
+        </pc:sldMkLst>
+        <pc:spChg chg="mod">
+          <ac:chgData name="Moritz Nipshagen" userId="ee3b3bbc25b4cb6d" providerId="LiveId" clId="{C9F52752-DD38-48E5-9BD3-CA35DA8FF1DD}" dt="2018-05-16T10:21:37.467" v="5131" actId="20577"/>
+          <ac:spMkLst>
+            <pc:docMk/>
+            <pc:sldMk cId="100636900" sldId="345"/>
+            <ac:spMk id="2" creationId="{6052A65A-4196-4973-8C82-CD1D681E148B}"/>
+          </ac:spMkLst>
+        </pc:spChg>
+        <pc:spChg chg="add del mod">
+          <ac:chgData name="Moritz Nipshagen" userId="ee3b3bbc25b4cb6d" providerId="LiveId" clId="{C9F52752-DD38-48E5-9BD3-CA35DA8FF1DD}" dt="2018-05-16T10:32:03.649" v="5289" actId="20577"/>
+          <ac:spMkLst>
+            <pc:docMk/>
+            <pc:sldMk cId="100636900" sldId="345"/>
+            <ac:spMk id="3" creationId="{CC431AEB-BB12-45FD-8E18-7C26E6C6CE09}"/>
+          </ac:spMkLst>
+        </pc:spChg>
+        <pc:picChg chg="add del mod">
+          <ac:chgData name="Moritz Nipshagen" userId="ee3b3bbc25b4cb6d" providerId="LiveId" clId="{C9F52752-DD38-48E5-9BD3-CA35DA8FF1DD}" dt="2018-05-16T10:31:01.978" v="5192"/>
+          <ac:picMkLst>
+            <pc:docMk/>
+            <pc:sldMk cId="100636900" sldId="345"/>
+            <ac:picMk id="5" creationId="{D0BD9947-AA56-4BF7-87AD-F1F0566BCCBF}"/>
+          </ac:picMkLst>
+        </pc:picChg>
+      </pc:sldChg>
+      <pc:sldChg chg="addSp delSp modSp add">
+        <pc:chgData name="Moritz Nipshagen" userId="ee3b3bbc25b4cb6d" providerId="LiveId" clId="{C9F52752-DD38-48E5-9BD3-CA35DA8FF1DD}" dt="2018-05-16T10:37:18.501" v="5424" actId="1076"/>
+        <pc:sldMkLst>
+          <pc:docMk/>
+          <pc:sldMk cId="2676061361" sldId="346"/>
+        </pc:sldMkLst>
+        <pc:spChg chg="del">
+          <ac:chgData name="Moritz Nipshagen" userId="ee3b3bbc25b4cb6d" providerId="LiveId" clId="{C9F52752-DD38-48E5-9BD3-CA35DA8FF1DD}" dt="2018-05-16T10:34:31.853" v="5298"/>
+          <ac:spMkLst>
+            <pc:docMk/>
+            <pc:sldMk cId="2676061361" sldId="346"/>
+            <ac:spMk id="2" creationId="{8931CFAB-E61C-40F5-8F04-AD196FB223D9}"/>
+          </ac:spMkLst>
+        </pc:spChg>
+        <pc:spChg chg="del">
+          <ac:chgData name="Moritz Nipshagen" userId="ee3b3bbc25b4cb6d" providerId="LiveId" clId="{C9F52752-DD38-48E5-9BD3-CA35DA8FF1DD}" dt="2018-05-16T10:34:18.937" v="5295" actId="931"/>
+          <ac:spMkLst>
+            <pc:docMk/>
+            <pc:sldMk cId="2676061361" sldId="346"/>
+            <ac:spMk id="3" creationId="{1C8569A5-1786-48AE-A78F-7EE95ADBC4EB}"/>
+          </ac:spMkLst>
+        </pc:spChg>
+        <pc:spChg chg="add mod">
+          <ac:chgData name="Moritz Nipshagen" userId="ee3b3bbc25b4cb6d" providerId="LiveId" clId="{C9F52752-DD38-48E5-9BD3-CA35DA8FF1DD}" dt="2018-05-16T10:37:18.501" v="5424" actId="1076"/>
+          <ac:spMkLst>
+            <pc:docMk/>
+            <pc:sldMk cId="2676061361" sldId="346"/>
+            <ac:spMk id="9" creationId="{6DF428B8-A044-4222-86E7-27FC6F0330E0}"/>
+          </ac:spMkLst>
+        </pc:spChg>
+        <pc:graphicFrameChg chg="add del mod">
+          <ac:chgData name="Moritz Nipshagen" userId="ee3b3bbc25b4cb6d" providerId="LiveId" clId="{C9F52752-DD38-48E5-9BD3-CA35DA8FF1DD}" dt="2018-05-16T10:33:54.999" v="5292"/>
+          <ac:graphicFrameMkLst>
+            <pc:docMk/>
+            <pc:sldMk cId="2676061361" sldId="346"/>
+            <ac:graphicFrameMk id="5" creationId="{CF58BD4A-CD27-4B2E-8383-5AA7375AE0D8}"/>
+          </ac:graphicFrameMkLst>
+        </pc:graphicFrameChg>
+        <pc:graphicFrameChg chg="add del mod">
+          <ac:chgData name="Moritz Nipshagen" userId="ee3b3bbc25b4cb6d" providerId="LiveId" clId="{C9F52752-DD38-48E5-9BD3-CA35DA8FF1DD}" dt="2018-05-16T10:33:59.554" v="5294"/>
+          <ac:graphicFrameMkLst>
+            <pc:docMk/>
+            <pc:sldMk cId="2676061361" sldId="346"/>
+            <ac:graphicFrameMk id="6" creationId="{605C9922-BC95-4A82-92E5-9FA1CEABBC31}"/>
+          </ac:graphicFrameMkLst>
+        </pc:graphicFrameChg>
+        <pc:picChg chg="add mod">
+          <ac:chgData name="Moritz Nipshagen" userId="ee3b3bbc25b4cb6d" providerId="LiveId" clId="{C9F52752-DD38-48E5-9BD3-CA35DA8FF1DD}" dt="2018-05-16T10:37:15.902" v="5423" actId="14100"/>
+          <ac:picMkLst>
+            <pc:docMk/>
+            <pc:sldMk cId="2676061361" sldId="346"/>
+            <ac:picMk id="8" creationId="{3411C977-CF18-48C2-BB0A-4D784D25AD16}"/>
+          </ac:picMkLst>
+        </pc:picChg>
+      </pc:sldChg>
+      <pc:sldChg chg="modSp add">
+        <pc:chgData name="Moritz Nipshagen" userId="ee3b3bbc25b4cb6d" providerId="LiveId" clId="{C9F52752-DD38-48E5-9BD3-CA35DA8FF1DD}" dt="2018-05-16T10:39:23.271" v="5817" actId="20577"/>
+        <pc:sldMkLst>
+          <pc:docMk/>
+          <pc:sldMk cId="2176173525" sldId="347"/>
+        </pc:sldMkLst>
+        <pc:spChg chg="mod">
+          <ac:chgData name="Moritz Nipshagen" userId="ee3b3bbc25b4cb6d" providerId="LiveId" clId="{C9F52752-DD38-48E5-9BD3-CA35DA8FF1DD}" dt="2018-05-16T10:38:44.959" v="5655" actId="20577"/>
+          <ac:spMkLst>
+            <pc:docMk/>
+            <pc:sldMk cId="2176173525" sldId="347"/>
+            <ac:spMk id="2" creationId="{21680ECA-503A-4BAB-A9C2-3D3C58FEA275}"/>
+          </ac:spMkLst>
+        </pc:spChg>
+        <pc:spChg chg="mod">
+          <ac:chgData name="Moritz Nipshagen" userId="ee3b3bbc25b4cb6d" providerId="LiveId" clId="{C9F52752-DD38-48E5-9BD3-CA35DA8FF1DD}" dt="2018-05-16T10:39:23.271" v="5817" actId="20577"/>
+          <ac:spMkLst>
+            <pc:docMk/>
+            <pc:sldMk cId="2176173525" sldId="347"/>
+            <ac:spMk id="3" creationId="{CD2221AB-A358-4C0B-8C52-E8D33488ED2B}"/>
           </ac:spMkLst>
         </pc:spChg>
       </pc:sldChg>
@@ -1292,7 +1778,7 @@
         </pc:spChg>
       </pc:sldChg>
       <pc:sldChg chg="addSp delSp modSp add">
-        <pc:chgData name="Moritz Nipshagen" userId="ee3b3bbc25b4cb6d" providerId="LiveId" clId="{1B7760D4-FBD5-4B33-B612-888F248C1802}" dt="2018-05-16T09:23:17.853" v="17965"/>
+        <pc:chgData name="Moritz Nipshagen" userId="ee3b3bbc25b4cb6d" providerId="LiveId" clId="{1B7760D4-FBD5-4B33-B612-888F248C1802}" dt="2018-05-16T09:23:17.853" v="17965" actId="2696"/>
         <pc:sldMkLst>
           <pc:docMk/>
           <pc:sldMk cId="1055972731" sldId="263"/>
@@ -1306,7 +1792,7 @@
           </ac:spMkLst>
         </pc:spChg>
         <pc:spChg chg="add mod">
-          <ac:chgData name="Moritz Nipshagen" userId="ee3b3bbc25b4cb6d" providerId="LiveId" clId="{1B7760D4-FBD5-4B33-B612-888F248C1802}" dt="2018-05-16T09:23:17.853" v="17965"/>
+          <ac:chgData name="Moritz Nipshagen" userId="ee3b3bbc25b4cb6d" providerId="LiveId" clId="{1B7760D4-FBD5-4B33-B612-888F248C1802}" dt="2018-05-16T09:23:17.853" v="17965" actId="2696"/>
           <ac:spMkLst>
             <pc:docMk/>
             <pc:sldMk cId="1055972731" sldId="263"/>
@@ -1392,7 +1878,7 @@
         </pc:spChg>
       </pc:sldChg>
       <pc:sldChg chg="addSp modSp add">
-        <pc:chgData name="Moritz Nipshagen" userId="ee3b3bbc25b4cb6d" providerId="LiveId" clId="{1B7760D4-FBD5-4B33-B612-888F248C1802}" dt="2018-05-15T20:07:57.288" v="11111"/>
+        <pc:chgData name="Moritz Nipshagen" userId="ee3b3bbc25b4cb6d" providerId="LiveId" clId="{1B7760D4-FBD5-4B33-B612-888F248C1802}" dt="2018-05-15T20:07:57.288" v="11111" actId="2696"/>
         <pc:sldMkLst>
           <pc:docMk/>
           <pc:sldMk cId="1012611459" sldId="267"/>
@@ -1406,7 +1892,7 @@
           </ac:spMkLst>
         </pc:spChg>
         <pc:spChg chg="add mod">
-          <ac:chgData name="Moritz Nipshagen" userId="ee3b3bbc25b4cb6d" providerId="LiveId" clId="{1B7760D4-FBD5-4B33-B612-888F248C1802}" dt="2018-05-15T20:07:57.288" v="11111"/>
+          <ac:chgData name="Moritz Nipshagen" userId="ee3b3bbc25b4cb6d" providerId="LiveId" clId="{1B7760D4-FBD5-4B33-B612-888F248C1802}" dt="2018-05-15T20:07:57.288" v="11111" actId="2696"/>
           <ac:spMkLst>
             <pc:docMk/>
             <pc:sldMk cId="1012611459" sldId="267"/>
@@ -1729,7 +2215,7 @@
         </pc:spChg>
       </pc:sldChg>
       <pc:sldChg chg="modSp add">
-        <pc:chgData name="Moritz Nipshagen" userId="ee3b3bbc25b4cb6d" providerId="LiveId" clId="{1B7760D4-FBD5-4B33-B612-888F248C1802}" dt="2018-05-15T22:45:07.185" v="13247"/>
+        <pc:chgData name="Moritz Nipshagen" userId="ee3b3bbc25b4cb6d" providerId="LiveId" clId="{1B7760D4-FBD5-4B33-B612-888F248C1802}" dt="2018-05-15T22:45:07.185" v="13247" actId="2696"/>
         <pc:sldMkLst>
           <pc:docMk/>
           <pc:sldMk cId="862917611" sldId="282"/>
@@ -1743,7 +2229,7 @@
           </ac:spMkLst>
         </pc:spChg>
         <pc:spChg chg="mod">
-          <ac:chgData name="Moritz Nipshagen" userId="ee3b3bbc25b4cb6d" providerId="LiveId" clId="{1B7760D4-FBD5-4B33-B612-888F248C1802}" dt="2018-05-15T22:45:07.185" v="13247"/>
+          <ac:chgData name="Moritz Nipshagen" userId="ee3b3bbc25b4cb6d" providerId="LiveId" clId="{1B7760D4-FBD5-4B33-B612-888F248C1802}" dt="2018-05-15T22:45:07.185" v="13247" actId="2696"/>
           <ac:spMkLst>
             <pc:docMk/>
             <pc:sldMk cId="862917611" sldId="282"/>
@@ -1951,7 +2437,7 @@
           </ac:spMkLst>
         </pc:spChg>
         <pc:spChg chg="add del mod">
-          <ac:chgData name="Moritz Nipshagen" userId="ee3b3bbc25b4cb6d" providerId="LiveId" clId="{1B7760D4-FBD5-4B33-B612-888F248C1802}" dt="2018-05-16T06:33:28.929" v="13269"/>
+          <ac:chgData name="Moritz Nipshagen" userId="ee3b3bbc25b4cb6d" providerId="LiveId" clId="{1B7760D4-FBD5-4B33-B612-888F248C1802}" dt="2018-05-16T06:33:28.929" v="13269" actId="20577"/>
           <ac:spMkLst>
             <pc:docMk/>
             <pc:sldMk cId="3466452959" sldId="290"/>
@@ -1967,19 +2453,19 @@
           </ac:spMkLst>
         </pc:spChg>
         <pc:spChg chg="add del mod">
+          <ac:chgData name="Moritz Nipshagen" userId="ee3b3bbc25b4cb6d" providerId="LiveId" clId="{1B7760D4-FBD5-4B33-B612-888F248C1802}" dt="2018-05-16T06:33:36.002" v="13271" actId="478"/>
+          <ac:spMkLst>
+            <pc:docMk/>
+            <pc:sldMk cId="3466452959" sldId="290"/>
+            <ac:spMk id="7" creationId="{8A331948-1CC2-43E4-BAE2-8C0930F1D7C5}"/>
+          </ac:spMkLst>
+        </pc:spChg>
+        <pc:spChg chg="add del mod">
           <ac:chgData name="Moritz Nipshagen" userId="ee3b3bbc25b4cb6d" providerId="LiveId" clId="{1B7760D4-FBD5-4B33-B612-888F248C1802}" dt="2018-05-12T23:08:41.288" v="2110" actId="1076"/>
           <ac:spMkLst>
             <pc:docMk/>
             <pc:sldMk cId="3466452959" sldId="290"/>
             <ac:spMk id="7" creationId="{64B4C01F-749E-4E43-9751-F1D79E57B60B}"/>
-          </ac:spMkLst>
-        </pc:spChg>
-        <pc:spChg chg="add del mod">
-          <ac:chgData name="Moritz Nipshagen" userId="ee3b3bbc25b4cb6d" providerId="LiveId" clId="{1B7760D4-FBD5-4B33-B612-888F248C1802}" dt="2018-05-16T06:33:36.002" v="13271" actId="478"/>
-          <ac:spMkLst>
-            <pc:docMk/>
-            <pc:sldMk cId="3466452959" sldId="290"/>
-            <ac:spMk id="7" creationId="{8A331948-1CC2-43E4-BAE2-8C0930F1D7C5}"/>
           </ac:spMkLst>
         </pc:spChg>
         <pc:spChg chg="add del">
@@ -2114,20 +2600,20 @@
           <pc:docMk/>
           <pc:sldMk cId="411793683" sldId="294"/>
         </pc:sldMkLst>
-        <pc:spChg chg="add del mod">
-          <ac:chgData name="Moritz Nipshagen" userId="ee3b3bbc25b4cb6d" providerId="LiveId" clId="{1B7760D4-FBD5-4B33-B612-888F248C1802}" dt="2018-05-16T08:47:08.656" v="15428"/>
-          <ac:spMkLst>
-            <pc:docMk/>
-            <pc:sldMk cId="411793683" sldId="294"/>
-            <ac:spMk id="2" creationId="{9A5C7A15-2BA8-4312-B719-B3F48225034F}"/>
-          </ac:spMkLst>
-        </pc:spChg>
         <pc:spChg chg="del">
           <ac:chgData name="Moritz Nipshagen" userId="ee3b3bbc25b4cb6d" providerId="LiveId" clId="{1B7760D4-FBD5-4B33-B612-888F248C1802}" dt="2018-05-13T10:23:46.925" v="3137" actId="20577"/>
           <ac:spMkLst>
             <pc:docMk/>
             <pc:sldMk cId="411793683" sldId="294"/>
             <ac:spMk id="2" creationId="{844F1542-4B42-42B8-A3D4-821F18A65936}"/>
+          </ac:spMkLst>
+        </pc:spChg>
+        <pc:spChg chg="add del mod">
+          <ac:chgData name="Moritz Nipshagen" userId="ee3b3bbc25b4cb6d" providerId="LiveId" clId="{1B7760D4-FBD5-4B33-B612-888F248C1802}" dt="2018-05-16T08:47:08.656" v="15428" actId="20577"/>
+          <ac:spMkLst>
+            <pc:docMk/>
+            <pc:sldMk cId="411793683" sldId="294"/>
+            <ac:spMk id="2" creationId="{9A5C7A15-2BA8-4312-B719-B3F48225034F}"/>
           </ac:spMkLst>
         </pc:spChg>
         <pc:spChg chg="add mod">
@@ -2171,7 +2657,7 @@
         </pc:spChg>
       </pc:sldChg>
       <pc:sldChg chg="addSp delSp modSp add">
-        <pc:chgData name="Moritz Nipshagen" userId="ee3b3bbc25b4cb6d" providerId="LiveId" clId="{1B7760D4-FBD5-4B33-B612-888F248C1802}" dt="2018-05-16T07:15:09.099" v="14125"/>
+        <pc:chgData name="Moritz Nipshagen" userId="ee3b3bbc25b4cb6d" providerId="LiveId" clId="{1B7760D4-FBD5-4B33-B612-888F248C1802}" dt="2018-05-16T07:15:09.099" v="14125" actId="2696"/>
         <pc:sldMkLst>
           <pc:docMk/>
           <pc:sldMk cId="3775153881" sldId="296"/>
@@ -2193,7 +2679,7 @@
           </ac:spMkLst>
         </pc:spChg>
         <pc:spChg chg="add mod">
-          <ac:chgData name="Moritz Nipshagen" userId="ee3b3bbc25b4cb6d" providerId="LiveId" clId="{1B7760D4-FBD5-4B33-B612-888F248C1802}" dt="2018-05-16T07:15:09.099" v="14125"/>
+          <ac:chgData name="Moritz Nipshagen" userId="ee3b3bbc25b4cb6d" providerId="LiveId" clId="{1B7760D4-FBD5-4B33-B612-888F248C1802}" dt="2018-05-16T07:15:09.099" v="14125" actId="2696"/>
           <ac:spMkLst>
             <pc:docMk/>
             <pc:sldMk cId="3775153881" sldId="296"/>
@@ -2249,13 +2735,13 @@
         </pc:spChg>
       </pc:sldChg>
       <pc:sldChg chg="addSp delSp modSp add">
-        <pc:chgData name="Moritz Nipshagen" userId="ee3b3bbc25b4cb6d" providerId="LiveId" clId="{1B7760D4-FBD5-4B33-B612-888F248C1802}" dt="2018-05-13T22:05:30.307" v="8423"/>
+        <pc:chgData name="Moritz Nipshagen" userId="ee3b3bbc25b4cb6d" providerId="LiveId" clId="{1B7760D4-FBD5-4B33-B612-888F248C1802}" dt="2018-05-13T22:05:30.307" v="8423" actId="2696"/>
         <pc:sldMkLst>
           <pc:docMk/>
           <pc:sldMk cId="1325346840" sldId="298"/>
         </pc:sldMkLst>
         <pc:spChg chg="mod">
-          <ac:chgData name="Moritz Nipshagen" userId="ee3b3bbc25b4cb6d" providerId="LiveId" clId="{1B7760D4-FBD5-4B33-B612-888F248C1802}" dt="2018-05-13T22:05:30.307" v="8423"/>
+          <ac:chgData name="Moritz Nipshagen" userId="ee3b3bbc25b4cb6d" providerId="LiveId" clId="{1B7760D4-FBD5-4B33-B612-888F248C1802}" dt="2018-05-13T22:05:30.307" v="8423" actId="2696"/>
           <ac:spMkLst>
             <pc:docMk/>
             <pc:sldMk cId="1325346840" sldId="298"/>
@@ -2271,7 +2757,7 @@
           </ac:spMkLst>
         </pc:spChg>
         <pc:spChg chg="add del mod">
-          <ac:chgData name="Moritz Nipshagen" userId="ee3b3bbc25b4cb6d" providerId="LiveId" clId="{1B7760D4-FBD5-4B33-B612-888F248C1802}" dt="2018-05-13T21:30:11.193" v="7308"/>
+          <ac:chgData name="Moritz Nipshagen" userId="ee3b3bbc25b4cb6d" providerId="LiveId" clId="{1B7760D4-FBD5-4B33-B612-888F248C1802}" dt="2018-05-13T21:30:11.193" v="7308" actId="2696"/>
           <ac:spMkLst>
             <pc:docMk/>
             <pc:sldMk cId="1325346840" sldId="298"/>
@@ -2332,20 +2818,20 @@
           <pc:docMk/>
           <pc:sldMk cId="1157785947" sldId="300"/>
         </pc:sldMkLst>
+        <pc:spChg chg="del">
+          <ac:chgData name="Moritz Nipshagen" userId="ee3b3bbc25b4cb6d" providerId="LiveId" clId="{1B7760D4-FBD5-4B33-B612-888F248C1802}" dt="2018-05-13T22:03:51.965" v="8321" actId="20577"/>
+          <ac:spMkLst>
+            <pc:docMk/>
+            <pc:sldMk cId="1157785947" sldId="300"/>
+            <ac:spMk id="2" creationId="{81345093-3FE6-450E-BD5F-132A5D1C4894}"/>
+          </ac:spMkLst>
+        </pc:spChg>
         <pc:spChg chg="add mod">
           <ac:chgData name="Moritz Nipshagen" userId="ee3b3bbc25b4cb6d" providerId="LiveId" clId="{1B7760D4-FBD5-4B33-B612-888F248C1802}" dt="2018-05-16T08:38:07.369" v="14616" actId="20577"/>
           <ac:spMkLst>
             <pc:docMk/>
             <pc:sldMk cId="1157785947" sldId="300"/>
             <ac:spMk id="2" creationId="{4C3B18F2-20CA-43D8-B1A6-5A742956DDCA}"/>
-          </ac:spMkLst>
-        </pc:spChg>
-        <pc:spChg chg="del">
-          <ac:chgData name="Moritz Nipshagen" userId="ee3b3bbc25b4cb6d" providerId="LiveId" clId="{1B7760D4-FBD5-4B33-B612-888F248C1802}" dt="2018-05-13T22:03:51.965" v="8321" actId="20577"/>
-          <ac:spMkLst>
-            <pc:docMk/>
-            <pc:sldMk cId="1157785947" sldId="300"/>
-            <ac:spMk id="2" creationId="{81345093-3FE6-450E-BD5F-132A5D1C4894}"/>
           </ac:spMkLst>
         </pc:spChg>
         <pc:spChg chg="del">
@@ -2365,7 +2851,7 @@
           </ac:spMkLst>
         </pc:spChg>
         <pc:spChg chg="add del mod">
-          <ac:chgData name="Moritz Nipshagen" userId="ee3b3bbc25b4cb6d" providerId="LiveId" clId="{1B7760D4-FBD5-4B33-B612-888F248C1802}" dt="2018-05-16T08:31:06.786" v="14410"/>
+          <ac:chgData name="Moritz Nipshagen" userId="ee3b3bbc25b4cb6d" providerId="LiveId" clId="{1B7760D4-FBD5-4B33-B612-888F248C1802}" dt="2018-05-16T08:31:06.786" v="14410" actId="20577"/>
           <ac:spMkLst>
             <pc:docMk/>
             <pc:sldMk cId="1157785947" sldId="300"/>
@@ -2451,13 +2937,13 @@
         </pc:spChg>
       </pc:sldChg>
       <pc:sldChg chg="addSp delSp modSp add">
-        <pc:chgData name="Moritz Nipshagen" userId="ee3b3bbc25b4cb6d" providerId="LiveId" clId="{1B7760D4-FBD5-4B33-B612-888F248C1802}" dt="2018-05-14T15:06:53.194" v="8538"/>
+        <pc:chgData name="Moritz Nipshagen" userId="ee3b3bbc25b4cb6d" providerId="LiveId" clId="{1B7760D4-FBD5-4B33-B612-888F248C1802}" dt="2018-05-14T15:06:53.194" v="8538" actId="2696"/>
         <pc:sldMkLst>
           <pc:docMk/>
           <pc:sldMk cId="177238173" sldId="303"/>
         </pc:sldMkLst>
         <pc:spChg chg="del">
-          <ac:chgData name="Moritz Nipshagen" userId="ee3b3bbc25b4cb6d" providerId="LiveId" clId="{1B7760D4-FBD5-4B33-B612-888F248C1802}" dt="2018-05-14T15:06:53.194" v="8538"/>
+          <ac:chgData name="Moritz Nipshagen" userId="ee3b3bbc25b4cb6d" providerId="LiveId" clId="{1B7760D4-FBD5-4B33-B612-888F248C1802}" dt="2018-05-14T15:06:53.194" v="8538" actId="2696"/>
           <ac:spMkLst>
             <pc:docMk/>
             <pc:sldMk cId="177238173" sldId="303"/>
@@ -2465,7 +2951,7 @@
           </ac:spMkLst>
         </pc:spChg>
         <pc:spChg chg="add mod">
-          <ac:chgData name="Moritz Nipshagen" userId="ee3b3bbc25b4cb6d" providerId="LiveId" clId="{1B7760D4-FBD5-4B33-B612-888F248C1802}" dt="2018-05-14T15:06:53.194" v="8538"/>
+          <ac:chgData name="Moritz Nipshagen" userId="ee3b3bbc25b4cb6d" providerId="LiveId" clId="{1B7760D4-FBD5-4B33-B612-888F248C1802}" dt="2018-05-14T15:06:53.194" v="8538" actId="2696"/>
           <ac:spMkLst>
             <pc:docMk/>
             <pc:sldMk cId="177238173" sldId="303"/>
@@ -2473,7 +2959,7 @@
           </ac:spMkLst>
         </pc:spChg>
         <pc:spChg chg="add mod">
-          <ac:chgData name="Moritz Nipshagen" userId="ee3b3bbc25b4cb6d" providerId="LiveId" clId="{1B7760D4-FBD5-4B33-B612-888F248C1802}" dt="2018-05-14T15:06:53.194" v="8538"/>
+          <ac:chgData name="Moritz Nipshagen" userId="ee3b3bbc25b4cb6d" providerId="LiveId" clId="{1B7760D4-FBD5-4B33-B612-888F248C1802}" dt="2018-05-14T15:06:53.194" v="8538" actId="2696"/>
           <ac:spMkLst>
             <pc:docMk/>
             <pc:sldMk cId="177238173" sldId="303"/>
@@ -2527,7 +3013,7 @@
         </pc:sldMkLst>
       </pc:sldChg>
       <pc:sldChg chg="ord">
-        <pc:chgData name="Moritz Nipshagen" userId="ee3b3bbc25b4cb6d" providerId="LiveId" clId="{1B7760D4-FBD5-4B33-B612-888F248C1802}" dt="2018-05-15T20:00:16.554" v="10719"/>
+        <pc:chgData name="Moritz Nipshagen" userId="ee3b3bbc25b4cb6d" providerId="LiveId" clId="{1B7760D4-FBD5-4B33-B612-888F248C1802}" dt="2018-05-15T20:00:16.554" v="10719" actId="2696"/>
         <pc:sldMkLst>
           <pc:docMk/>
           <pc:sldMk cId="2912880932" sldId="323"/>
@@ -2670,7 +3156,7 @@
           <pc:sldMk cId="1675721559" sldId="333"/>
         </pc:sldMkLst>
         <pc:spChg chg="del">
-          <ac:chgData name="Moritz Nipshagen" userId="ee3b3bbc25b4cb6d" providerId="LiveId" clId="{1B7760D4-FBD5-4B33-B612-888F248C1802}" dt="2018-05-15T22:45:38.342" v="13252"/>
+          <ac:chgData name="Moritz Nipshagen" userId="ee3b3bbc25b4cb6d" providerId="LiveId" clId="{1B7760D4-FBD5-4B33-B612-888F248C1802}" dt="2018-05-15T22:45:38.342" v="13252" actId="20577"/>
           <ac:spMkLst>
             <pc:docMk/>
             <pc:sldMk cId="1675721559" sldId="333"/>
@@ -2701,7 +3187,7 @@
           <pc:sldMk cId="2969409613" sldId="334"/>
         </pc:sldMkLst>
         <pc:spChg chg="del">
-          <ac:chgData name="Moritz Nipshagen" userId="ee3b3bbc25b4cb6d" providerId="LiveId" clId="{1B7760D4-FBD5-4B33-B612-888F248C1802}" dt="2018-05-16T07:18:33.035" v="14128"/>
+          <ac:chgData name="Moritz Nipshagen" userId="ee3b3bbc25b4cb6d" providerId="LiveId" clId="{1B7760D4-FBD5-4B33-B612-888F248C1802}" dt="2018-05-16T07:18:33.035" v="14128" actId="20577"/>
           <ac:spMkLst>
             <pc:docMk/>
             <pc:sldMk cId="2969409613" sldId="334"/>
@@ -2709,7 +3195,7 @@
           </ac:spMkLst>
         </pc:spChg>
         <pc:spChg chg="del">
-          <ac:chgData name="Moritz Nipshagen" userId="ee3b3bbc25b4cb6d" providerId="LiveId" clId="{1B7760D4-FBD5-4B33-B612-888F248C1802}" dt="2018-05-16T07:18:33.035" v="14128"/>
+          <ac:chgData name="Moritz Nipshagen" userId="ee3b3bbc25b4cb6d" providerId="LiveId" clId="{1B7760D4-FBD5-4B33-B612-888F248C1802}" dt="2018-05-16T07:18:33.035" v="14128" actId="20577"/>
           <ac:spMkLst>
             <pc:docMk/>
             <pc:sldMk cId="2969409613" sldId="334"/>
@@ -2717,7 +3203,7 @@
           </ac:spMkLst>
         </pc:spChg>
         <pc:spChg chg="add del mod">
-          <ac:chgData name="Moritz Nipshagen" userId="ee3b3bbc25b4cb6d" providerId="LiveId" clId="{1B7760D4-FBD5-4B33-B612-888F248C1802}" dt="2018-05-16T07:18:39.734" v="14129"/>
+          <ac:chgData name="Moritz Nipshagen" userId="ee3b3bbc25b4cb6d" providerId="LiveId" clId="{1B7760D4-FBD5-4B33-B612-888F248C1802}" dt="2018-05-16T07:18:39.734" v="14129" actId="20577"/>
           <ac:spMkLst>
             <pc:docMk/>
             <pc:sldMk cId="2969409613" sldId="334"/>
@@ -2725,7 +3211,7 @@
           </ac:spMkLst>
         </pc:spChg>
         <pc:spChg chg="add del mod">
-          <ac:chgData name="Moritz Nipshagen" userId="ee3b3bbc25b4cb6d" providerId="LiveId" clId="{1B7760D4-FBD5-4B33-B612-888F248C1802}" dt="2018-05-16T07:18:39.734" v="14129"/>
+          <ac:chgData name="Moritz Nipshagen" userId="ee3b3bbc25b4cb6d" providerId="LiveId" clId="{1B7760D4-FBD5-4B33-B612-888F248C1802}" dt="2018-05-16T07:18:39.734" v="14129" actId="20577"/>
           <ac:spMkLst>
             <pc:docMk/>
             <pc:sldMk cId="2969409613" sldId="334"/>
@@ -2733,7 +3219,7 @@
           </ac:spMkLst>
         </pc:spChg>
         <pc:spChg chg="add del mod">
-          <ac:chgData name="Moritz Nipshagen" userId="ee3b3bbc25b4cb6d" providerId="LiveId" clId="{1B7760D4-FBD5-4B33-B612-888F248C1802}" dt="2018-05-16T07:18:39.734" v="14129"/>
+          <ac:chgData name="Moritz Nipshagen" userId="ee3b3bbc25b4cb6d" providerId="LiveId" clId="{1B7760D4-FBD5-4B33-B612-888F248C1802}" dt="2018-05-16T07:18:39.734" v="14129" actId="20577"/>
           <ac:spMkLst>
             <pc:docMk/>
             <pc:sldMk cId="2969409613" sldId="334"/>
@@ -2741,7 +3227,7 @@
           </ac:spMkLst>
         </pc:spChg>
         <pc:spChg chg="add del mod">
-          <ac:chgData name="Moritz Nipshagen" userId="ee3b3bbc25b4cb6d" providerId="LiveId" clId="{1B7760D4-FBD5-4B33-B612-888F248C1802}" dt="2018-05-16T07:23:31.483" v="14154"/>
+          <ac:chgData name="Moritz Nipshagen" userId="ee3b3bbc25b4cb6d" providerId="LiveId" clId="{1B7760D4-FBD5-4B33-B612-888F248C1802}" dt="2018-05-16T07:23:31.483" v="14154" actId="20577"/>
           <ac:spMkLst>
             <pc:docMk/>
             <pc:sldMk cId="2969409613" sldId="334"/>
@@ -2749,7 +3235,7 @@
           </ac:spMkLst>
         </pc:spChg>
         <pc:spChg chg="add del mod">
-          <ac:chgData name="Moritz Nipshagen" userId="ee3b3bbc25b4cb6d" providerId="LiveId" clId="{1B7760D4-FBD5-4B33-B612-888F248C1802}" dt="2018-05-16T07:23:36.932" v="14157"/>
+          <ac:chgData name="Moritz Nipshagen" userId="ee3b3bbc25b4cb6d" providerId="LiveId" clId="{1B7760D4-FBD5-4B33-B612-888F248C1802}" dt="2018-05-16T07:23:36.932" v="14157" actId="20577"/>
           <ac:spMkLst>
             <pc:docMk/>
             <pc:sldMk cId="2969409613" sldId="334"/>
@@ -2757,7 +3243,7 @@
           </ac:spMkLst>
         </pc:spChg>
         <pc:spChg chg="add del mod">
-          <ac:chgData name="Moritz Nipshagen" userId="ee3b3bbc25b4cb6d" providerId="LiveId" clId="{1B7760D4-FBD5-4B33-B612-888F248C1802}" dt="2018-05-16T07:23:36.932" v="14157"/>
+          <ac:chgData name="Moritz Nipshagen" userId="ee3b3bbc25b4cb6d" providerId="LiveId" clId="{1B7760D4-FBD5-4B33-B612-888F248C1802}" dt="2018-05-16T07:23:36.932" v="14157" actId="20577"/>
           <ac:spMkLst>
             <pc:docMk/>
             <pc:sldMk cId="2969409613" sldId="334"/>
@@ -2773,7 +3259,7 @@
           </ac:spMkLst>
         </pc:spChg>
         <pc:spChg chg="add del mod">
-          <ac:chgData name="Moritz Nipshagen" userId="ee3b3bbc25b4cb6d" providerId="LiveId" clId="{1B7760D4-FBD5-4B33-B612-888F248C1802}" dt="2018-05-16T07:23:36.932" v="14157"/>
+          <ac:chgData name="Moritz Nipshagen" userId="ee3b3bbc25b4cb6d" providerId="LiveId" clId="{1B7760D4-FBD5-4B33-B612-888F248C1802}" dt="2018-05-16T07:23:36.932" v="14157" actId="20577"/>
           <ac:spMkLst>
             <pc:docMk/>
             <pc:sldMk cId="2969409613" sldId="334"/>
@@ -2781,7 +3267,7 @@
           </ac:spMkLst>
         </pc:spChg>
         <pc:spChg chg="add del mod">
-          <ac:chgData name="Moritz Nipshagen" userId="ee3b3bbc25b4cb6d" providerId="LiveId" clId="{1B7760D4-FBD5-4B33-B612-888F248C1802}" dt="2018-05-16T07:23:36.932" v="14157"/>
+          <ac:chgData name="Moritz Nipshagen" userId="ee3b3bbc25b4cb6d" providerId="LiveId" clId="{1B7760D4-FBD5-4B33-B612-888F248C1802}" dt="2018-05-16T07:23:36.932" v="14157" actId="20577"/>
           <ac:spMkLst>
             <pc:docMk/>
             <pc:sldMk cId="2969409613" sldId="334"/>
@@ -2820,7 +3306,7 @@
           </ac:spMkLst>
         </pc:spChg>
         <pc:spChg chg="mod">
-          <ac:chgData name="Moritz Nipshagen" userId="ee3b3bbc25b4cb6d" providerId="LiveId" clId="{1B7760D4-FBD5-4B33-B612-888F248C1802}" dt="2018-05-16T08:35:33.273" v="14535"/>
+          <ac:chgData name="Moritz Nipshagen" userId="ee3b3bbc25b4cb6d" providerId="LiveId" clId="{1B7760D4-FBD5-4B33-B612-888F248C1802}" dt="2018-05-16T08:35:33.273" v="14535" actId="20577"/>
           <ac:spMkLst>
             <pc:docMk/>
             <pc:sldMk cId="3366241059" sldId="335"/>
@@ -2858,7 +3344,7 @@
           <pc:sldMk cId="2921656858" sldId="337"/>
         </pc:sldMkLst>
         <pc:spChg chg="del">
-          <ac:chgData name="Moritz Nipshagen" userId="ee3b3bbc25b4cb6d" providerId="LiveId" clId="{1B7760D4-FBD5-4B33-B612-888F248C1802}" dt="2018-05-16T08:47:18.512" v="15432"/>
+          <ac:chgData name="Moritz Nipshagen" userId="ee3b3bbc25b4cb6d" providerId="LiveId" clId="{1B7760D4-FBD5-4B33-B612-888F248C1802}" dt="2018-05-16T08:47:18.512" v="15432" actId="14100"/>
           <ac:spMkLst>
             <pc:docMk/>
             <pc:sldMk cId="2921656858" sldId="337"/>
@@ -2866,7 +3352,7 @@
           </ac:spMkLst>
         </pc:spChg>
         <pc:spChg chg="del">
-          <ac:chgData name="Moritz Nipshagen" userId="ee3b3bbc25b4cb6d" providerId="LiveId" clId="{1B7760D4-FBD5-4B33-B612-888F248C1802}" dt="2018-05-16T08:47:18.512" v="15432"/>
+          <ac:chgData name="Moritz Nipshagen" userId="ee3b3bbc25b4cb6d" providerId="LiveId" clId="{1B7760D4-FBD5-4B33-B612-888F248C1802}" dt="2018-05-16T08:47:18.512" v="15432" actId="14100"/>
           <ac:spMkLst>
             <pc:docMk/>
             <pc:sldMk cId="2921656858" sldId="337"/>
@@ -2905,7 +3391,7 @@
           <pc:sldMk cId="2567793936" sldId="338"/>
         </pc:sldMkLst>
         <pc:spChg chg="del">
-          <ac:chgData name="Moritz Nipshagen" userId="ee3b3bbc25b4cb6d" providerId="LiveId" clId="{1B7760D4-FBD5-4B33-B612-888F248C1802}" dt="2018-05-16T08:56:57.556" v="15906"/>
+          <ac:chgData name="Moritz Nipshagen" userId="ee3b3bbc25b4cb6d" providerId="LiveId" clId="{1B7760D4-FBD5-4B33-B612-888F248C1802}" dt="2018-05-16T08:56:57.556" v="15906" actId="20577"/>
           <ac:spMkLst>
             <pc:docMk/>
             <pc:sldMk cId="2567793936" sldId="338"/>
@@ -2913,7 +3399,7 @@
           </ac:spMkLst>
         </pc:spChg>
         <pc:spChg chg="del">
-          <ac:chgData name="Moritz Nipshagen" userId="ee3b3bbc25b4cb6d" providerId="LiveId" clId="{1B7760D4-FBD5-4B33-B612-888F248C1802}" dt="2018-05-16T08:56:57.556" v="15906"/>
+          <ac:chgData name="Moritz Nipshagen" userId="ee3b3bbc25b4cb6d" providerId="LiveId" clId="{1B7760D4-FBD5-4B33-B612-888F248C1802}" dt="2018-05-16T08:56:57.556" v="15906" actId="20577"/>
           <ac:spMkLst>
             <pc:docMk/>
             <pc:sldMk cId="2567793936" sldId="338"/>
@@ -2921,7 +3407,7 @@
           </ac:spMkLst>
         </pc:spChg>
         <pc:spChg chg="del">
-          <ac:chgData name="Moritz Nipshagen" userId="ee3b3bbc25b4cb6d" providerId="LiveId" clId="{1B7760D4-FBD5-4B33-B612-888F248C1802}" dt="2018-05-16T08:56:57.556" v="15906"/>
+          <ac:chgData name="Moritz Nipshagen" userId="ee3b3bbc25b4cb6d" providerId="LiveId" clId="{1B7760D4-FBD5-4B33-B612-888F248C1802}" dt="2018-05-16T08:56:57.556" v="15906" actId="20577"/>
           <ac:spMkLst>
             <pc:docMk/>
             <pc:sldMk cId="2567793936" sldId="338"/>
@@ -2937,7 +3423,7 @@
           </ac:spMkLst>
         </pc:spChg>
         <pc:spChg chg="add mod">
-          <ac:chgData name="Moritz Nipshagen" userId="ee3b3bbc25b4cb6d" providerId="LiveId" clId="{1B7760D4-FBD5-4B33-B612-888F248C1802}" dt="2018-05-16T08:59:41.697" v="16077"/>
+          <ac:chgData name="Moritz Nipshagen" userId="ee3b3bbc25b4cb6d" providerId="LiveId" clId="{1B7760D4-FBD5-4B33-B612-888F248C1802}" dt="2018-05-16T08:59:41.697" v="16077" actId="20577"/>
           <ac:spMkLst>
             <pc:docMk/>
             <pc:sldMk cId="2567793936" sldId="338"/>
@@ -2969,7 +3455,7 @@
         </pc:spChg>
       </pc:sldChg>
       <pc:sldChg chg="addSp modSp add">
-        <pc:chgData name="Moritz Nipshagen" userId="ee3b3bbc25b4cb6d" providerId="LiveId" clId="{1B7760D4-FBD5-4B33-B612-888F248C1802}" dt="2018-05-16T09:12:33.577" v="17105"/>
+        <pc:chgData name="Moritz Nipshagen" userId="ee3b3bbc25b4cb6d" providerId="LiveId" clId="{1B7760D4-FBD5-4B33-B612-888F248C1802}" dt="2018-05-16T09:12:33.577" v="17105" actId="2696"/>
         <pc:sldMkLst>
           <pc:docMk/>
           <pc:sldMk cId="1533185735" sldId="340"/>
@@ -2983,7 +3469,7 @@
           </ac:spMkLst>
         </pc:spChg>
         <pc:spChg chg="mod">
-          <ac:chgData name="Moritz Nipshagen" userId="ee3b3bbc25b4cb6d" providerId="LiveId" clId="{1B7760D4-FBD5-4B33-B612-888F248C1802}" dt="2018-05-16T09:12:33.577" v="17105"/>
+          <ac:chgData name="Moritz Nipshagen" userId="ee3b3bbc25b4cb6d" providerId="LiveId" clId="{1B7760D4-FBD5-4B33-B612-888F248C1802}" dt="2018-05-16T09:12:33.577" v="17105" actId="2696"/>
           <ac:spMkLst>
             <pc:docMk/>
             <pc:sldMk cId="1533185735" sldId="340"/>
@@ -3143,11 +3629,50 @@
 </p:cmLst>
 </file>
 
-<file path=ppt/comments/comment2.xml><?xml version="1.0" encoding="utf-8"?>
+<file path=ppt/comments/comment10.xml><?xml version="1.0" encoding="utf-8"?>
 <p:cmLst xmlns:a="http://schemas.openxmlformats.org/drawingml/2006/main" xmlns:r="http://schemas.openxmlformats.org/officeDocument/2006/relationships" xmlns:p="http://schemas.openxmlformats.org/presentationml/2006/main">
-  <p:cm authorId="1" dt="2018-05-13T09:31:16.757" idx="2">
+  <p:cm authorId="1" dt="2018-05-16T10:02:35.938" idx="11">
     <p:pos x="10" y="10"/>
-    <p:text>könntest ja noch an den error stream anknüpfen der letzte woche erwähnt wurde</p:text>
+    <p:text>example: closing files?</p:text>
+    <p:extLst>
+      <p:ext uri="{C676402C-5697-4E1C-873F-D02D1690AC5C}">
+        <p15:threadingInfo xmlns:p15="http://schemas.microsoft.com/office/powerpoint/2012/main" timeZoneBias="0"/>
+      </p:ext>
+    </p:extLst>
+  </p:cm>
+  <p:cm authorId="1" dt="2018-05-16T10:03:01.609" idx="13">
+    <p:pos x="10" y="146"/>
+    <p:text>*switches to next slide* nvm lol</p:text>
+    <p:extLst>
+      <p:ext uri="{C676402C-5697-4E1C-873F-D02D1690AC5C}">
+        <p15:threadingInfo xmlns:p15="http://schemas.microsoft.com/office/powerpoint/2012/main" timeZoneBias="0">
+          <p15:parentCm authorId="1" idx="11"/>
+        </p15:threadingInfo>
+      </p:ext>
+    </p:extLst>
+  </p:cm>
+</p:cmLst>
+</file>
+
+<file path=ppt/comments/comment11.xml><?xml version="1.0" encoding="utf-8"?>
+<p:cmLst xmlns:a="http://schemas.openxmlformats.org/drawingml/2006/main" xmlns:r="http://schemas.openxmlformats.org/officeDocument/2006/relationships" xmlns:p="http://schemas.openxmlformats.org/presentationml/2006/main">
+  <p:cm authorId="1" dt="2018-05-16T10:07:36.500" idx="15">
+    <p:pos x="6479" y="2937"/>
+    <p:text>but it doesn't really use try-except-finally, does it? thought it implements __init__, __enter__, __exit__ or smth</p:text>
+    <p:extLst mod="1">
+      <p:ext uri="{C676402C-5697-4E1C-873F-D02D1690AC5C}">
+        <p15:threadingInfo xmlns:p15="http://schemas.microsoft.com/office/powerpoint/2012/main" timeZoneBias="0"/>
+      </p:ext>
+    </p:extLst>
+  </p:cm>
+</p:cmLst>
+</file>
+
+<file path=ppt/comments/comment12.xml><?xml version="1.0" encoding="utf-8"?>
+<p:cmLst xmlns:a="http://schemas.openxmlformats.org/drawingml/2006/main" xmlns:r="http://schemas.openxmlformats.org/officeDocument/2006/relationships" xmlns:p="http://schemas.openxmlformats.org/presentationml/2006/main">
+  <p:cm authorId="1" dt="2018-05-16T10:09:01.500" idx="16">
+    <p:pos x="10" y="10"/>
+    <p:text>da du es jetzt auf einmal "catch" nennst sollte man zumindest vorher erwähnt haben dass es oft try-catch heißt in anderen sprachen</p:text>
     <p:extLst>
       <p:ext uri="{C676402C-5697-4E1C-873F-D02D1690AC5C}">
         <p15:threadingInfo xmlns:p15="http://schemas.microsoft.com/office/powerpoint/2012/main" timeZoneBias="0"/>
@@ -3157,63 +3682,7 @@
 </p:cmLst>
 </file>
 
-<file path=ppt/comments/comment3.xml><?xml version="1.0" encoding="utf-8"?>
-<p:cmLst xmlns:a="http://schemas.openxmlformats.org/drawingml/2006/main" xmlns:r="http://schemas.openxmlformats.org/officeDocument/2006/relationships" xmlns:p="http://schemas.openxmlformats.org/presentationml/2006/main">
-  <p:cm authorId="1" dt="2018-05-13T09:32:18.116" idx="3">
-    <p:pos x="10" y="10"/>
-    <p:text>ich denke du willst hier einige typische errors vorstellen? denke da kann ich ein paar konstruieren</p:text>
-    <p:extLst>
-      <p:ext uri="{C676402C-5697-4E1C-873F-D02D1690AC5C}">
-        <p15:threadingInfo xmlns:p15="http://schemas.microsoft.com/office/powerpoint/2012/main" timeZoneBias="0"/>
-      </p:ext>
-    </p:extLst>
-  </p:cm>
-</p:cmLst>
-</file>
-
-<file path=ppt/comments/comment4.xml><?xml version="1.0" encoding="utf-8"?>
-<p:cmLst xmlns:a="http://schemas.openxmlformats.org/drawingml/2006/main" xmlns:r="http://schemas.openxmlformats.org/officeDocument/2006/relationships" xmlns:p="http://schemas.openxmlformats.org/presentationml/2006/main">
-  <p:cm authorId="1" dt="2018-05-15T12:45:25.944" idx="6">
-    <p:pos x="10" y="10"/>
-    <p:text>these slides are too packed, will need to be split up</p:text>
-    <p:extLst>
-      <p:ext uri="{C676402C-5697-4E1C-873F-D02D1690AC5C}">
-        <p15:threadingInfo xmlns:p15="http://schemas.microsoft.com/office/powerpoint/2012/main" timeZoneBias="0"/>
-      </p:ext>
-    </p:extLst>
-  </p:cm>
-</p:cmLst>
-</file>
-
-<file path=ppt/comments/comment5.xml><?xml version="1.0" encoding="utf-8"?>
-<p:cmLst xmlns:a="http://schemas.openxmlformats.org/drawingml/2006/main" xmlns:r="http://schemas.openxmlformats.org/officeDocument/2006/relationships" xmlns:p="http://schemas.openxmlformats.org/presentationml/2006/main">
-  <p:cm authorId="1" dt="2018-05-13T09:32:51.084" idx="4">
-    <p:pos x="10" y="10"/>
-    <p:text>würde hier passend zu den genannten errors nochmal einige beispiele aufgreifen und zeigen wie die zu fixen sind? das könnt ich dann auch machen</p:text>
-    <p:extLst mod="1">
-      <p:ext uri="{C676402C-5697-4E1C-873F-D02D1690AC5C}">
-        <p15:threadingInfo xmlns:p15="http://schemas.microsoft.com/office/powerpoint/2012/main" timeZoneBias="0"/>
-      </p:ext>
-    </p:extLst>
-  </p:cm>
-</p:cmLst>
-</file>
-
-<file path=ppt/comments/comment6.xml><?xml version="1.0" encoding="utf-8"?>
-<p:cmLst xmlns:a="http://schemas.openxmlformats.org/drawingml/2006/main" xmlns:r="http://schemas.openxmlformats.org/officeDocument/2006/relationships" xmlns:p="http://schemas.openxmlformats.org/presentationml/2006/main">
-  <p:cm authorId="2" dt="2018-05-14T00:09:35.347" idx="4">
-    <p:pos x="10" y="10"/>
-    <p:text>Maybe we should move this into OOP, as inheritance is necessary for this</p:text>
-    <p:extLst>
-      <p:ext uri="{C676402C-5697-4E1C-873F-D02D1690AC5C}">
-        <p15:threadingInfo xmlns:p15="http://schemas.microsoft.com/office/powerpoint/2012/main" timeZoneBias="-120"/>
-      </p:ext>
-    </p:extLst>
-  </p:cm>
-</p:cmLst>
-</file>
-
-<file path=ppt/comments/comment7.xml><?xml version="1.0" encoding="utf-8"?>
+<file path=ppt/comments/comment13.xml><?xml version="1.0" encoding="utf-8"?>
 <p:cmLst xmlns:a="http://schemas.openxmlformats.org/drawingml/2006/main" xmlns:r="http://schemas.openxmlformats.org/officeDocument/2006/relationships" xmlns:p="http://schemas.openxmlformats.org/presentationml/2006/main">
   <p:cm authorId="1" dt="2018-05-13T09:34:13.646" idx="5">
     <p:pos x="10" y="10"/>
@@ -3232,6 +3701,168 @@
         <p15:threadingInfo xmlns:p15="http://schemas.microsoft.com/office/powerpoint/2012/main" timeZoneBias="-120">
           <p15:parentCm authorId="1" idx="5"/>
         </p15:threadingInfo>
+      </p:ext>
+    </p:extLst>
+  </p:cm>
+</p:cmLst>
+</file>
+
+<file path=ppt/comments/comment14.xml><?xml version="1.0" encoding="utf-8"?>
+<p:cmLst xmlns:a="http://schemas.openxmlformats.org/drawingml/2006/main" xmlns:r="http://schemas.openxmlformats.org/officeDocument/2006/relationships" xmlns:p="http://schemas.openxmlformats.org/presentationml/2006/main">
+  <p:cm authorId="1" dt="2018-05-16T10:09:58.703" idx="17">
+    <p:pos x="10" y="10"/>
+    <p:text>would emphasize the last one strongly</p:text>
+    <p:extLst>
+      <p:ext uri="{C676402C-5697-4E1C-873F-D02D1690AC5C}">
+        <p15:threadingInfo xmlns:p15="http://schemas.microsoft.com/office/powerpoint/2012/main" timeZoneBias="0"/>
+      </p:ext>
+    </p:extLst>
+  </p:cm>
+</p:cmLst>
+</file>
+
+<file path=ppt/comments/comment15.xml><?xml version="1.0" encoding="utf-8"?>
+<p:cmLst xmlns:a="http://schemas.openxmlformats.org/drawingml/2006/main" xmlns:r="http://schemas.openxmlformats.org/officeDocument/2006/relationships" xmlns:p="http://schemas.openxmlformats.org/presentationml/2006/main">
+  <p:cm authorId="1" dt="2018-05-16T10:10:40.047" idx="18">
+    <p:pos x="4966" y="2712"/>
+    <p:text>elaborative or elaborate?</p:text>
+    <p:extLst>
+      <p:ext uri="{C676402C-5697-4E1C-873F-D02D1690AC5C}">
+        <p15:threadingInfo xmlns:p15="http://schemas.microsoft.com/office/powerpoint/2012/main" timeZoneBias="0"/>
+      </p:ext>
+    </p:extLst>
+  </p:cm>
+  <p:cm authorId="2" dt="2018-05-16T12:12:26.074" idx="6">
+    <p:pos x="4966" y="2848"/>
+    <p:text>elaborative. it's an adjective.</p:text>
+    <p:extLst>
+      <p:ext uri="{C676402C-5697-4E1C-873F-D02D1690AC5C}">
+        <p15:threadingInfo xmlns:p15="http://schemas.microsoft.com/office/powerpoint/2012/main" timeZoneBias="-120">
+          <p15:parentCm authorId="1" idx="18"/>
+        </p15:threadingInfo>
+      </p:ext>
+    </p:extLst>
+  </p:cm>
+</p:cmLst>
+</file>
+
+<file path=ppt/comments/comment2.xml><?xml version="1.0" encoding="utf-8"?>
+<p:cmLst xmlns:a="http://schemas.openxmlformats.org/drawingml/2006/main" xmlns:r="http://schemas.openxmlformats.org/officeDocument/2006/relationships" xmlns:p="http://schemas.openxmlformats.org/presentationml/2006/main">
+  <p:cm authorId="1" dt="2018-05-16T09:44:37.718" idx="7">
+    <p:pos x="10" y="28"/>
+    <p:text>show &amp; explain in parts the whole definition? was soll das genau heißen? die komplette definition schritt für schritt erklären?</p:text>
+    <p:extLst mod="1">
+      <p:ext uri="{C676402C-5697-4E1C-873F-D02D1690AC5C}">
+        <p15:threadingInfo xmlns:p15="http://schemas.microsoft.com/office/powerpoint/2012/main" timeZoneBias="0"/>
+      </p:ext>
+    </p:extLst>
+  </p:cm>
+</p:cmLst>
+</file>
+
+<file path=ppt/comments/comment3.xml><?xml version="1.0" encoding="utf-8"?>
+<p:cmLst xmlns:a="http://schemas.openxmlformats.org/drawingml/2006/main" xmlns:r="http://schemas.openxmlformats.org/officeDocument/2006/relationships" xmlns:p="http://schemas.openxmlformats.org/presentationml/2006/main">
+  <p:cm authorId="1" dt="2018-05-13T09:31:16.757" idx="2">
+    <p:pos x="10" y="10"/>
+    <p:text>könntest ja noch an den error stream anknüpfen der letzte woche erwähnt wurde</p:text>
+    <p:extLst>
+      <p:ext uri="{C676402C-5697-4E1C-873F-D02D1690AC5C}">
+        <p15:threadingInfo xmlns:p15="http://schemas.microsoft.com/office/powerpoint/2012/main" timeZoneBias="0"/>
+      </p:ext>
+    </p:extLst>
+  </p:cm>
+</p:cmLst>
+</file>
+
+<file path=ppt/comments/comment4.xml><?xml version="1.0" encoding="utf-8"?>
+<p:cmLst xmlns:a="http://schemas.openxmlformats.org/drawingml/2006/main" xmlns:r="http://schemas.openxmlformats.org/officeDocument/2006/relationships" xmlns:p="http://schemas.openxmlformats.org/presentationml/2006/main">
+  <p:cm authorId="1" dt="2018-05-13T09:32:18.116" idx="3">
+    <p:pos x="10" y="10"/>
+    <p:text>ich denke du willst hier einige typische errors vorstellen? denke da kann ich ein paar konstruieren</p:text>
+    <p:extLst>
+      <p:ext uri="{C676402C-5697-4E1C-873F-D02D1690AC5C}">
+        <p15:threadingInfo xmlns:p15="http://schemas.microsoft.com/office/powerpoint/2012/main" timeZoneBias="0"/>
+      </p:ext>
+    </p:extLst>
+  </p:cm>
+</p:cmLst>
+</file>
+
+<file path=ppt/comments/comment5.xml><?xml version="1.0" encoding="utf-8"?>
+<p:cmLst xmlns:a="http://schemas.openxmlformats.org/drawingml/2006/main" xmlns:r="http://schemas.openxmlformats.org/officeDocument/2006/relationships" xmlns:p="http://schemas.openxmlformats.org/presentationml/2006/main">
+  <p:cm authorId="1" dt="2018-05-15T12:45:25.944" idx="6">
+    <p:pos x="10" y="10"/>
+    <p:text>these slides are too packed, will need to be split up</p:text>
+    <p:extLst>
+      <p:ext uri="{C676402C-5697-4E1C-873F-D02D1690AC5C}">
+        <p15:threadingInfo xmlns:p15="http://schemas.microsoft.com/office/powerpoint/2012/main" timeZoneBias="0"/>
+      </p:ext>
+    </p:extLst>
+  </p:cm>
+</p:cmLst>
+</file>
+
+<file path=ppt/comments/comment6.xml><?xml version="1.0" encoding="utf-8"?>
+<p:cmLst xmlns:a="http://schemas.openxmlformats.org/drawingml/2006/main" xmlns:r="http://schemas.openxmlformats.org/officeDocument/2006/relationships" xmlns:p="http://schemas.openxmlformats.org/presentationml/2006/main">
+  <p:cm authorId="1" dt="2018-05-16T09:51:44.050" idx="8">
+    <p:pos x="10" y="10"/>
+    <p:text>die ersten beiden zeilen klingen bisschen "doppelt gemoppelt"</p:text>
+    <p:extLst>
+      <p:ext uri="{C676402C-5697-4E1C-873F-D02D1690AC5C}">
+        <p15:threadingInfo xmlns:p15="http://schemas.microsoft.com/office/powerpoint/2012/main" timeZoneBias="0"/>
+      </p:ext>
+    </p:extLst>
+  </p:cm>
+</p:cmLst>
+</file>
+
+<file path=ppt/comments/comment7.xml><?xml version="1.0" encoding="utf-8"?>
+<p:cmLst xmlns:a="http://schemas.openxmlformats.org/drawingml/2006/main" xmlns:r="http://schemas.openxmlformats.org/officeDocument/2006/relationships" xmlns:p="http://schemas.openxmlformats.org/presentationml/2006/main">
+  <p:cm authorId="1" dt="2018-05-13T09:32:51.084" idx="4">
+    <p:pos x="10" y="10"/>
+    <p:text>würde hier passend zu den genannten errors nochmal einige beispiele aufgreifen und zeigen wie die zu fixen sind? das könnt ich dann auch machen</p:text>
+    <p:extLst mod="1">
+      <p:ext uri="{C676402C-5697-4E1C-873F-D02D1690AC5C}">
+        <p15:threadingInfo xmlns:p15="http://schemas.microsoft.com/office/powerpoint/2012/main" timeZoneBias="0"/>
+      </p:ext>
+    </p:extLst>
+  </p:cm>
+</p:cmLst>
+</file>
+
+<file path=ppt/comments/comment8.xml><?xml version="1.0" encoding="utf-8"?>
+<p:cmLst xmlns:a="http://schemas.openxmlformats.org/drawingml/2006/main" xmlns:r="http://schemas.openxmlformats.org/officeDocument/2006/relationships" xmlns:p="http://schemas.openxmlformats.org/presentationml/2006/main">
+  <p:cm authorId="1" dt="2018-05-16T09:55:14.325" idx="9">
+    <p:pos x="10" y="10"/>
+    <p:text>die slide muss vermutlich noch raus?</p:text>
+    <p:extLst>
+      <p:ext uri="{C676402C-5697-4E1C-873F-D02D1690AC5C}">
+        <p15:threadingInfo xmlns:p15="http://schemas.microsoft.com/office/powerpoint/2012/main" timeZoneBias="0"/>
+      </p:ext>
+    </p:extLst>
+  </p:cm>
+  <p:cm authorId="2" dt="2018-05-16T11:59:43.845" idx="5">
+    <p:pos x="10" y="146"/>
+    <p:text>why?</p:text>
+    <p:extLst>
+      <p:ext uri="{C676402C-5697-4E1C-873F-D02D1690AC5C}">
+        <p15:threadingInfo xmlns:p15="http://schemas.microsoft.com/office/powerpoint/2012/main" timeZoneBias="-120">
+          <p15:parentCm authorId="1" idx="9"/>
+        </p15:threadingInfo>
+      </p:ext>
+    </p:extLst>
+  </p:cm>
+</p:cmLst>
+</file>
+
+<file path=ppt/comments/comment9.xml><?xml version="1.0" encoding="utf-8"?>
+<p:cmLst xmlns:a="http://schemas.openxmlformats.org/drawingml/2006/main" xmlns:r="http://schemas.openxmlformats.org/officeDocument/2006/relationships" xmlns:p="http://schemas.openxmlformats.org/presentationml/2006/main">
+  <p:cm authorId="1" dt="2018-05-16T09:59:46.985" idx="10">
+    <p:pos x="10" y="10"/>
+    <p:text>warum ist das expect markiert? für mich suggeriert das irgendwie, der block würde "expect" und nicht "except" heißen :D</p:text>
+    <p:extLst>
+      <p:ext uri="{C676402C-5697-4E1C-873F-D02D1690AC5C}">
+        <p15:threadingInfo xmlns:p15="http://schemas.microsoft.com/office/powerpoint/2012/main" timeZoneBias="0"/>
       </p:ext>
     </p:extLst>
   </p:cm>
@@ -3589,6 +4220,90 @@
 </file>
 
 <file path=ppt/notesSlides/notesSlide1.xml><?xml version="1.0" encoding="utf-8"?>
+<p:notes xmlns:a="http://schemas.openxmlformats.org/drawingml/2006/main" xmlns:r="http://schemas.openxmlformats.org/officeDocument/2006/relationships" xmlns:p="http://schemas.openxmlformats.org/presentationml/2006/main">
+  <p:cSld>
+    <p:spTree>
+      <p:nvGrpSpPr>
+        <p:cNvPr id="1" name=""/>
+        <p:cNvGrpSpPr/>
+        <p:nvPr/>
+      </p:nvGrpSpPr>
+      <p:grpSpPr>
+        <a:xfrm>
+          <a:off x="0" y="0"/>
+          <a:ext cx="0" cy="0"/>
+          <a:chOff x="0" y="0"/>
+          <a:chExt cx="0" cy="0"/>
+        </a:xfrm>
+      </p:grpSpPr>
+      <p:sp>
+        <p:nvSpPr>
+          <p:cNvPr id="2" name="Slide Image Placeholder 1"/>
+          <p:cNvSpPr>
+            <a:spLocks noGrp="1" noRot="1" noChangeAspect="1"/>
+          </p:cNvSpPr>
+          <p:nvPr>
+            <p:ph type="sldImg"/>
+          </p:nvPr>
+        </p:nvSpPr>
+        <p:spPr/>
+      </p:sp>
+      <p:sp>
+        <p:nvSpPr>
+          <p:cNvPr id="3" name="Notes Placeholder 2"/>
+          <p:cNvSpPr>
+            <a:spLocks noGrp="1"/>
+          </p:cNvSpPr>
+          <p:nvPr>
+            <p:ph type="body" idx="1"/>
+          </p:nvPr>
+        </p:nvSpPr>
+        <p:spPr/>
+        <p:txBody>
+          <a:bodyPr/>
+          <a:lstStyle/>
+          <a:p>
+            <a:endParaRPr lang="en-GB" dirty="0"/>
+          </a:p>
+        </p:txBody>
+      </p:sp>
+      <p:sp>
+        <p:nvSpPr>
+          <p:cNvPr id="4" name="Slide Number Placeholder 3"/>
+          <p:cNvSpPr>
+            <a:spLocks noGrp="1"/>
+          </p:cNvSpPr>
+          <p:nvPr>
+            <p:ph type="sldNum" sz="quarter" idx="10"/>
+          </p:nvPr>
+        </p:nvSpPr>
+        <p:spPr/>
+        <p:txBody>
+          <a:bodyPr/>
+          <a:lstStyle/>
+          <a:p>
+            <a:fld id="{42145966-3644-4EF3-8D3C-4E37A0E97571}" type="slidenum">
+              <a:rPr lang="en-GB" smtClean="0"/>
+              <a:t>4</a:t>
+            </a:fld>
+            <a:endParaRPr lang="en-GB"/>
+          </a:p>
+        </p:txBody>
+      </p:sp>
+    </p:spTree>
+    <p:extLst>
+      <p:ext uri="{BB962C8B-B14F-4D97-AF65-F5344CB8AC3E}">
+        <p14:creationId xmlns:p14="http://schemas.microsoft.com/office/powerpoint/2010/main" val="1242264886"/>
+      </p:ext>
+    </p:extLst>
+  </p:cSld>
+  <p:clrMapOvr>
+    <a:masterClrMapping/>
+  </p:clrMapOvr>
+</p:notes>
+</file>
+
+<file path=ppt/notesSlides/notesSlide2.xml><?xml version="1.0" encoding="utf-8"?>
 <p:notes xmlns:a="http://schemas.openxmlformats.org/drawingml/2006/main" xmlns:r="http://schemas.openxmlformats.org/officeDocument/2006/relationships" xmlns:p="http://schemas.openxmlformats.org/presentationml/2006/main">
   <p:cSld>
     <p:spTree>
@@ -15106,6 +15821,38 @@
               <a:t>End Of File. This appears in error messages when the file ended, but the parses expected code</a:t>
             </a:r>
           </a:p>
+          <a:p>
+            <a:r>
+              <a:rPr lang="en-GB" dirty="0"/>
+              <a:t>Last week we talked about the streams </a:t>
+            </a:r>
+            <a:r>
+              <a:rPr lang="en-GB" dirty="0" err="1"/>
+              <a:t>stdout</a:t>
+            </a:r>
+            <a:r>
+              <a:rPr lang="en-GB" dirty="0"/>
+              <a:t> and stderr</a:t>
+            </a:r>
+          </a:p>
+          <a:p>
+            <a:pPr lvl="1"/>
+            <a:r>
+              <a:rPr lang="en-GB" dirty="0" err="1"/>
+              <a:t>stdout</a:t>
+            </a:r>
+            <a:r>
+              <a:rPr lang="en-GB" dirty="0"/>
+              <a:t> is used for all kinds of output and usually errors are printed to stderr</a:t>
+            </a:r>
+          </a:p>
+          <a:p>
+            <a:pPr lvl="1"/>
+            <a:r>
+              <a:rPr lang="en-GB" dirty="0"/>
+              <a:t>Sometimes a terminal will show stderr in a different colour (mostly red)</a:t>
+            </a:r>
+          </a:p>
         </p:txBody>
       </p:sp>
       <p:sp>
@@ -18245,7 +18992,7 @@
           <a:p>
             <a:pPr marL="182245" indent="-182245"/>
             <a:r>
-              <a:rPr lang="de-DE" err="1">
+              <a:rPr lang="de-DE" dirty="0" err="1">
                 <a:cs typeface="Calibri"/>
               </a:rPr>
               <a:t>Using</a:t>
@@ -18257,7 +19004,7 @@
               <a:t> </a:t>
             </a:r>
             <a:r>
-              <a:rPr lang="de-DE" err="1">
+              <a:rPr lang="de-DE" dirty="0" err="1">
                 <a:cs typeface="Calibri"/>
               </a:rPr>
               <a:t>too</a:t>
@@ -18269,7 +19016,7 @@
               <a:t> </a:t>
             </a:r>
             <a:r>
-              <a:rPr lang="de-DE" err="1">
+              <a:rPr lang="de-DE" dirty="0" err="1">
                 <a:cs typeface="Calibri"/>
               </a:rPr>
               <a:t>many</a:t>
@@ -18281,10 +19028,10 @@
               <a:t> </a:t>
             </a:r>
             <a:r>
-              <a:rPr lang="de-DE" err="1">
-                <a:cs typeface="Calibri"/>
-              </a:rPr>
-              <a:t>parenthesis</a:t>
+              <a:rPr lang="de-DE" dirty="0" err="1">
+                <a:cs typeface="Calibri"/>
+              </a:rPr>
+              <a:t>parentheses</a:t>
             </a:r>
             <a:r>
               <a:rPr lang="de-DE" dirty="0">
@@ -18293,7 +19040,7 @@
               <a:t> </a:t>
             </a:r>
             <a:r>
-              <a:rPr lang="de-DE" err="1">
+              <a:rPr lang="de-DE" dirty="0" err="1">
                 <a:cs typeface="Calibri"/>
               </a:rPr>
               <a:t>is</a:t>
@@ -22463,7 +23210,12 @@
             <p:ph idx="1"/>
           </p:nvPr>
         </p:nvSpPr>
-        <p:spPr/>
+        <p:spPr>
+          <a:xfrm>
+            <a:off x="1097280" y="1845734"/>
+            <a:ext cx="10058400" cy="4023360"/>
+          </a:xfrm>
+        </p:spPr>
         <p:txBody>
           <a:bodyPr vert="horz" lIns="0" tIns="45720" rIns="0" bIns="45720" rtlCol="0" anchor="t">
             <a:normAutofit/>
@@ -22493,20 +23245,20 @@
               <a:rPr lang="en-GB" dirty="0">
                 <a:cs typeface="Calibri"/>
               </a:rPr>
-              <a:t>As the name implies, they occur when there is either too much indentation or indentation missing</a:t>
-            </a:r>
-          </a:p>
-          <a:p>
-            <a:pPr marL="182245" indent="-182245"/>
-            <a:r>
-              <a:rPr lang="en-GB" dirty="0">
-                <a:solidFill>
-                  <a:srgbClr val="FF0000"/>
-                </a:solidFill>
-                <a:cs typeface="Calibri"/>
-              </a:rPr>
-              <a:t>screenshot</a:t>
-            </a:r>
+              <a:t>As the name implies, they occur when there is either too much indentation or </a:t>
+            </a:r>
+            <a:r>
+              <a:rPr lang="en-GB">
+                <a:cs typeface="Calibri"/>
+              </a:rPr>
+              <a:t>indentation missing</a:t>
+            </a:r>
+            <a:endParaRPr lang="en-GB" dirty="0">
+              <a:solidFill>
+                <a:srgbClr val="FF0000"/>
+              </a:solidFill>
+              <a:cs typeface="Calibri"/>
+            </a:endParaRPr>
           </a:p>
         </p:txBody>
       </p:sp>
@@ -25432,13 +26184,13 @@
         </p:nvSpPr>
         <p:spPr>
           <a:xfrm>
-            <a:off x="1097280" y="5698865"/>
-            <a:ext cx="10058400" cy="500908"/>
+            <a:off x="1097280" y="5325054"/>
+            <a:ext cx="10058400" cy="874719"/>
           </a:xfrm>
         </p:spPr>
         <p:txBody>
           <a:bodyPr vert="horz" lIns="0" tIns="45720" rIns="0" bIns="45720" rtlCol="0" anchor="t">
-            <a:normAutofit fontScale="70000" lnSpcReduction="20000"/>
+            <a:normAutofit fontScale="92500"/>
           </a:bodyPr>
           <a:lstStyle/>
           <a:p>
@@ -25545,7 +26297,7 @@
         <p:spPr>
           <a:xfrm>
             <a:off x="1104099" y="1735948"/>
-            <a:ext cx="10073517" cy="3970318"/>
+            <a:ext cx="10073517" cy="3539430"/>
           </a:xfrm>
           <a:prstGeom prst="rect">
             <a:avLst/>
@@ -25563,54 +26315,50 @@
           <a:lstStyle/>
           <a:p>
             <a:r>
-              <a:rPr lang="en-GB">
+              <a:rPr lang="en-GB" sz="1600" dirty="0">
                 <a:latin typeface="Consolas" panose="020B0609020204030204" pitchFamily="49" charset="0"/>
               </a:rPr>
               <a:t>b = 5 &gt; 3</a:t>
             </a:r>
-            <a:endParaRPr lang="de-DE"/>
-          </a:p>
-          <a:p>
-            <a:endParaRPr lang="de-DE"/>
-          </a:p>
-          <a:p>
-            <a:r>
-              <a:rPr lang="en-GB">
+            <a:endParaRPr lang="de-DE" sz="1600" dirty="0">
+              <a:cs typeface="Calibri"/>
+            </a:endParaRPr>
+          </a:p>
+          <a:p>
+            <a:endParaRPr lang="de-DE" sz="1600" dirty="0">
+              <a:cs typeface="Calibri"/>
+            </a:endParaRPr>
+          </a:p>
+          <a:p>
+            <a:r>
+              <a:rPr lang="en-GB" sz="1600" dirty="0">
                 <a:latin typeface="Consolas"/>
               </a:rPr>
               <a:t>if (b == true):</a:t>
             </a:r>
-            <a:endParaRPr lang="de-DE"/>
-          </a:p>
-          <a:p>
-            <a:r>
-              <a:rPr lang="en-GB">
+            <a:endParaRPr lang="de-DE" sz="1600" dirty="0">
+              <a:cs typeface="Calibri"/>
+            </a:endParaRPr>
+          </a:p>
+          <a:p>
+            <a:r>
+              <a:rPr lang="en-GB" sz="1600" dirty="0">
                 <a:latin typeface="Consolas"/>
               </a:rPr>
-              <a:t>    print("</a:t>
-            </a:r>
-            <a:r>
-              <a:rPr lang="en-GB" dirty="0">
-                <a:latin typeface="Consolas"/>
-              </a:rPr>
-              <a:t>True</a:t>
-            </a:r>
-            <a:r>
-              <a:rPr lang="en-GB">
-                <a:latin typeface="Consolas"/>
-              </a:rPr>
-              <a:t>!")</a:t>
-            </a:r>
-            <a:endParaRPr lang="en-GB"/>
-          </a:p>
-          <a:p>
-            <a:endParaRPr lang="en-GB" dirty="0">
+              <a:t>    print("True!")</a:t>
+            </a:r>
+            <a:endParaRPr lang="en-GB" sz="1600" dirty="0">
+              <a:cs typeface="Calibri"/>
+            </a:endParaRPr>
+          </a:p>
+          <a:p>
+            <a:endParaRPr lang="en-GB" sz="1600" dirty="0">
               <a:latin typeface="Consolas"/>
             </a:endParaRPr>
           </a:p>
           <a:p>
             <a:r>
-              <a:rPr lang="en-GB" i="1" dirty="0">
+              <a:rPr lang="en-GB" sz="1600" i="1" dirty="0">
                 <a:latin typeface="Consolas"/>
               </a:rPr>
               <a:t>Error:</a:t>
@@ -25618,174 +26366,176 @@
           </a:p>
           <a:p>
             <a:r>
-              <a:rPr lang="en-GB" b="1" dirty="0" err="1">
+              <a:rPr lang="en-GB" sz="1600" b="1" dirty="0" err="1">
                 <a:latin typeface="Consolas"/>
               </a:rPr>
               <a:t>NameError</a:t>
             </a:r>
             <a:r>
-              <a:rPr lang="en-GB" dirty="0">
+              <a:rPr lang="en-GB" sz="1600" dirty="0">
                 <a:latin typeface="Consolas"/>
               </a:rPr>
               <a:t>                                 Traceback (most recent call last)
 </a:t>
             </a:r>
             <a:r>
-              <a:rPr lang="en-GB" b="1" dirty="0">
+              <a:rPr lang="en-GB" sz="1600" b="1" dirty="0">
                 <a:latin typeface="Consolas"/>
               </a:rPr>
               <a:t>&lt;ipython-input-76-514a374118eb&gt;</a:t>
             </a:r>
             <a:r>
-              <a:rPr lang="en-GB" dirty="0">
+              <a:rPr lang="en-GB" sz="1600" dirty="0">
                 <a:latin typeface="Consolas"/>
               </a:rPr>
               <a:t> in &lt;module&gt;</a:t>
             </a:r>
             <a:r>
-              <a:rPr lang="en-GB" b="1" dirty="0">
+              <a:rPr lang="en-GB" sz="1600" b="1" dirty="0">
                 <a:latin typeface="Consolas"/>
               </a:rPr>
               <a:t>()
 </a:t>
             </a:r>
             <a:r>
-              <a:rPr lang="en-GB" dirty="0">
+              <a:rPr lang="en-GB" sz="1600" dirty="0">
                 <a:latin typeface="Consolas"/>
               </a:rPr>
               <a:t>      3 b </a:t>
             </a:r>
             <a:r>
-              <a:rPr lang="en-GB" b="1" dirty="0">
+              <a:rPr lang="en-GB" sz="1600" b="1" dirty="0">
                 <a:latin typeface="Consolas"/>
               </a:rPr>
               <a:t>=</a:t>
             </a:r>
             <a:r>
-              <a:rPr lang="en-GB" dirty="0">
+              <a:rPr lang="en-GB" sz="1600" dirty="0">
                 <a:latin typeface="Consolas"/>
               </a:rPr>
               <a:t> </a:t>
             </a:r>
             <a:r>
-              <a:rPr lang="en-GB" b="1" dirty="0">
+              <a:rPr lang="en-GB" sz="1600" b="1" dirty="0">
                 <a:latin typeface="Consolas"/>
               </a:rPr>
               <a:t>5</a:t>
             </a:r>
             <a:r>
-              <a:rPr lang="en-GB" dirty="0">
+              <a:rPr lang="en-GB" sz="1600" dirty="0">
                 <a:latin typeface="Consolas"/>
               </a:rPr>
               <a:t> </a:t>
             </a:r>
             <a:r>
-              <a:rPr lang="en-GB" b="1" dirty="0">
+              <a:rPr lang="en-GB" sz="1600" b="1" dirty="0">
                 <a:latin typeface="Consolas"/>
               </a:rPr>
               <a:t>&gt;</a:t>
             </a:r>
             <a:r>
-              <a:rPr lang="en-GB" dirty="0">
+              <a:rPr lang="en-GB" sz="1600" dirty="0">
                 <a:latin typeface="Consolas"/>
               </a:rPr>
               <a:t> </a:t>
             </a:r>
             <a:r>
-              <a:rPr lang="en-GB" b="1" dirty="0">
+              <a:rPr lang="en-GB" sz="1600" b="1" dirty="0">
                 <a:latin typeface="Consolas"/>
               </a:rPr>
               <a:t>3
 </a:t>
             </a:r>
             <a:r>
-              <a:rPr lang="en-GB" dirty="0">
+              <a:rPr lang="en-GB" sz="1600" dirty="0">
                 <a:latin typeface="Consolas"/>
               </a:rPr>
               <a:t>      4 
 </a:t>
             </a:r>
             <a:r>
-              <a:rPr lang="en-GB" b="1" dirty="0">
+              <a:rPr lang="en-GB" sz="1600" b="1" dirty="0">
                 <a:latin typeface="Consolas"/>
               </a:rPr>
               <a:t>----&gt; 5 if</a:t>
             </a:r>
             <a:r>
-              <a:rPr lang="en-GB" dirty="0">
+              <a:rPr lang="en-GB" sz="1600" dirty="0">
                 <a:latin typeface="Consolas"/>
               </a:rPr>
               <a:t> </a:t>
             </a:r>
             <a:r>
-              <a:rPr lang="en-GB" b="1" dirty="0">
+              <a:rPr lang="en-GB" sz="1600" b="1" dirty="0">
                 <a:latin typeface="Consolas"/>
               </a:rPr>
               <a:t>(</a:t>
             </a:r>
             <a:r>
-              <a:rPr lang="en-GB" dirty="0">
+              <a:rPr lang="en-GB" sz="1600" dirty="0">
                 <a:latin typeface="Consolas"/>
               </a:rPr>
               <a:t>b </a:t>
             </a:r>
             <a:r>
-              <a:rPr lang="en-GB" b="1" dirty="0">
+              <a:rPr lang="en-GB" sz="1600" b="1" dirty="0">
                 <a:latin typeface="Consolas"/>
               </a:rPr>
               <a:t>==</a:t>
             </a:r>
             <a:r>
-              <a:rPr lang="en-GB" dirty="0">
+              <a:rPr lang="en-GB" sz="1600" dirty="0">
                 <a:latin typeface="Consolas"/>
               </a:rPr>
               <a:t> true</a:t>
             </a:r>
             <a:r>
-              <a:rPr lang="en-GB" b="1" dirty="0">
+              <a:rPr lang="en-GB" sz="1600" b="1" dirty="0">
                 <a:latin typeface="Consolas"/>
               </a:rPr>
               <a:t>):
 </a:t>
             </a:r>
             <a:r>
-              <a:rPr lang="en-GB" dirty="0">
+              <a:rPr lang="en-GB" sz="1600" dirty="0">
                 <a:latin typeface="Consolas"/>
               </a:rPr>
               <a:t>      6     print</a:t>
             </a:r>
             <a:r>
-              <a:rPr lang="en-GB" b="1" dirty="0">
+              <a:rPr lang="en-GB" sz="1600" b="1" dirty="0">
                 <a:latin typeface="Consolas"/>
               </a:rPr>
               <a:t>("</a:t>
             </a:r>
             <a:r>
-              <a:rPr lang="en-GB" b="1" dirty="0" err="1">
+              <a:rPr lang="en-GB" sz="1600" b="1" dirty="0" err="1">
                 <a:latin typeface="Consolas"/>
               </a:rPr>
               <a:t>Richtig</a:t>
             </a:r>
             <a:r>
-              <a:rPr lang="en-GB" b="1" dirty="0">
+              <a:rPr lang="en-GB" sz="1600" b="1" dirty="0">
                 <a:latin typeface="Consolas"/>
               </a:rPr>
               <a:t>!")
 </a:t>
             </a:r>
             <a:r>
-              <a:rPr lang="en-GB" b="1" dirty="0" err="1">
+              <a:rPr lang="en-GB" sz="1600" b="1" dirty="0" err="1">
                 <a:latin typeface="Consolas"/>
               </a:rPr>
               <a:t>NameError</a:t>
             </a:r>
             <a:r>
-              <a:rPr lang="en-GB" dirty="0">
+              <a:rPr lang="en-GB" sz="1600" dirty="0">
                 <a:latin typeface="Consolas"/>
               </a:rPr>
               <a:t>: name 'true' is not defined</a:t>
             </a:r>
-            <a:endParaRPr lang="en-GB" dirty="0"/>
+            <a:endParaRPr lang="en-GB" sz="1600">
+              <a:cs typeface="Calibri"/>
+            </a:endParaRPr>
           </a:p>
         </p:txBody>
       </p:sp>
@@ -25912,15 +26662,15 @@
           <a:p>
             <a:pPr marL="383540" lvl="1"/>
             <a:r>
-              <a:rPr lang="en-GB" sz="2400" dirty="0">
+              <a:rPr lang="en-GB" sz="2400">
                 <a:solidFill>
                   <a:srgbClr val="404040"/>
                 </a:solidFill>
                 <a:cs typeface="Calibri"/>
               </a:rPr>
-              <a:t>It  can also occur, for example, when you are trying to unpack tuples, but the number of tuple elements and variables does not match</a:t>
-            </a:r>
-            <a:endParaRPr lang="en-GB" dirty="0">
+              <a:t>It can also occur, for example, when you are trying to unpack tuples, but the number of tuple elements and variables does not match</a:t>
+            </a:r>
+            <a:endParaRPr lang="en-GB">
               <a:solidFill>
                 <a:schemeClr val="tx1"/>
               </a:solidFill>
@@ -26367,7 +27117,7 @@
           <a:p>
             <a:r>
               <a:rPr lang="en-GB" dirty="0"/>
-              <a:t>When introducing functions, we will show &amp; explain in parts the whole definition</a:t>
+              <a:t>When introducing functions, we will show (&amp; explain parts of) the whole definition</a:t>
             </a:r>
           </a:p>
           <a:p>
@@ -27777,7 +28527,7 @@
           <a:p>
             <a:r>
               <a:rPr lang="en-GB" dirty="0"/>
-              <a:t>Debugging And print(): Logging</a:t>
+              <a:t>Debugging and print(): Logging</a:t>
             </a:r>
           </a:p>
         </p:txBody>
@@ -28500,7 +29250,7 @@
           <a:p>
             <a:r>
               <a:rPr lang="en-GB" dirty="0"/>
-              <a:t>Expecting Exceptions</a:t>
+              <a:t>Expecting &amp; Accepting Exceptions</a:t>
             </a:r>
           </a:p>
         </p:txBody>
@@ -31017,7 +31767,7 @@
           <a:p>
             <a:r>
               <a:rPr lang="en-GB" dirty="0"/>
-              <a:t>This does the try-except-finally structure in the background for you</a:t>
+              <a:t>This kind of deals with the try-except-finally structure in the background for you</a:t>
             </a:r>
           </a:p>
         </p:txBody>
@@ -37839,7 +38589,10 @@
           <a:bodyPr/>
           <a:lstStyle/>
           <a:p>
-            <a:endParaRPr lang="en-GB"/>
+            <a:r>
+              <a:rPr lang="en-GB" dirty="0"/>
+              <a:t>Notes</a:t>
+            </a:r>
           </a:p>
         </p:txBody>
       </p:sp>
@@ -37864,7 +38617,48 @@
           <a:bodyPr/>
           <a:lstStyle/>
           <a:p>
-            <a:endParaRPr lang="en-GB"/>
+            <a:r>
+              <a:rPr lang="en-GB" dirty="0"/>
+              <a:t>We did not notice any major reoccurring issues</a:t>
+            </a:r>
+          </a:p>
+          <a:p>
+            <a:r>
+              <a:rPr lang="en-GB" dirty="0"/>
+              <a:t>In a game of hangman it is advantageous to list the missed letters</a:t>
+            </a:r>
+          </a:p>
+          <a:p>
+            <a:r>
+              <a:rPr lang="en-GB" dirty="0"/>
+              <a:t>Otherwise, great job!</a:t>
+            </a:r>
+          </a:p>
+          <a:p>
+            <a:r>
+              <a:rPr lang="en-GB" dirty="0"/>
+              <a:t>Opening a file with mode </a:t>
+            </a:r>
+            <a:r>
+              <a:rPr lang="en-GB" sz="2000" dirty="0">
+                <a:latin typeface="Consolas" panose="020B0609020204030204" pitchFamily="49" charset="0"/>
+              </a:rPr>
+              <a:t>w+</a:t>
+            </a:r>
+            <a:r>
+              <a:rPr lang="en-GB" dirty="0"/>
+              <a:t> will delete all contents the moment </a:t>
+            </a:r>
+            <a:r>
+              <a:rPr lang="en-GB" sz="2000" dirty="0">
+                <a:latin typeface="Consolas" panose="020B0609020204030204" pitchFamily="49" charset="0"/>
+              </a:rPr>
+              <a:t>open()</a:t>
+            </a:r>
+            <a:r>
+              <a:rPr lang="en-GB" dirty="0"/>
+              <a:t> is executed!</a:t>
+            </a:r>
           </a:p>
         </p:txBody>
       </p:sp>
@@ -40433,7 +41227,13 @@
               <a:rPr lang="en-GB" b="1" dirty="0"/>
               <a:t>docstring</a:t>
             </a:r>
-            <a:endParaRPr lang="en-GB" dirty="0"/>
+          </a:p>
+          <a:p>
+            <a:pPr lvl="1"/>
+            <a:r>
+              <a:rPr lang="en-GB" dirty="0"/>
+              <a:t>Docstrings always use three double-quotes, not single quotes</a:t>
+            </a:r>
           </a:p>
         </p:txBody>
       </p:sp>
@@ -41230,7 +42030,7 @@
             <a:spLocks noGrp="1"/>
           </p:cNvSpPr>
           <p:nvPr>
-            <p:ph sz="half" idx="1"/>
+            <p:ph idx="1"/>
           </p:nvPr>
         </p:nvSpPr>
         <p:spPr/>
@@ -41238,32 +42038,105 @@
           <a:bodyPr/>
           <a:lstStyle/>
           <a:p>
-            <a:endParaRPr lang="en-GB"/>
-          </a:p>
-        </p:txBody>
-      </p:sp>
-      <p:sp>
-        <p:nvSpPr>
-          <p:cNvPr id="4" name="Content Placeholder 3">
-            <a:extLst>
-              <a:ext uri="{FF2B5EF4-FFF2-40B4-BE49-F238E27FC236}">
-                <a16:creationId xmlns:a16="http://schemas.microsoft.com/office/drawing/2014/main" id="{CEFD9743-BCB4-46E2-9377-7DE0B93074E8}"/>
-              </a:ext>
-            </a:extLst>
-          </p:cNvPr>
-          <p:cNvSpPr>
-            <a:spLocks noGrp="1"/>
-          </p:cNvSpPr>
-          <p:nvPr>
-            <p:ph sz="half" idx="2"/>
-          </p:nvPr>
-        </p:nvSpPr>
-        <p:spPr/>
-        <p:txBody>
-          <a:bodyPr/>
-          <a:lstStyle/>
-          <a:p>
-            <a:endParaRPr lang="en-GB"/>
+            <a:r>
+              <a:rPr lang="en-GB" dirty="0"/>
+              <a:t>There are a lot of standards and style guides for coding</a:t>
+            </a:r>
+          </a:p>
+          <a:p>
+            <a:r>
+              <a:rPr lang="en-GB" dirty="0"/>
+              <a:t>The important part is to stick with one, once you picked it for a project</a:t>
+            </a:r>
+          </a:p>
+          <a:p>
+            <a:pPr lvl="1"/>
+            <a:r>
+              <a:rPr lang="en-GB" dirty="0"/>
+              <a:t>Different projects may follow different standards</a:t>
+            </a:r>
+          </a:p>
+          <a:p>
+            <a:pPr lvl="1"/>
+            <a:r>
+              <a:rPr lang="en-GB" dirty="0"/>
+              <a:t>We will roughly follow the </a:t>
+            </a:r>
+            <a:r>
+              <a:rPr lang="en-GB" dirty="0">
+                <a:hlinkClick r:id="rId2"/>
+              </a:rPr>
+              <a:t>google style guide</a:t>
+            </a:r>
+            <a:r>
+              <a:rPr lang="en-GB" dirty="0"/>
+              <a:t> (which extends </a:t>
+            </a:r>
+            <a:r>
+              <a:rPr lang="en-GB" dirty="0">
+                <a:hlinkClick r:id="rId3"/>
+              </a:rPr>
+              <a:t>PEP-8</a:t>
+            </a:r>
+            <a:r>
+              <a:rPr lang="en-GB" dirty="0"/>
+              <a:t>)</a:t>
+            </a:r>
+          </a:p>
+          <a:p>
+            <a:pPr lvl="1"/>
+            <a:r>
+              <a:rPr lang="en-GB" dirty="0"/>
+              <a:t>There are way more though</a:t>
+            </a:r>
+          </a:p>
+          <a:p>
+            <a:pPr lvl="2"/>
+            <a:r>
+              <a:rPr lang="en-GB" dirty="0"/>
+              <a:t>Using </a:t>
+            </a:r>
+            <a:r>
+              <a:rPr lang="en-GB" dirty="0">
+                <a:hlinkClick r:id="rId4"/>
+              </a:rPr>
+              <a:t>Python Sphinx</a:t>
+            </a:r>
+            <a:r>
+              <a:rPr lang="en-GB" dirty="0"/>
+              <a:t>, a powerful documentation tool</a:t>
+            </a:r>
+          </a:p>
+          <a:p>
+            <a:pPr lvl="2"/>
+            <a:r>
+              <a:rPr lang="en-GB" dirty="0"/>
+              <a:t>The </a:t>
+            </a:r>
+            <a:r>
+              <a:rPr lang="en-GB" dirty="0">
+                <a:hlinkClick r:id="rId5"/>
+              </a:rPr>
+              <a:t>SciPy style guide</a:t>
+            </a:r>
+            <a:endParaRPr lang="en-GB" dirty="0"/>
+          </a:p>
+          <a:p>
+            <a:pPr lvl="2"/>
+            <a:r>
+              <a:rPr lang="en-GB" dirty="0" err="1"/>
+              <a:t>Aaaaaand</a:t>
+            </a:r>
+            <a:r>
+              <a:rPr lang="en-GB" dirty="0"/>
+              <a:t> way more</a:t>
+            </a:r>
+          </a:p>
+          <a:p>
+            <a:r>
+              <a:rPr lang="en-GB" dirty="0"/>
+              <a:t>We hopefully will cover documentation in more detail in a couple of weeks</a:t>
+            </a:r>
           </a:p>
         </p:txBody>
       </p:sp>
@@ -41331,7 +42204,7 @@
           <p:cNvPr id="2" name="Title 1">
             <a:extLst>
               <a:ext uri="{FF2B5EF4-FFF2-40B4-BE49-F238E27FC236}">
-                <a16:creationId xmlns:a16="http://schemas.microsoft.com/office/drawing/2014/main" id="{AC60F374-E096-4802-807C-6E7121DB1404}"/>
+                <a16:creationId xmlns:a16="http://schemas.microsoft.com/office/drawing/2014/main" id="{6E408E9C-7F59-4A0F-B2D2-99A48307E717}"/>
               </a:ext>
             </a:extLst>
           </p:cNvPr>
@@ -41349,17 +42222,450 @@
           <a:p>
             <a:r>
               <a:rPr lang="en-GB" dirty="0"/>
-              <a:t>Homework</a:t>
+              <a:t>Documentation: An Example</a:t>
             </a:r>
           </a:p>
         </p:txBody>
       </p:sp>
       <p:sp>
         <p:nvSpPr>
-          <p:cNvPr id="3" name="Slide Number Placeholder 2">
+          <p:cNvPr id="3" name="Content Placeholder 2">
             <a:extLst>
               <a:ext uri="{FF2B5EF4-FFF2-40B4-BE49-F238E27FC236}">
-                <a16:creationId xmlns:a16="http://schemas.microsoft.com/office/drawing/2014/main" id="{A71CCD86-BDCE-4614-B4E6-D21F5FBBC4E9}"/>
+                <a16:creationId xmlns:a16="http://schemas.microsoft.com/office/drawing/2014/main" id="{5BB3198D-8C3C-4B28-9754-5F84BB52727D}"/>
+              </a:ext>
+            </a:extLst>
+          </p:cNvPr>
+          <p:cNvSpPr>
+            <a:spLocks noGrp="1"/>
+          </p:cNvSpPr>
+          <p:nvPr>
+            <p:ph idx="1"/>
+          </p:nvPr>
+        </p:nvSpPr>
+        <p:spPr>
+          <a:solidFill>
+            <a:schemeClr val="bg1">
+              <a:lumMod val="95000"/>
+            </a:schemeClr>
+          </a:solidFill>
+        </p:spPr>
+        <p:txBody>
+          <a:bodyPr>
+            <a:normAutofit/>
+          </a:bodyPr>
+          <a:lstStyle/>
+          <a:p>
+            <a:pPr marL="0" indent="0">
+              <a:spcBef>
+                <a:spcPts val="0"/>
+              </a:spcBef>
+              <a:spcAft>
+                <a:spcPts val="0"/>
+              </a:spcAft>
+              <a:buNone/>
+            </a:pPr>
+            <a:r>
+              <a:rPr lang="en-GB" sz="2000" dirty="0">
+                <a:solidFill>
+                  <a:srgbClr val="7A3E9D"/>
+                </a:solidFill>
+                <a:latin typeface="Consolas" panose="020B0609020204030204" pitchFamily="49" charset="0"/>
+              </a:rPr>
+              <a:t>def</a:t>
+            </a:r>
+            <a:r>
+              <a:rPr lang="en-GB" sz="2000" dirty="0">
+                <a:solidFill>
+                  <a:srgbClr val="333333"/>
+                </a:solidFill>
+                <a:latin typeface="Consolas" panose="020B0609020204030204" pitchFamily="49" charset="0"/>
+              </a:rPr>
+              <a:t> </a:t>
+            </a:r>
+            <a:r>
+              <a:rPr lang="en-GB" sz="2000" b="1" dirty="0">
+                <a:solidFill>
+                  <a:srgbClr val="AA3731"/>
+                </a:solidFill>
+                <a:latin typeface="Consolas" panose="020B0609020204030204" pitchFamily="49" charset="0"/>
+              </a:rPr>
+              <a:t>add</a:t>
+            </a:r>
+            <a:r>
+              <a:rPr lang="en-GB" sz="2000" dirty="0">
+                <a:solidFill>
+                  <a:srgbClr val="777777"/>
+                </a:solidFill>
+                <a:latin typeface="Consolas" panose="020B0609020204030204" pitchFamily="49" charset="0"/>
+              </a:rPr>
+              <a:t>(</a:t>
+            </a:r>
+            <a:r>
+              <a:rPr lang="en-GB" sz="2000" dirty="0">
+                <a:solidFill>
+                  <a:srgbClr val="7A3E9D"/>
+                </a:solidFill>
+                <a:latin typeface="Consolas" panose="020B0609020204030204" pitchFamily="49" charset="0"/>
+              </a:rPr>
+              <a:t>a</a:t>
+            </a:r>
+            <a:r>
+              <a:rPr lang="en-GB" sz="2000" dirty="0">
+                <a:solidFill>
+                  <a:srgbClr val="777777"/>
+                </a:solidFill>
+                <a:latin typeface="Consolas" panose="020B0609020204030204" pitchFamily="49" charset="0"/>
+              </a:rPr>
+              <a:t>,</a:t>
+            </a:r>
+            <a:r>
+              <a:rPr lang="en-GB" sz="2000" dirty="0">
+                <a:solidFill>
+                  <a:srgbClr val="333333"/>
+                </a:solidFill>
+                <a:latin typeface="Consolas" panose="020B0609020204030204" pitchFamily="49" charset="0"/>
+              </a:rPr>
+              <a:t> </a:t>
+            </a:r>
+            <a:r>
+              <a:rPr lang="en-GB" sz="2000" dirty="0">
+                <a:solidFill>
+                  <a:srgbClr val="7A3E9D"/>
+                </a:solidFill>
+                <a:latin typeface="Consolas" panose="020B0609020204030204" pitchFamily="49" charset="0"/>
+              </a:rPr>
+              <a:t>b</a:t>
+            </a:r>
+            <a:r>
+              <a:rPr lang="en-GB" sz="2000" dirty="0">
+                <a:solidFill>
+                  <a:srgbClr val="777777"/>
+                </a:solidFill>
+                <a:latin typeface="Consolas" panose="020B0609020204030204" pitchFamily="49" charset="0"/>
+              </a:rPr>
+              <a:t>):</a:t>
+            </a:r>
+            <a:endParaRPr lang="en-GB" sz="2000" dirty="0">
+              <a:solidFill>
+                <a:srgbClr val="333333"/>
+              </a:solidFill>
+              <a:latin typeface="Consolas" panose="020B0609020204030204" pitchFamily="49" charset="0"/>
+            </a:endParaRPr>
+          </a:p>
+          <a:p>
+            <a:pPr marL="0" indent="0">
+              <a:spcBef>
+                <a:spcPts val="0"/>
+              </a:spcBef>
+              <a:spcAft>
+                <a:spcPts val="0"/>
+              </a:spcAft>
+              <a:buNone/>
+            </a:pPr>
+            <a:r>
+              <a:rPr lang="en-GB" sz="2000" dirty="0">
+                <a:solidFill>
+                  <a:srgbClr val="777777"/>
+                </a:solidFill>
+                <a:latin typeface="Consolas" panose="020B0609020204030204" pitchFamily="49" charset="0"/>
+              </a:rPr>
+              <a:t>    """</a:t>
+            </a:r>
+            <a:r>
+              <a:rPr lang="en-GB" sz="2000" dirty="0">
+                <a:solidFill>
+                  <a:srgbClr val="448C27"/>
+                </a:solidFill>
+                <a:latin typeface="Consolas" panose="020B0609020204030204" pitchFamily="49" charset="0"/>
+              </a:rPr>
+              <a:t>Returns the sum of a and b</a:t>
+            </a:r>
+            <a:endParaRPr lang="en-GB" sz="2000" dirty="0">
+              <a:solidFill>
+                <a:srgbClr val="333333"/>
+              </a:solidFill>
+              <a:latin typeface="Consolas" panose="020B0609020204030204" pitchFamily="49" charset="0"/>
+            </a:endParaRPr>
+          </a:p>
+          <a:p>
+            <a:pPr marL="0" indent="0">
+              <a:spcBef>
+                <a:spcPts val="0"/>
+              </a:spcBef>
+              <a:spcAft>
+                <a:spcPts val="0"/>
+              </a:spcAft>
+              <a:buNone/>
+            </a:pPr>
+            <a:br>
+              <a:rPr lang="en-GB" sz="2000" dirty="0">
+                <a:solidFill>
+                  <a:srgbClr val="333333"/>
+                </a:solidFill>
+                <a:latin typeface="Consolas" panose="020B0609020204030204" pitchFamily="49" charset="0"/>
+              </a:rPr>
+            </a:br>
+            <a:r>
+              <a:rPr lang="en-GB" sz="2000" dirty="0">
+                <a:solidFill>
+                  <a:srgbClr val="333333"/>
+                </a:solidFill>
+                <a:latin typeface="Consolas" panose="020B0609020204030204" pitchFamily="49" charset="0"/>
+              </a:rPr>
+              <a:t>    </a:t>
+            </a:r>
+            <a:r>
+              <a:rPr lang="en-GB" sz="2000" dirty="0" err="1">
+                <a:solidFill>
+                  <a:srgbClr val="448C27"/>
+                </a:solidFill>
+                <a:latin typeface="Consolas" panose="020B0609020204030204" pitchFamily="49" charset="0"/>
+              </a:rPr>
+              <a:t>Args</a:t>
+            </a:r>
+            <a:r>
+              <a:rPr lang="en-GB" sz="2000" dirty="0">
+                <a:solidFill>
+                  <a:srgbClr val="448C27"/>
+                </a:solidFill>
+                <a:latin typeface="Consolas" panose="020B0609020204030204" pitchFamily="49" charset="0"/>
+              </a:rPr>
+              <a:t>:</a:t>
+            </a:r>
+            <a:endParaRPr lang="en-GB" sz="2000" dirty="0">
+              <a:solidFill>
+                <a:srgbClr val="333333"/>
+              </a:solidFill>
+              <a:latin typeface="Consolas" panose="020B0609020204030204" pitchFamily="49" charset="0"/>
+            </a:endParaRPr>
+          </a:p>
+          <a:p>
+            <a:pPr marL="0" indent="0">
+              <a:spcBef>
+                <a:spcPts val="0"/>
+              </a:spcBef>
+              <a:spcAft>
+                <a:spcPts val="0"/>
+              </a:spcAft>
+              <a:buNone/>
+            </a:pPr>
+            <a:r>
+              <a:rPr lang="en-GB" sz="2000" dirty="0">
+                <a:solidFill>
+                  <a:srgbClr val="448C27"/>
+                </a:solidFill>
+                <a:latin typeface="Consolas" panose="020B0609020204030204" pitchFamily="49" charset="0"/>
+              </a:rPr>
+              <a:t>        a : the left operand</a:t>
+            </a:r>
+            <a:endParaRPr lang="en-GB" sz="2000" dirty="0">
+              <a:solidFill>
+                <a:srgbClr val="333333"/>
+              </a:solidFill>
+              <a:latin typeface="Consolas" panose="020B0609020204030204" pitchFamily="49" charset="0"/>
+            </a:endParaRPr>
+          </a:p>
+          <a:p>
+            <a:pPr marL="0" indent="0">
+              <a:spcBef>
+                <a:spcPts val="0"/>
+              </a:spcBef>
+              <a:spcAft>
+                <a:spcPts val="0"/>
+              </a:spcAft>
+              <a:buNone/>
+            </a:pPr>
+            <a:r>
+              <a:rPr lang="en-GB" sz="2000" dirty="0">
+                <a:solidFill>
+                  <a:srgbClr val="448C27"/>
+                </a:solidFill>
+                <a:latin typeface="Consolas" panose="020B0609020204030204" pitchFamily="49" charset="0"/>
+              </a:rPr>
+              <a:t>        b : the right operand</a:t>
+            </a:r>
+            <a:endParaRPr lang="en-GB" sz="2000" dirty="0">
+              <a:solidFill>
+                <a:srgbClr val="333333"/>
+              </a:solidFill>
+              <a:latin typeface="Consolas" panose="020B0609020204030204" pitchFamily="49" charset="0"/>
+            </a:endParaRPr>
+          </a:p>
+          <a:p>
+            <a:pPr marL="0" indent="0">
+              <a:spcBef>
+                <a:spcPts val="0"/>
+              </a:spcBef>
+              <a:spcAft>
+                <a:spcPts val="0"/>
+              </a:spcAft>
+              <a:buNone/>
+            </a:pPr>
+            <a:br>
+              <a:rPr lang="en-GB" sz="2000" dirty="0">
+                <a:solidFill>
+                  <a:srgbClr val="333333"/>
+                </a:solidFill>
+                <a:latin typeface="Consolas" panose="020B0609020204030204" pitchFamily="49" charset="0"/>
+              </a:rPr>
+            </a:br>
+            <a:r>
+              <a:rPr lang="en-GB" sz="2000" dirty="0">
+                <a:solidFill>
+                  <a:srgbClr val="333333"/>
+                </a:solidFill>
+                <a:latin typeface="Consolas" panose="020B0609020204030204" pitchFamily="49" charset="0"/>
+              </a:rPr>
+              <a:t>    </a:t>
+            </a:r>
+            <a:r>
+              <a:rPr lang="en-GB" sz="2000" dirty="0">
+                <a:solidFill>
+                  <a:srgbClr val="448C27"/>
+                </a:solidFill>
+                <a:latin typeface="Consolas" panose="020B0609020204030204" pitchFamily="49" charset="0"/>
+              </a:rPr>
+              <a:t>Returns:</a:t>
+            </a:r>
+            <a:endParaRPr lang="en-GB" sz="2000" dirty="0">
+              <a:solidFill>
+                <a:srgbClr val="333333"/>
+              </a:solidFill>
+              <a:latin typeface="Consolas" panose="020B0609020204030204" pitchFamily="49" charset="0"/>
+            </a:endParaRPr>
+          </a:p>
+          <a:p>
+            <a:pPr marL="0" indent="0">
+              <a:spcBef>
+                <a:spcPts val="0"/>
+              </a:spcBef>
+              <a:spcAft>
+                <a:spcPts val="0"/>
+              </a:spcAft>
+              <a:buNone/>
+            </a:pPr>
+            <a:r>
+              <a:rPr lang="en-GB" sz="2000" dirty="0">
+                <a:solidFill>
+                  <a:srgbClr val="448C27"/>
+                </a:solidFill>
+                <a:latin typeface="Consolas" panose="020B0609020204030204" pitchFamily="49" charset="0"/>
+              </a:rPr>
+              <a:t>        The sum of </a:t>
+            </a:r>
+            <a:r>
+              <a:rPr lang="en-GB" sz="2000" dirty="0" err="1">
+                <a:solidFill>
+                  <a:srgbClr val="448C27"/>
+                </a:solidFill>
+                <a:latin typeface="Consolas" panose="020B0609020204030204" pitchFamily="49" charset="0"/>
+              </a:rPr>
+              <a:t>of</a:t>
+            </a:r>
+            <a:r>
+              <a:rPr lang="en-GB" sz="2000" dirty="0">
+                <a:solidFill>
+                  <a:srgbClr val="448C27"/>
+                </a:solidFill>
+                <a:latin typeface="Consolas" panose="020B0609020204030204" pitchFamily="49" charset="0"/>
+              </a:rPr>
+              <a:t> a and b</a:t>
+            </a:r>
+            <a:endParaRPr lang="en-GB" sz="2000" dirty="0">
+              <a:solidFill>
+                <a:srgbClr val="333333"/>
+              </a:solidFill>
+              <a:latin typeface="Consolas" panose="020B0609020204030204" pitchFamily="49" charset="0"/>
+            </a:endParaRPr>
+          </a:p>
+          <a:p>
+            <a:pPr marL="0" indent="0">
+              <a:spcBef>
+                <a:spcPts val="0"/>
+              </a:spcBef>
+              <a:spcAft>
+                <a:spcPts val="0"/>
+              </a:spcAft>
+              <a:buNone/>
+            </a:pPr>
+            <a:r>
+              <a:rPr lang="en-GB" sz="2000" dirty="0">
+                <a:solidFill>
+                  <a:srgbClr val="777777"/>
+                </a:solidFill>
+                <a:latin typeface="Consolas" panose="020B0609020204030204" pitchFamily="49" charset="0"/>
+              </a:rPr>
+              <a:t>    """</a:t>
+            </a:r>
+            <a:endParaRPr lang="en-GB" sz="2000" dirty="0">
+              <a:solidFill>
+                <a:srgbClr val="333333"/>
+              </a:solidFill>
+              <a:latin typeface="Consolas" panose="020B0609020204030204" pitchFamily="49" charset="0"/>
+            </a:endParaRPr>
+          </a:p>
+          <a:p>
+            <a:pPr marL="0" indent="0">
+              <a:spcBef>
+                <a:spcPts val="0"/>
+              </a:spcBef>
+              <a:spcAft>
+                <a:spcPts val="0"/>
+              </a:spcAft>
+              <a:buNone/>
+            </a:pPr>
+            <a:r>
+              <a:rPr lang="en-GB" sz="2000" dirty="0">
+                <a:solidFill>
+                  <a:srgbClr val="4B83CD"/>
+                </a:solidFill>
+                <a:latin typeface="Consolas" panose="020B0609020204030204" pitchFamily="49" charset="0"/>
+              </a:rPr>
+              <a:t>    return</a:t>
+            </a:r>
+            <a:r>
+              <a:rPr lang="en-GB" sz="2000" dirty="0">
+                <a:solidFill>
+                  <a:srgbClr val="333333"/>
+                </a:solidFill>
+                <a:latin typeface="Consolas" panose="020B0609020204030204" pitchFamily="49" charset="0"/>
+              </a:rPr>
+              <a:t> a </a:t>
+            </a:r>
+            <a:r>
+              <a:rPr lang="en-GB" sz="2000" dirty="0">
+                <a:solidFill>
+                  <a:srgbClr val="777777"/>
+                </a:solidFill>
+                <a:latin typeface="Consolas" panose="020B0609020204030204" pitchFamily="49" charset="0"/>
+              </a:rPr>
+              <a:t>+</a:t>
+            </a:r>
+            <a:r>
+              <a:rPr lang="en-GB" sz="2000" dirty="0">
+                <a:solidFill>
+                  <a:srgbClr val="333333"/>
+                </a:solidFill>
+                <a:latin typeface="Consolas" panose="020B0609020204030204" pitchFamily="49" charset="0"/>
+              </a:rPr>
+              <a:t> b</a:t>
+            </a:r>
+          </a:p>
+          <a:p>
+            <a:pPr marL="0" indent="0">
+              <a:buNone/>
+            </a:pPr>
+            <a:endParaRPr lang="en-GB" sz="2000" dirty="0"/>
+          </a:p>
+        </p:txBody>
+      </p:sp>
+      <p:sp>
+        <p:nvSpPr>
+          <p:cNvPr id="4" name="Slide Number Placeholder 3">
+            <a:extLst>
+              <a:ext uri="{FF2B5EF4-FFF2-40B4-BE49-F238E27FC236}">
+                <a16:creationId xmlns:a16="http://schemas.microsoft.com/office/drawing/2014/main" id="{519D9BD4-A3C1-4873-8B68-03F74F24F05B}"/>
               </a:ext>
             </a:extLst>
           </p:cNvPr>
@@ -41386,7 +42692,7 @@
     </p:spTree>
     <p:extLst>
       <p:ext uri="{BB962C8B-B14F-4D97-AF65-F5344CB8AC3E}">
-        <p14:creationId xmlns:p14="http://schemas.microsoft.com/office/powerpoint/2010/main" val="3002211727"/>
+        <p14:creationId xmlns:p14="http://schemas.microsoft.com/office/powerpoint/2010/main" val="716298242"/>
       </p:ext>
     </p:extLst>
   </p:cSld>
@@ -41505,6 +42811,1219 @@
           <p:cNvPr id="2" name="Title 1">
             <a:extLst>
               <a:ext uri="{FF2B5EF4-FFF2-40B4-BE49-F238E27FC236}">
+                <a16:creationId xmlns:a16="http://schemas.microsoft.com/office/drawing/2014/main" id="{6052A65A-4196-4973-8C82-CD1D681E148B}"/>
+              </a:ext>
+            </a:extLst>
+          </p:cNvPr>
+          <p:cNvSpPr>
+            <a:spLocks noGrp="1"/>
+          </p:cNvSpPr>
+          <p:nvPr>
+            <p:ph type="title"/>
+          </p:nvPr>
+        </p:nvSpPr>
+        <p:spPr/>
+        <p:txBody>
+          <a:bodyPr/>
+          <a:lstStyle/>
+          <a:p>
+            <a:r>
+              <a:rPr lang="en-GB" dirty="0"/>
+              <a:t>Documentation: An Explanation</a:t>
+            </a:r>
+          </a:p>
+        </p:txBody>
+      </p:sp>
+      <p:sp>
+        <p:nvSpPr>
+          <p:cNvPr id="3" name="Content Placeholder 2">
+            <a:extLst>
+              <a:ext uri="{FF2B5EF4-FFF2-40B4-BE49-F238E27FC236}">
+                <a16:creationId xmlns:a16="http://schemas.microsoft.com/office/drawing/2014/main" id="{CC431AEB-BB12-45FD-8E18-7C26E6C6CE09}"/>
+              </a:ext>
+            </a:extLst>
+          </p:cNvPr>
+          <p:cNvSpPr>
+            <a:spLocks noGrp="1"/>
+          </p:cNvSpPr>
+          <p:nvPr>
+            <p:ph idx="1"/>
+          </p:nvPr>
+        </p:nvSpPr>
+        <p:spPr>
+          <a:xfrm>
+            <a:off x="1097280" y="1845734"/>
+            <a:ext cx="10058400" cy="4023360"/>
+          </a:xfrm>
+          <a:solidFill>
+            <a:schemeClr val="bg1">
+              <a:lumMod val="95000"/>
+            </a:schemeClr>
+          </a:solidFill>
+        </p:spPr>
+        <p:txBody>
+          <a:bodyPr>
+            <a:normAutofit fontScale="92500" lnSpcReduction="20000"/>
+          </a:bodyPr>
+          <a:lstStyle/>
+          <a:p>
+            <a:pPr marL="0" indent="0">
+              <a:spcBef>
+                <a:spcPts val="0"/>
+              </a:spcBef>
+              <a:spcAft>
+                <a:spcPts val="0"/>
+              </a:spcAft>
+              <a:buNone/>
+            </a:pPr>
+            <a:r>
+              <a:rPr lang="en-GB" sz="2000" dirty="0">
+                <a:solidFill>
+                  <a:srgbClr val="7A3E9D"/>
+                </a:solidFill>
+                <a:latin typeface="Consolas" panose="020B0609020204030204" pitchFamily="49" charset="0"/>
+              </a:rPr>
+              <a:t>def</a:t>
+            </a:r>
+            <a:r>
+              <a:rPr lang="en-GB" sz="2000" dirty="0">
+                <a:solidFill>
+                  <a:srgbClr val="333333"/>
+                </a:solidFill>
+                <a:latin typeface="Consolas" panose="020B0609020204030204" pitchFamily="49" charset="0"/>
+              </a:rPr>
+              <a:t> </a:t>
+            </a:r>
+            <a:r>
+              <a:rPr lang="en-GB" sz="2000" b="1" dirty="0" err="1">
+                <a:solidFill>
+                  <a:srgbClr val="AA3731"/>
+                </a:solidFill>
+                <a:latin typeface="Consolas" panose="020B0609020204030204" pitchFamily="49" charset="0"/>
+              </a:rPr>
+              <a:t>difficult_function</a:t>
+            </a:r>
+            <a:r>
+              <a:rPr lang="en-GB" sz="2000" dirty="0">
+                <a:solidFill>
+                  <a:srgbClr val="777777"/>
+                </a:solidFill>
+                <a:latin typeface="Consolas" panose="020B0609020204030204" pitchFamily="49" charset="0"/>
+              </a:rPr>
+              <a:t>(</a:t>
+            </a:r>
+            <a:r>
+              <a:rPr lang="en-GB" sz="2000" dirty="0">
+                <a:solidFill>
+                  <a:srgbClr val="7A3E9D"/>
+                </a:solidFill>
+                <a:latin typeface="Consolas" panose="020B0609020204030204" pitchFamily="49" charset="0"/>
+              </a:rPr>
+              <a:t>argument</a:t>
+            </a:r>
+            <a:r>
+              <a:rPr lang="en-GB" sz="2000" dirty="0">
+                <a:solidFill>
+                  <a:srgbClr val="777777"/>
+                </a:solidFill>
+                <a:latin typeface="Consolas" panose="020B0609020204030204" pitchFamily="49" charset="0"/>
+              </a:rPr>
+              <a:t>,</a:t>
+            </a:r>
+            <a:r>
+              <a:rPr lang="en-GB" sz="2000" dirty="0">
+                <a:solidFill>
+                  <a:srgbClr val="333333"/>
+                </a:solidFill>
+                <a:latin typeface="Consolas" panose="020B0609020204030204" pitchFamily="49" charset="0"/>
+              </a:rPr>
+              <a:t> </a:t>
+            </a:r>
+            <a:r>
+              <a:rPr lang="en-GB" sz="2000" dirty="0" err="1">
+                <a:solidFill>
+                  <a:srgbClr val="7A3E9D"/>
+                </a:solidFill>
+                <a:latin typeface="Consolas" panose="020B0609020204030204" pitchFamily="49" charset="0"/>
+              </a:rPr>
+              <a:t>other_arg</a:t>
+            </a:r>
+            <a:r>
+              <a:rPr lang="en-GB" sz="2000" dirty="0">
+                <a:solidFill>
+                  <a:srgbClr val="777777"/>
+                </a:solidFill>
+                <a:latin typeface="Consolas" panose="020B0609020204030204" pitchFamily="49" charset="0"/>
+              </a:rPr>
+              <a:t>=</a:t>
+            </a:r>
+            <a:r>
+              <a:rPr lang="en-GB" sz="2000" dirty="0">
+                <a:solidFill>
+                  <a:srgbClr val="AB6526"/>
+                </a:solidFill>
+                <a:latin typeface="Consolas" panose="020B0609020204030204" pitchFamily="49" charset="0"/>
+              </a:rPr>
+              <a:t>None</a:t>
+            </a:r>
+            <a:r>
+              <a:rPr lang="en-GB" sz="2000" dirty="0">
+                <a:solidFill>
+                  <a:srgbClr val="777777"/>
+                </a:solidFill>
+                <a:latin typeface="Consolas" panose="020B0609020204030204" pitchFamily="49" charset="0"/>
+              </a:rPr>
+              <a:t>):</a:t>
+            </a:r>
+            <a:endParaRPr lang="en-GB" sz="2000" dirty="0">
+              <a:solidFill>
+                <a:srgbClr val="333333"/>
+              </a:solidFill>
+              <a:latin typeface="Consolas" panose="020B0609020204030204" pitchFamily="49" charset="0"/>
+            </a:endParaRPr>
+          </a:p>
+          <a:p>
+            <a:pPr marL="0" indent="0">
+              <a:spcBef>
+                <a:spcPts val="0"/>
+              </a:spcBef>
+              <a:spcAft>
+                <a:spcPts val="0"/>
+              </a:spcAft>
+              <a:buNone/>
+            </a:pPr>
+            <a:r>
+              <a:rPr lang="en-GB" sz="2000" dirty="0">
+                <a:solidFill>
+                  <a:srgbClr val="777777"/>
+                </a:solidFill>
+                <a:latin typeface="Consolas" panose="020B0609020204030204" pitchFamily="49" charset="0"/>
+              </a:rPr>
+              <a:t>    """</a:t>
+            </a:r>
+            <a:r>
+              <a:rPr lang="en-GB" sz="2000" dirty="0">
+                <a:solidFill>
+                  <a:srgbClr val="448C27"/>
+                </a:solidFill>
+                <a:latin typeface="Consolas" panose="020B0609020204030204" pitchFamily="49" charset="0"/>
+              </a:rPr>
+              <a:t>Concise description.</a:t>
+            </a:r>
+            <a:endParaRPr lang="en-GB" sz="2000" dirty="0">
+              <a:solidFill>
+                <a:srgbClr val="333333"/>
+              </a:solidFill>
+              <a:latin typeface="Consolas" panose="020B0609020204030204" pitchFamily="49" charset="0"/>
+            </a:endParaRPr>
+          </a:p>
+          <a:p>
+            <a:pPr marL="0" indent="0">
+              <a:spcBef>
+                <a:spcPts val="0"/>
+              </a:spcBef>
+              <a:spcAft>
+                <a:spcPts val="0"/>
+              </a:spcAft>
+              <a:buNone/>
+            </a:pPr>
+            <a:r>
+              <a:rPr lang="en-GB" sz="2000" dirty="0">
+                <a:solidFill>
+                  <a:srgbClr val="448C27"/>
+                </a:solidFill>
+                <a:latin typeface="Consolas" panose="020B0609020204030204" pitchFamily="49" charset="0"/>
+              </a:rPr>
+              <a:t>    </a:t>
+            </a:r>
+          </a:p>
+          <a:p>
+            <a:pPr marL="0" indent="0">
+              <a:spcBef>
+                <a:spcPts val="0"/>
+              </a:spcBef>
+              <a:spcAft>
+                <a:spcPts val="0"/>
+              </a:spcAft>
+              <a:buNone/>
+            </a:pPr>
+            <a:r>
+              <a:rPr lang="en-GB" sz="2000" dirty="0">
+                <a:solidFill>
+                  <a:srgbClr val="448C27"/>
+                </a:solidFill>
+                <a:latin typeface="Consolas" panose="020B0609020204030204" pitchFamily="49" charset="0"/>
+              </a:rPr>
+              <a:t>    Longer description (if concise is not enough)</a:t>
+            </a:r>
+            <a:endParaRPr lang="en-GB" sz="2000" dirty="0">
+              <a:solidFill>
+                <a:srgbClr val="333333"/>
+              </a:solidFill>
+              <a:latin typeface="Consolas" panose="020B0609020204030204" pitchFamily="49" charset="0"/>
+            </a:endParaRPr>
+          </a:p>
+          <a:p>
+            <a:pPr marL="0" indent="0">
+              <a:spcBef>
+                <a:spcPts val="0"/>
+              </a:spcBef>
+              <a:spcAft>
+                <a:spcPts val="0"/>
+              </a:spcAft>
+              <a:buNone/>
+            </a:pPr>
+            <a:r>
+              <a:rPr lang="en-GB" sz="2000" dirty="0">
+                <a:solidFill>
+                  <a:srgbClr val="448C27"/>
+                </a:solidFill>
+                <a:latin typeface="Consolas" panose="020B0609020204030204" pitchFamily="49" charset="0"/>
+              </a:rPr>
+              <a:t>    which might need multiple lines.</a:t>
+            </a:r>
+            <a:endParaRPr lang="en-GB" sz="2000" dirty="0">
+              <a:solidFill>
+                <a:srgbClr val="333333"/>
+              </a:solidFill>
+              <a:latin typeface="Consolas" panose="020B0609020204030204" pitchFamily="49" charset="0"/>
+            </a:endParaRPr>
+          </a:p>
+          <a:p>
+            <a:pPr marL="0" indent="0">
+              <a:spcBef>
+                <a:spcPts val="0"/>
+              </a:spcBef>
+              <a:spcAft>
+                <a:spcPts val="0"/>
+              </a:spcAft>
+              <a:buNone/>
+            </a:pPr>
+            <a:endParaRPr lang="en-GB" sz="2000" dirty="0">
+              <a:solidFill>
+                <a:srgbClr val="448C27"/>
+              </a:solidFill>
+              <a:latin typeface="Consolas" panose="020B0609020204030204" pitchFamily="49" charset="0"/>
+            </a:endParaRPr>
+          </a:p>
+          <a:p>
+            <a:pPr marL="0" indent="0">
+              <a:spcBef>
+                <a:spcPts val="0"/>
+              </a:spcBef>
+              <a:spcAft>
+                <a:spcPts val="0"/>
+              </a:spcAft>
+              <a:buNone/>
+            </a:pPr>
+            <a:r>
+              <a:rPr lang="en-GB" sz="2000" dirty="0">
+                <a:solidFill>
+                  <a:srgbClr val="448C27"/>
+                </a:solidFill>
+                <a:latin typeface="Consolas" panose="020B0609020204030204" pitchFamily="49" charset="0"/>
+              </a:rPr>
+              <a:t>    Or even some paragraphs. </a:t>
+            </a:r>
+            <a:endParaRPr lang="en-GB" sz="2000" dirty="0">
+              <a:solidFill>
+                <a:srgbClr val="333333"/>
+              </a:solidFill>
+              <a:latin typeface="Consolas" panose="020B0609020204030204" pitchFamily="49" charset="0"/>
+            </a:endParaRPr>
+          </a:p>
+          <a:p>
+            <a:pPr marL="0" indent="0">
+              <a:spcBef>
+                <a:spcPts val="0"/>
+              </a:spcBef>
+              <a:spcAft>
+                <a:spcPts val="0"/>
+              </a:spcAft>
+              <a:buNone/>
+            </a:pPr>
+            <a:endParaRPr lang="en-GB" sz="2000" dirty="0">
+              <a:solidFill>
+                <a:srgbClr val="448C27"/>
+              </a:solidFill>
+              <a:latin typeface="Consolas" panose="020B0609020204030204" pitchFamily="49" charset="0"/>
+            </a:endParaRPr>
+          </a:p>
+          <a:p>
+            <a:pPr marL="0" indent="0">
+              <a:spcBef>
+                <a:spcPts val="0"/>
+              </a:spcBef>
+              <a:spcAft>
+                <a:spcPts val="0"/>
+              </a:spcAft>
+              <a:buNone/>
+            </a:pPr>
+            <a:r>
+              <a:rPr lang="en-GB" sz="2000" dirty="0">
+                <a:solidFill>
+                  <a:srgbClr val="448C27"/>
+                </a:solidFill>
+                <a:latin typeface="Consolas" panose="020B0609020204030204" pitchFamily="49" charset="0"/>
+              </a:rPr>
+              <a:t>    </a:t>
+            </a:r>
+            <a:r>
+              <a:rPr lang="en-GB" sz="2000" dirty="0" err="1">
+                <a:solidFill>
+                  <a:srgbClr val="448C27"/>
+                </a:solidFill>
+                <a:latin typeface="Consolas" panose="020B0609020204030204" pitchFamily="49" charset="0"/>
+              </a:rPr>
+              <a:t>Args</a:t>
+            </a:r>
+            <a:r>
+              <a:rPr lang="en-GB" sz="2000" dirty="0">
+                <a:solidFill>
+                  <a:srgbClr val="448C27"/>
+                </a:solidFill>
+                <a:latin typeface="Consolas" panose="020B0609020204030204" pitchFamily="49" charset="0"/>
+              </a:rPr>
+              <a:t>:</a:t>
+            </a:r>
+            <a:endParaRPr lang="en-GB" sz="2000" dirty="0">
+              <a:solidFill>
+                <a:srgbClr val="333333"/>
+              </a:solidFill>
+              <a:latin typeface="Consolas" panose="020B0609020204030204" pitchFamily="49" charset="0"/>
+            </a:endParaRPr>
+          </a:p>
+          <a:p>
+            <a:pPr marL="0" indent="0">
+              <a:spcBef>
+                <a:spcPts val="0"/>
+              </a:spcBef>
+              <a:spcAft>
+                <a:spcPts val="0"/>
+              </a:spcAft>
+              <a:buNone/>
+            </a:pPr>
+            <a:r>
+              <a:rPr lang="en-GB" sz="2000" dirty="0">
+                <a:solidFill>
+                  <a:srgbClr val="448C27"/>
+                </a:solidFill>
+                <a:latin typeface="Consolas" panose="020B0609020204030204" pitchFamily="49" charset="0"/>
+              </a:rPr>
+              <a:t>        argument: A description of this argument.</a:t>
+            </a:r>
+            <a:endParaRPr lang="en-GB" sz="2000" dirty="0">
+              <a:solidFill>
+                <a:srgbClr val="333333"/>
+              </a:solidFill>
+              <a:latin typeface="Consolas" panose="020B0609020204030204" pitchFamily="49" charset="0"/>
+            </a:endParaRPr>
+          </a:p>
+          <a:p>
+            <a:pPr marL="0" indent="0">
+              <a:spcBef>
+                <a:spcPts val="0"/>
+              </a:spcBef>
+              <a:spcAft>
+                <a:spcPts val="0"/>
+              </a:spcAft>
+              <a:buNone/>
+            </a:pPr>
+            <a:r>
+              <a:rPr lang="en-GB" sz="2000" dirty="0">
+                <a:solidFill>
+                  <a:srgbClr val="448C27"/>
+                </a:solidFill>
+                <a:latin typeface="Consolas" panose="020B0609020204030204" pitchFamily="49" charset="0"/>
+              </a:rPr>
+              <a:t>        </a:t>
+            </a:r>
+            <a:r>
+              <a:rPr lang="en-GB" sz="2000" dirty="0" err="1">
+                <a:solidFill>
+                  <a:srgbClr val="448C27"/>
+                </a:solidFill>
+                <a:latin typeface="Consolas" panose="020B0609020204030204" pitchFamily="49" charset="0"/>
+              </a:rPr>
+              <a:t>other_arg</a:t>
+            </a:r>
+            <a:r>
+              <a:rPr lang="en-GB" sz="2000" dirty="0">
+                <a:solidFill>
+                  <a:srgbClr val="448C27"/>
+                </a:solidFill>
+                <a:latin typeface="Consolas" panose="020B0609020204030204" pitchFamily="49" charset="0"/>
+              </a:rPr>
+              <a:t>: Another description.</a:t>
+            </a:r>
+            <a:endParaRPr lang="en-GB" sz="2000" dirty="0">
+              <a:solidFill>
+                <a:srgbClr val="333333"/>
+              </a:solidFill>
+              <a:latin typeface="Consolas" panose="020B0609020204030204" pitchFamily="49" charset="0"/>
+            </a:endParaRPr>
+          </a:p>
+          <a:p>
+            <a:pPr marL="0" indent="0">
+              <a:spcBef>
+                <a:spcPts val="0"/>
+              </a:spcBef>
+              <a:spcAft>
+                <a:spcPts val="0"/>
+              </a:spcAft>
+              <a:buNone/>
+            </a:pPr>
+            <a:br>
+              <a:rPr lang="en-GB" sz="2000" dirty="0">
+                <a:solidFill>
+                  <a:srgbClr val="333333"/>
+                </a:solidFill>
+                <a:latin typeface="Consolas" panose="020B0609020204030204" pitchFamily="49" charset="0"/>
+              </a:rPr>
+            </a:br>
+            <a:r>
+              <a:rPr lang="en-GB" sz="2000" dirty="0">
+                <a:solidFill>
+                  <a:srgbClr val="333333"/>
+                </a:solidFill>
+                <a:latin typeface="Consolas" panose="020B0609020204030204" pitchFamily="49" charset="0"/>
+              </a:rPr>
+              <a:t>    </a:t>
+            </a:r>
+            <a:r>
+              <a:rPr lang="en-GB" sz="2000" dirty="0">
+                <a:solidFill>
+                  <a:srgbClr val="448C27"/>
+                </a:solidFill>
+                <a:latin typeface="Consolas" panose="020B0609020204030204" pitchFamily="49" charset="0"/>
+              </a:rPr>
+              <a:t>Returns:</a:t>
+            </a:r>
+            <a:endParaRPr lang="en-GB" sz="2000" dirty="0">
+              <a:solidFill>
+                <a:srgbClr val="333333"/>
+              </a:solidFill>
+              <a:latin typeface="Consolas" panose="020B0609020204030204" pitchFamily="49" charset="0"/>
+            </a:endParaRPr>
+          </a:p>
+          <a:p>
+            <a:pPr marL="0" indent="0">
+              <a:spcBef>
+                <a:spcPts val="0"/>
+              </a:spcBef>
+              <a:spcAft>
+                <a:spcPts val="0"/>
+              </a:spcAft>
+              <a:buNone/>
+            </a:pPr>
+            <a:r>
+              <a:rPr lang="en-GB" sz="2000" dirty="0">
+                <a:solidFill>
+                  <a:srgbClr val="448C27"/>
+                </a:solidFill>
+                <a:latin typeface="Consolas" panose="020B0609020204030204" pitchFamily="49" charset="0"/>
+              </a:rPr>
+              <a:t>        A short summary of what is returned, especially its format.</a:t>
+            </a:r>
+            <a:endParaRPr lang="en-GB" sz="2000" dirty="0">
+              <a:solidFill>
+                <a:srgbClr val="333333"/>
+              </a:solidFill>
+              <a:latin typeface="Consolas" panose="020B0609020204030204" pitchFamily="49" charset="0"/>
+            </a:endParaRPr>
+          </a:p>
+          <a:p>
+            <a:pPr marL="0" indent="0">
+              <a:spcBef>
+                <a:spcPts val="0"/>
+              </a:spcBef>
+              <a:spcAft>
+                <a:spcPts val="0"/>
+              </a:spcAft>
+              <a:buNone/>
+            </a:pPr>
+            <a:endParaRPr lang="en-GB" sz="2000" dirty="0">
+              <a:solidFill>
+                <a:srgbClr val="448C27"/>
+              </a:solidFill>
+              <a:latin typeface="Consolas" panose="020B0609020204030204" pitchFamily="49" charset="0"/>
+            </a:endParaRPr>
+          </a:p>
+          <a:p>
+            <a:pPr marL="0" indent="0">
+              <a:spcBef>
+                <a:spcPts val="0"/>
+              </a:spcBef>
+              <a:spcAft>
+                <a:spcPts val="0"/>
+              </a:spcAft>
+              <a:buNone/>
+            </a:pPr>
+            <a:r>
+              <a:rPr lang="en-GB" sz="2000" dirty="0">
+                <a:solidFill>
+                  <a:srgbClr val="448C27"/>
+                </a:solidFill>
+                <a:latin typeface="Consolas" panose="020B0609020204030204" pitchFamily="49" charset="0"/>
+              </a:rPr>
+              <a:t>    Raises:</a:t>
+            </a:r>
+            <a:endParaRPr lang="en-GB" sz="2000" dirty="0">
+              <a:solidFill>
+                <a:srgbClr val="333333"/>
+              </a:solidFill>
+              <a:latin typeface="Consolas" panose="020B0609020204030204" pitchFamily="49" charset="0"/>
+            </a:endParaRPr>
+          </a:p>
+          <a:p>
+            <a:pPr marL="0" indent="0">
+              <a:spcBef>
+                <a:spcPts val="0"/>
+              </a:spcBef>
+              <a:spcAft>
+                <a:spcPts val="0"/>
+              </a:spcAft>
+              <a:buNone/>
+            </a:pPr>
+            <a:r>
+              <a:rPr lang="en-GB" sz="2000" dirty="0">
+                <a:solidFill>
+                  <a:srgbClr val="448C27"/>
+                </a:solidFill>
+                <a:latin typeface="Consolas" panose="020B0609020204030204" pitchFamily="49" charset="0"/>
+              </a:rPr>
+              <a:t>        </a:t>
+            </a:r>
+            <a:r>
+              <a:rPr lang="en-GB" sz="2000" dirty="0" err="1">
+                <a:solidFill>
+                  <a:srgbClr val="448C27"/>
+                </a:solidFill>
+                <a:latin typeface="Consolas" panose="020B0609020204030204" pitchFamily="49" charset="0"/>
+              </a:rPr>
+              <a:t>ValueError</a:t>
+            </a:r>
+            <a:r>
+              <a:rPr lang="en-GB" sz="2000" dirty="0">
+                <a:solidFill>
+                  <a:srgbClr val="448C27"/>
+                </a:solidFill>
+                <a:latin typeface="Consolas" panose="020B0609020204030204" pitchFamily="49" charset="0"/>
+              </a:rPr>
+              <a:t>: When does this occur?</a:t>
+            </a:r>
+            <a:endParaRPr lang="en-GB" sz="2000" dirty="0">
+              <a:solidFill>
+                <a:srgbClr val="333333"/>
+              </a:solidFill>
+              <a:latin typeface="Consolas" panose="020B0609020204030204" pitchFamily="49" charset="0"/>
+            </a:endParaRPr>
+          </a:p>
+          <a:p>
+            <a:pPr marL="0" indent="0">
+              <a:spcBef>
+                <a:spcPts val="0"/>
+              </a:spcBef>
+              <a:spcAft>
+                <a:spcPts val="0"/>
+              </a:spcAft>
+              <a:buNone/>
+            </a:pPr>
+            <a:r>
+              <a:rPr lang="en-GB" sz="2000" dirty="0">
+                <a:solidFill>
+                  <a:srgbClr val="777777"/>
+                </a:solidFill>
+                <a:latin typeface="Consolas" panose="020B0609020204030204" pitchFamily="49" charset="0"/>
+              </a:rPr>
+              <a:t>    """</a:t>
+            </a:r>
+            <a:endParaRPr lang="en-GB" sz="2000" dirty="0">
+              <a:solidFill>
+                <a:srgbClr val="333333"/>
+              </a:solidFill>
+              <a:latin typeface="Consolas" panose="020B0609020204030204" pitchFamily="49" charset="0"/>
+            </a:endParaRPr>
+          </a:p>
+          <a:p>
+            <a:pPr marL="0" indent="0">
+              <a:spcBef>
+                <a:spcPts val="0"/>
+              </a:spcBef>
+              <a:spcAft>
+                <a:spcPts val="0"/>
+              </a:spcAft>
+              <a:buNone/>
+            </a:pPr>
+            <a:r>
+              <a:rPr lang="en-GB" sz="2000" dirty="0">
+                <a:solidFill>
+                  <a:srgbClr val="4B83CD"/>
+                </a:solidFill>
+                <a:latin typeface="Consolas" panose="020B0609020204030204" pitchFamily="49" charset="0"/>
+              </a:rPr>
+              <a:t>    pass</a:t>
+            </a:r>
+            <a:endParaRPr lang="en-GB" sz="2000" dirty="0">
+              <a:solidFill>
+                <a:srgbClr val="333333"/>
+              </a:solidFill>
+              <a:latin typeface="Consolas" panose="020B0609020204030204" pitchFamily="49" charset="0"/>
+            </a:endParaRPr>
+          </a:p>
+        </p:txBody>
+      </p:sp>
+      <p:sp>
+        <p:nvSpPr>
+          <p:cNvPr id="4" name="Slide Number Placeholder 3">
+            <a:extLst>
+              <a:ext uri="{FF2B5EF4-FFF2-40B4-BE49-F238E27FC236}">
+                <a16:creationId xmlns:a16="http://schemas.microsoft.com/office/drawing/2014/main" id="{89ED0AFE-61BF-4E77-8EF7-CD75931E5987}"/>
+              </a:ext>
+            </a:extLst>
+          </p:cNvPr>
+          <p:cNvSpPr>
+            <a:spLocks noGrp="1"/>
+          </p:cNvSpPr>
+          <p:nvPr>
+            <p:ph type="sldNum" sz="quarter" idx="12"/>
+          </p:nvPr>
+        </p:nvSpPr>
+        <p:spPr/>
+        <p:txBody>
+          <a:bodyPr/>
+          <a:lstStyle/>
+          <a:p>
+            <a:fld id="{89C4E583-6443-4199-AF95-A2ECCC288D48}" type="slidenum">
+              <a:rPr lang="en-GB" smtClean="0"/>
+              <a:t>80</a:t>
+            </a:fld>
+            <a:endParaRPr lang="en-GB"/>
+          </a:p>
+        </p:txBody>
+      </p:sp>
+    </p:spTree>
+    <p:extLst>
+      <p:ext uri="{BB962C8B-B14F-4D97-AF65-F5344CB8AC3E}">
+        <p14:creationId xmlns:p14="http://schemas.microsoft.com/office/powerpoint/2010/main" val="100636900"/>
+      </p:ext>
+    </p:extLst>
+  </p:cSld>
+  <p:clrMapOvr>
+    <a:masterClrMapping/>
+  </p:clrMapOvr>
+</p:sld>
+</file>
+
+<file path=ppt/slides/slide81.xml><?xml version="1.0" encoding="utf-8"?>
+<p:sld xmlns:a="http://schemas.openxmlformats.org/drawingml/2006/main" xmlns:r="http://schemas.openxmlformats.org/officeDocument/2006/relationships" xmlns:p="http://schemas.openxmlformats.org/presentationml/2006/main">
+  <p:cSld>
+    <p:spTree>
+      <p:nvGrpSpPr>
+        <p:cNvPr id="1" name=""/>
+        <p:cNvGrpSpPr/>
+        <p:nvPr/>
+      </p:nvGrpSpPr>
+      <p:grpSpPr>
+        <a:xfrm>
+          <a:off x="0" y="0"/>
+          <a:ext cx="0" cy="0"/>
+          <a:chOff x="0" y="0"/>
+          <a:chExt cx="0" cy="0"/>
+        </a:xfrm>
+      </p:grpSpPr>
+      <p:sp>
+        <p:nvSpPr>
+          <p:cNvPr id="2" name="Title 1">
+            <a:extLst>
+              <a:ext uri="{FF2B5EF4-FFF2-40B4-BE49-F238E27FC236}">
+                <a16:creationId xmlns:a16="http://schemas.microsoft.com/office/drawing/2014/main" id="{21680ECA-503A-4BAB-A9C2-3D3C58FEA275}"/>
+              </a:ext>
+            </a:extLst>
+          </p:cNvPr>
+          <p:cNvSpPr>
+            <a:spLocks noGrp="1"/>
+          </p:cNvSpPr>
+          <p:nvPr>
+            <p:ph type="title"/>
+          </p:nvPr>
+        </p:nvSpPr>
+        <p:spPr/>
+        <p:txBody>
+          <a:bodyPr/>
+          <a:lstStyle/>
+          <a:p>
+            <a:r>
+              <a:rPr lang="en-GB" dirty="0"/>
+              <a:t>Documentation</a:t>
+            </a:r>
+          </a:p>
+        </p:txBody>
+      </p:sp>
+      <p:sp>
+        <p:nvSpPr>
+          <p:cNvPr id="3" name="Content Placeholder 2">
+            <a:extLst>
+              <a:ext uri="{FF2B5EF4-FFF2-40B4-BE49-F238E27FC236}">
+                <a16:creationId xmlns:a16="http://schemas.microsoft.com/office/drawing/2014/main" id="{CD2221AB-A358-4C0B-8C52-E8D33488ED2B}"/>
+              </a:ext>
+            </a:extLst>
+          </p:cNvPr>
+          <p:cNvSpPr>
+            <a:spLocks noGrp="1"/>
+          </p:cNvSpPr>
+          <p:nvPr>
+            <p:ph idx="1"/>
+          </p:nvPr>
+        </p:nvSpPr>
+        <p:spPr/>
+        <p:txBody>
+          <a:bodyPr/>
+          <a:lstStyle/>
+          <a:p>
+            <a:r>
+              <a:rPr lang="en-GB" dirty="0"/>
+              <a:t>Now you know how to properly document code</a:t>
+            </a:r>
+          </a:p>
+          <a:p>
+            <a:r>
+              <a:rPr lang="en-GB" dirty="0"/>
+              <a:t>Read up on and decide for a certain style</a:t>
+            </a:r>
+          </a:p>
+          <a:p>
+            <a:r>
+              <a:rPr lang="en-GB" dirty="0"/>
+              <a:t>Use it from now on in your homework!</a:t>
+            </a:r>
+          </a:p>
+        </p:txBody>
+      </p:sp>
+      <p:sp>
+        <p:nvSpPr>
+          <p:cNvPr id="4" name="Slide Number Placeholder 3">
+            <a:extLst>
+              <a:ext uri="{FF2B5EF4-FFF2-40B4-BE49-F238E27FC236}">
+                <a16:creationId xmlns:a16="http://schemas.microsoft.com/office/drawing/2014/main" id="{A9491B9D-BD80-48A3-9EB5-1D450C1B593C}"/>
+              </a:ext>
+            </a:extLst>
+          </p:cNvPr>
+          <p:cNvSpPr>
+            <a:spLocks noGrp="1"/>
+          </p:cNvSpPr>
+          <p:nvPr>
+            <p:ph type="sldNum" sz="quarter" idx="12"/>
+          </p:nvPr>
+        </p:nvSpPr>
+        <p:spPr/>
+        <p:txBody>
+          <a:bodyPr/>
+          <a:lstStyle/>
+          <a:p>
+            <a:fld id="{89C4E583-6443-4199-AF95-A2ECCC288D48}" type="slidenum">
+              <a:rPr lang="en-GB" smtClean="0"/>
+              <a:t>81</a:t>
+            </a:fld>
+            <a:endParaRPr lang="en-GB"/>
+          </a:p>
+        </p:txBody>
+      </p:sp>
+    </p:spTree>
+    <p:extLst>
+      <p:ext uri="{BB962C8B-B14F-4D97-AF65-F5344CB8AC3E}">
+        <p14:creationId xmlns:p14="http://schemas.microsoft.com/office/powerpoint/2010/main" val="2176173525"/>
+      </p:ext>
+    </p:extLst>
+  </p:cSld>
+  <p:clrMapOvr>
+    <a:masterClrMapping/>
+  </p:clrMapOvr>
+</p:sld>
+</file>
+
+<file path=ppt/slides/slide82.xml><?xml version="1.0" encoding="utf-8"?>
+<p:sld xmlns:a="http://schemas.openxmlformats.org/drawingml/2006/main" xmlns:r="http://schemas.openxmlformats.org/officeDocument/2006/relationships" xmlns:p="http://schemas.openxmlformats.org/presentationml/2006/main">
+  <p:cSld>
+    <p:spTree>
+      <p:nvGrpSpPr>
+        <p:cNvPr id="1" name=""/>
+        <p:cNvGrpSpPr/>
+        <p:nvPr/>
+      </p:nvGrpSpPr>
+      <p:grpSpPr>
+        <a:xfrm>
+          <a:off x="0" y="0"/>
+          <a:ext cx="0" cy="0"/>
+          <a:chOff x="0" y="0"/>
+          <a:chExt cx="0" cy="0"/>
+        </a:xfrm>
+      </p:grpSpPr>
+      <p:sp>
+        <p:nvSpPr>
+          <p:cNvPr id="2" name="Title 1">
+            <a:extLst>
+              <a:ext uri="{FF2B5EF4-FFF2-40B4-BE49-F238E27FC236}">
+                <a16:creationId xmlns:a16="http://schemas.microsoft.com/office/drawing/2014/main" id="{AC60F374-E096-4802-807C-6E7121DB1404}"/>
+              </a:ext>
+            </a:extLst>
+          </p:cNvPr>
+          <p:cNvSpPr>
+            <a:spLocks noGrp="1"/>
+          </p:cNvSpPr>
+          <p:nvPr>
+            <p:ph type="title"/>
+          </p:nvPr>
+        </p:nvSpPr>
+        <p:spPr/>
+        <p:txBody>
+          <a:bodyPr/>
+          <a:lstStyle/>
+          <a:p>
+            <a:r>
+              <a:rPr lang="en-GB" dirty="0"/>
+              <a:t>Homework</a:t>
+            </a:r>
+          </a:p>
+        </p:txBody>
+      </p:sp>
+      <p:sp>
+        <p:nvSpPr>
+          <p:cNvPr id="3" name="Slide Number Placeholder 2">
+            <a:extLst>
+              <a:ext uri="{FF2B5EF4-FFF2-40B4-BE49-F238E27FC236}">
+                <a16:creationId xmlns:a16="http://schemas.microsoft.com/office/drawing/2014/main" id="{A71CCD86-BDCE-4614-B4E6-D21F5FBBC4E9}"/>
+              </a:ext>
+            </a:extLst>
+          </p:cNvPr>
+          <p:cNvSpPr>
+            <a:spLocks noGrp="1"/>
+          </p:cNvSpPr>
+          <p:nvPr>
+            <p:ph type="sldNum" sz="quarter" idx="12"/>
+          </p:nvPr>
+        </p:nvSpPr>
+        <p:spPr/>
+        <p:txBody>
+          <a:bodyPr/>
+          <a:lstStyle/>
+          <a:p>
+            <a:fld id="{89C4E583-6443-4199-AF95-A2ECCC288D48}" type="slidenum">
+              <a:rPr lang="en-GB" smtClean="0"/>
+              <a:t>82</a:t>
+            </a:fld>
+            <a:endParaRPr lang="en-GB"/>
+          </a:p>
+        </p:txBody>
+      </p:sp>
+    </p:spTree>
+    <p:extLst>
+      <p:ext uri="{BB962C8B-B14F-4D97-AF65-F5344CB8AC3E}">
+        <p14:creationId xmlns:p14="http://schemas.microsoft.com/office/powerpoint/2010/main" val="3002211727"/>
+      </p:ext>
+    </p:extLst>
+  </p:cSld>
+  <p:clrMapOvr>
+    <a:masterClrMapping/>
+  </p:clrMapOvr>
+</p:sld>
+</file>
+
+<file path=ppt/slides/slide83.xml><?xml version="1.0" encoding="utf-8"?>
+<p:sld xmlns:a="http://schemas.openxmlformats.org/drawingml/2006/main" xmlns:r="http://schemas.openxmlformats.org/officeDocument/2006/relationships" xmlns:p="http://schemas.openxmlformats.org/presentationml/2006/main">
+  <p:cSld>
+    <p:spTree>
+      <p:nvGrpSpPr>
+        <p:cNvPr id="1" name=""/>
+        <p:cNvGrpSpPr/>
+        <p:nvPr/>
+      </p:nvGrpSpPr>
+      <p:grpSpPr>
+        <a:xfrm>
+          <a:off x="0" y="0"/>
+          <a:ext cx="0" cy="0"/>
+          <a:chOff x="0" y="0"/>
+          <a:chExt cx="0" cy="0"/>
+        </a:xfrm>
+      </p:grpSpPr>
+      <p:sp>
+        <p:nvSpPr>
+          <p:cNvPr id="6" name="Title 5">
+            <a:extLst>
+              <a:ext uri="{FF2B5EF4-FFF2-40B4-BE49-F238E27FC236}">
+                <a16:creationId xmlns:a16="http://schemas.microsoft.com/office/drawing/2014/main" id="{6FE256A7-4E0B-44FF-A309-D7377DBF34A4}"/>
+              </a:ext>
+            </a:extLst>
+          </p:cNvPr>
+          <p:cNvSpPr>
+            <a:spLocks noGrp="1"/>
+          </p:cNvSpPr>
+          <p:nvPr>
+            <p:ph type="title"/>
+          </p:nvPr>
+        </p:nvSpPr>
+        <p:spPr/>
+        <p:txBody>
+          <a:bodyPr/>
+          <a:lstStyle/>
+          <a:p>
+            <a:r>
+              <a:rPr lang="en-GB" dirty="0"/>
+              <a:t>Debugging!</a:t>
+            </a:r>
+          </a:p>
+        </p:txBody>
+      </p:sp>
+      <p:sp>
+        <p:nvSpPr>
+          <p:cNvPr id="7" name="Content Placeholder 6">
+            <a:extLst>
+              <a:ext uri="{FF2B5EF4-FFF2-40B4-BE49-F238E27FC236}">
+                <a16:creationId xmlns:a16="http://schemas.microsoft.com/office/drawing/2014/main" id="{89576429-F6FE-48F5-AF35-A06A404B4703}"/>
+              </a:ext>
+            </a:extLst>
+          </p:cNvPr>
+          <p:cNvSpPr>
+            <a:spLocks noGrp="1"/>
+          </p:cNvSpPr>
+          <p:nvPr>
+            <p:ph idx="1"/>
+          </p:nvPr>
+        </p:nvSpPr>
+        <p:spPr/>
+        <p:txBody>
+          <a:bodyPr/>
+          <a:lstStyle/>
+          <a:p>
+            <a:r>
+              <a:rPr lang="en-GB" dirty="0"/>
+              <a:t>We wrote a couple of small scripts that throw errors</a:t>
+            </a:r>
+          </a:p>
+          <a:p>
+            <a:pPr lvl="1"/>
+            <a:r>
+              <a:rPr lang="en-GB" dirty="0"/>
+              <a:t>Find them, and fix them!</a:t>
+            </a:r>
+          </a:p>
+          <a:p>
+            <a:r>
+              <a:rPr lang="en-GB" dirty="0"/>
+              <a:t>We also wrote a tic-tac-toe game, but that just doesn’t seem to work</a:t>
+            </a:r>
+          </a:p>
+          <a:p>
+            <a:pPr lvl="1"/>
+            <a:r>
+              <a:rPr lang="en-GB" dirty="0"/>
+              <a:t>Can you fix it for us?</a:t>
+            </a:r>
+          </a:p>
+        </p:txBody>
+      </p:sp>
+      <p:sp>
+        <p:nvSpPr>
+          <p:cNvPr id="3" name="Slide Number Placeholder 2">
+            <a:extLst>
+              <a:ext uri="{FF2B5EF4-FFF2-40B4-BE49-F238E27FC236}">
+                <a16:creationId xmlns:a16="http://schemas.microsoft.com/office/drawing/2014/main" id="{1E7A245E-E34E-4EF6-B603-B3EB0A272F6C}"/>
+              </a:ext>
+            </a:extLst>
+          </p:cNvPr>
+          <p:cNvSpPr>
+            <a:spLocks noGrp="1"/>
+          </p:cNvSpPr>
+          <p:nvPr>
+            <p:ph type="sldNum" sz="quarter" idx="12"/>
+          </p:nvPr>
+        </p:nvSpPr>
+        <p:spPr/>
+        <p:txBody>
+          <a:bodyPr/>
+          <a:lstStyle/>
+          <a:p>
+            <a:fld id="{89C4E583-6443-4199-AF95-A2ECCC288D48}" type="slidenum">
+              <a:rPr lang="en-GB" smtClean="0"/>
+              <a:t>83</a:t>
+            </a:fld>
+            <a:endParaRPr lang="en-GB"/>
+          </a:p>
+        </p:txBody>
+      </p:sp>
+    </p:spTree>
+    <p:extLst>
+      <p:ext uri="{BB962C8B-B14F-4D97-AF65-F5344CB8AC3E}">
+        <p14:creationId xmlns:p14="http://schemas.microsoft.com/office/powerpoint/2010/main" val="3452338753"/>
+      </p:ext>
+    </p:extLst>
+  </p:cSld>
+  <p:clrMapOvr>
+    <a:masterClrMapping/>
+  </p:clrMapOvr>
+</p:sld>
+</file>
+
+<file path=ppt/slides/slide84.xml><?xml version="1.0" encoding="utf-8"?>
+<p:sld xmlns:a="http://schemas.openxmlformats.org/drawingml/2006/main" xmlns:r="http://schemas.openxmlformats.org/officeDocument/2006/relationships" xmlns:p="http://schemas.openxmlformats.org/presentationml/2006/main">
+  <p:cSld>
+    <p:spTree>
+      <p:nvGrpSpPr>
+        <p:cNvPr id="1" name=""/>
+        <p:cNvGrpSpPr/>
+        <p:nvPr/>
+      </p:nvGrpSpPr>
+      <p:grpSpPr>
+        <a:xfrm>
+          <a:off x="0" y="0"/>
+          <a:ext cx="0" cy="0"/>
+          <a:chOff x="0" y="0"/>
+          <a:chExt cx="0" cy="0"/>
+        </a:xfrm>
+      </p:grpSpPr>
+      <p:sp>
+        <p:nvSpPr>
+          <p:cNvPr id="4" name="Slide Number Placeholder 3">
+            <a:extLst>
+              <a:ext uri="{FF2B5EF4-FFF2-40B4-BE49-F238E27FC236}">
+                <a16:creationId xmlns:a16="http://schemas.microsoft.com/office/drawing/2014/main" id="{D93F8F8B-8C82-4640-9EC5-A8120333533A}"/>
+              </a:ext>
+            </a:extLst>
+          </p:cNvPr>
+          <p:cNvSpPr>
+            <a:spLocks noGrp="1"/>
+          </p:cNvSpPr>
+          <p:nvPr>
+            <p:ph type="sldNum" sz="quarter" idx="12"/>
+          </p:nvPr>
+        </p:nvSpPr>
+        <p:spPr/>
+        <p:txBody>
+          <a:bodyPr/>
+          <a:lstStyle/>
+          <a:p>
+            <a:fld id="{89C4E583-6443-4199-AF95-A2ECCC288D48}" type="slidenum">
+              <a:rPr lang="en-GB" smtClean="0"/>
+              <a:t>84</a:t>
+            </a:fld>
+            <a:endParaRPr lang="en-GB"/>
+          </a:p>
+        </p:txBody>
+      </p:sp>
+      <p:pic>
+        <p:nvPicPr>
+          <p:cNvPr id="8" name="Content Placeholder 7" descr="A picture containing text&#10;&#10;Description generated with very high confidence">
+            <a:extLst>
+              <a:ext uri="{FF2B5EF4-FFF2-40B4-BE49-F238E27FC236}">
+                <a16:creationId xmlns:a16="http://schemas.microsoft.com/office/drawing/2014/main" id="{3411C977-CF18-48C2-BB0A-4D784D25AD16}"/>
+              </a:ext>
+            </a:extLst>
+          </p:cNvPr>
+          <p:cNvPicPr>
+            <a:picLocks noGrp="1" noChangeAspect="1"/>
+          </p:cNvPicPr>
+          <p:nvPr>
+            <p:ph idx="4294967295"/>
+          </p:nvPr>
+        </p:nvPicPr>
+        <p:blipFill>
+          <a:blip r:embed="rId2">
+            <a:extLst>
+              <a:ext uri="{28A0092B-C50C-407E-A947-70E740481C1C}">
+                <a14:useLocalDpi xmlns:a14="http://schemas.microsoft.com/office/drawing/2010/main" val="0"/>
+              </a:ext>
+            </a:extLst>
+          </a:blip>
+          <a:stretch>
+            <a:fillRect/>
+          </a:stretch>
+        </p:blipFill>
+        <p:spPr>
+          <a:xfrm>
+            <a:off x="3911261" y="515248"/>
+            <a:ext cx="4200925" cy="5602708"/>
+          </a:xfrm>
+        </p:spPr>
+      </p:pic>
+      <p:sp>
+        <p:nvSpPr>
+          <p:cNvPr id="9" name="TextBox 8">
+            <a:extLst>
+              <a:ext uri="{FF2B5EF4-FFF2-40B4-BE49-F238E27FC236}">
+                <a16:creationId xmlns:a16="http://schemas.microsoft.com/office/drawing/2014/main" id="{6DF428B8-A044-4222-86E7-27FC6F0330E0}"/>
+              </a:ext>
+            </a:extLst>
+          </p:cNvPr>
+          <p:cNvSpPr txBox="1"/>
+          <p:nvPr/>
+        </p:nvSpPr>
+        <p:spPr>
+          <a:xfrm>
+            <a:off x="2696966" y="5973420"/>
+            <a:ext cx="6798068" cy="369332"/>
+          </a:xfrm>
+          <a:prstGeom prst="rect">
+            <a:avLst/>
+          </a:prstGeom>
+          <a:noFill/>
+        </p:spPr>
+        <p:txBody>
+          <a:bodyPr wrap="square" rtlCol="0">
+            <a:spAutoFit/>
+          </a:bodyPr>
+          <a:lstStyle/>
+          <a:p>
+            <a:r>
+              <a:rPr lang="en-GB" b="1" dirty="0"/>
+              <a:t> </a:t>
+            </a:r>
+            <a:r>
+              <a:rPr lang="en-GB" dirty="0"/>
+              <a:t>“How I got better at debugging”. Evans, Julia, 2016, </a:t>
+            </a:r>
+            <a:r>
+              <a:rPr lang="en-GB" i="1" dirty="0"/>
+              <a:t>Julia’s Drawings</a:t>
+            </a:r>
+            <a:endParaRPr lang="en-GB" b="1" dirty="0"/>
+          </a:p>
+        </p:txBody>
+      </p:sp>
+    </p:spTree>
+    <p:extLst>
+      <p:ext uri="{BB962C8B-B14F-4D97-AF65-F5344CB8AC3E}">
+        <p14:creationId xmlns:p14="http://schemas.microsoft.com/office/powerpoint/2010/main" val="2676061361"/>
+      </p:ext>
+    </p:extLst>
+  </p:cSld>
+  <p:clrMapOvr>
+    <a:masterClrMapping/>
+  </p:clrMapOvr>
+</p:sld>
+</file>
+
+<file path=ppt/slides/slide85.xml><?xml version="1.0" encoding="utf-8"?>
+<p:sld xmlns:a="http://schemas.openxmlformats.org/drawingml/2006/main" xmlns:r="http://schemas.openxmlformats.org/officeDocument/2006/relationships" xmlns:p="http://schemas.openxmlformats.org/presentationml/2006/main">
+  <p:cSld>
+    <p:spTree>
+      <p:nvGrpSpPr>
+        <p:cNvPr id="1" name=""/>
+        <p:cNvGrpSpPr/>
+        <p:nvPr/>
+      </p:nvGrpSpPr>
+      <p:grpSpPr>
+        <a:xfrm>
+          <a:off x="0" y="0"/>
+          <a:ext cx="0" cy="0"/>
+          <a:chOff x="0" y="0"/>
+          <a:chExt cx="0" cy="0"/>
+        </a:xfrm>
+      </p:grpSpPr>
+      <p:sp>
+        <p:nvSpPr>
+          <p:cNvPr id="2" name="Title 1">
+            <a:extLst>
+              <a:ext uri="{FF2B5EF4-FFF2-40B4-BE49-F238E27FC236}">
                 <a16:creationId xmlns:a16="http://schemas.microsoft.com/office/drawing/2014/main" id="{FA5A9D9C-2774-4A3F-80B2-94FA3289EDF3}"/>
               </a:ext>
             </a:extLst>
@@ -41551,7 +44070,7 @@
           <a:p>
             <a:fld id="{89C4E583-6443-4199-AF95-A2ECCC288D48}" type="slidenum">
               <a:rPr lang="en-GB" smtClean="0"/>
-              <a:t>80</a:t>
+              <a:t>85</a:t>
             </a:fld>
             <a:endParaRPr lang="en-GB"/>
           </a:p>
@@ -41633,30 +44152,40 @@
         </p:nvSpPr>
         <p:spPr/>
         <p:txBody>
-          <a:bodyPr/>
+          <a:bodyPr vert="horz" lIns="0" tIns="45720" rIns="0" bIns="45720" rtlCol="0" anchor="t">
+            <a:normAutofit/>
+          </a:bodyPr>
           <a:lstStyle/>
           <a:p>
+            <a:pPr marL="182245" indent="-182245"/>
             <a:r>
               <a:rPr lang="en-GB" dirty="0"/>
               <a:t>In general those two are often used interchangeably</a:t>
             </a:r>
-          </a:p>
-          <a:p>
+            <a:endParaRPr lang="de-DE" dirty="0"/>
+          </a:p>
+          <a:p>
+            <a:pPr marL="182245" indent="-182245"/>
             <a:r>
               <a:rPr lang="en-GB" dirty="0"/>
               <a:t>You will often find “Exception” to describe errors in the code logic or an unexpected value</a:t>
             </a:r>
-            <a:endParaRPr lang="en-GB" b="1" dirty="0"/>
-          </a:p>
-          <a:p>
-            <a:pPr lvl="1"/>
+            <a:endParaRPr lang="en-GB" b="1" dirty="0">
+              <a:cs typeface="Calibri"/>
+            </a:endParaRPr>
+          </a:p>
+          <a:p>
+            <a:pPr marL="383540" lvl="1"/>
             <a:r>
               <a:rPr lang="en-GB" dirty="0"/>
-              <a:t>Nothing to severe</a:t>
-            </a:r>
-          </a:p>
-          <a:p>
-            <a:pPr lvl="1"/>
+              <a:t>Nothing too severe</a:t>
+            </a:r>
+            <a:endParaRPr lang="en-GB" dirty="0">
+              <a:cs typeface="Calibri"/>
+            </a:endParaRPr>
+          </a:p>
+          <a:p>
+            <a:pPr marL="383540" lvl="1"/>
             <a:r>
               <a:rPr lang="en-GB" dirty="0"/>
               <a:t>Examples are </a:t>
@@ -41677,15 +44206,22 @@
               <a:rPr lang="en-GB" dirty="0"/>
               <a:t>, …</a:t>
             </a:r>
-          </a:p>
-          <a:p>
+            <a:endParaRPr lang="en-GB" dirty="0">
+              <a:cs typeface="Calibri"/>
+            </a:endParaRPr>
+          </a:p>
+          <a:p>
+            <a:pPr marL="182245" indent="-182245"/>
             <a:r>
               <a:rPr lang="en-GB" dirty="0"/>
               <a:t>“Errors” often refer to errors closer to the system level and imply a more serious issue</a:t>
             </a:r>
-          </a:p>
-          <a:p>
-            <a:pPr lvl="1"/>
+            <a:endParaRPr lang="en-GB" dirty="0">
+              <a:cs typeface="Calibri"/>
+            </a:endParaRPr>
+          </a:p>
+          <a:p>
+            <a:pPr marL="383540" lvl="1"/>
             <a:r>
               <a:rPr lang="en-GB" dirty="0"/>
               <a:t>Examples are </a:t>
@@ -41706,8 +44242,12 @@
               <a:rPr lang="en-GB" dirty="0"/>
               <a:t>, …</a:t>
             </a:r>
-          </a:p>
-          <a:p>
+            <a:endParaRPr lang="en-GB" dirty="0">
+              <a:cs typeface="Calibri"/>
+            </a:endParaRPr>
+          </a:p>
+          <a:p>
+            <a:pPr marL="182245" indent="-182245"/>
             <a:r>
               <a:rPr lang="en-GB" dirty="0"/>
               <a:t>Errors/Exceptions are </a:t>
@@ -41740,7 +44280,9 @@
               <a:rPr lang="en-GB" i="1" dirty="0"/>
               <a:t>handled</a:t>
             </a:r>
-            <a:endParaRPr lang="en-GB" dirty="0"/>
+            <a:endParaRPr lang="en-GB" dirty="0">
+              <a:cs typeface="Calibri"/>
+            </a:endParaRPr>
           </a:p>
         </p:txBody>
       </p:sp>

</xml_diff>